<commit_message>
Added exceptions and errors
</commit_message>
<xml_diff>
--- a/Lesson 4.pptx
+++ b/Lesson 4.pptx
@@ -2,18 +2,34 @@
 <file path=ppt/presentation.xml><?xml version="1.0" encoding="utf-8"?>
 <p:presentation xmlns:a="http://schemas.openxmlformats.org/drawingml/2006/main" xmlns:r="http://schemas.openxmlformats.org/officeDocument/2006/relationships" xmlns:p="http://schemas.openxmlformats.org/presentationml/2006/main" saveSubsetFonts="1">
   <p:sldMasterIdLst>
-    <p:sldMasterId id="2147483648" r:id="rId1"/>
+    <p:sldMasterId id="2147483660" r:id="rId1"/>
   </p:sldMasterIdLst>
+  <p:notesMasterIdLst>
+    <p:notesMasterId r:id="rId24"/>
+  </p:notesMasterIdLst>
   <p:sldIdLst>
     <p:sldId id="264" r:id="rId2"/>
-    <p:sldId id="256" r:id="rId3"/>
-    <p:sldId id="257" r:id="rId4"/>
-    <p:sldId id="258" r:id="rId5"/>
-    <p:sldId id="259" r:id="rId6"/>
-    <p:sldId id="262" r:id="rId7"/>
-    <p:sldId id="261" r:id="rId8"/>
-    <p:sldId id="263" r:id="rId9"/>
-    <p:sldId id="260" r:id="rId10"/>
+    <p:sldId id="265" r:id="rId3"/>
+    <p:sldId id="266" r:id="rId4"/>
+    <p:sldId id="267" r:id="rId5"/>
+    <p:sldId id="268" r:id="rId6"/>
+    <p:sldId id="269" r:id="rId7"/>
+    <p:sldId id="270" r:id="rId8"/>
+    <p:sldId id="271" r:id="rId9"/>
+    <p:sldId id="272" r:id="rId10"/>
+    <p:sldId id="273" r:id="rId11"/>
+    <p:sldId id="274" r:id="rId12"/>
+    <p:sldId id="275" r:id="rId13"/>
+    <p:sldId id="276" r:id="rId14"/>
+    <p:sldId id="277" r:id="rId15"/>
+    <p:sldId id="256" r:id="rId16"/>
+    <p:sldId id="257" r:id="rId17"/>
+    <p:sldId id="258" r:id="rId18"/>
+    <p:sldId id="259" r:id="rId19"/>
+    <p:sldId id="262" r:id="rId20"/>
+    <p:sldId id="261" r:id="rId21"/>
+    <p:sldId id="263" r:id="rId22"/>
+    <p:sldId id="260" r:id="rId23"/>
   </p:sldIdLst>
   <p:sldSz cx="9144000" cy="6858000" type="screen4x3"/>
   <p:notesSz cx="6858000" cy="9144000"/>
@@ -115,8 +131,1600 @@
 </p:presentation>
 </file>
 
+<file path=ppt/notesMasters/notesMaster1.xml><?xml version="1.0" encoding="utf-8"?>
+<p:notesMaster xmlns:a="http://schemas.openxmlformats.org/drawingml/2006/main" xmlns:r="http://schemas.openxmlformats.org/officeDocument/2006/relationships" xmlns:p="http://schemas.openxmlformats.org/presentationml/2006/main">
+  <p:cSld>
+    <p:bg>
+      <p:bgRef idx="1001">
+        <a:schemeClr val="bg1"/>
+      </p:bgRef>
+    </p:bg>
+    <p:spTree>
+      <p:nvGrpSpPr>
+        <p:cNvPr id="1" name=""/>
+        <p:cNvGrpSpPr/>
+        <p:nvPr/>
+      </p:nvGrpSpPr>
+      <p:grpSpPr>
+        <a:xfrm>
+          <a:off x="0" y="0"/>
+          <a:ext cx="0" cy="0"/>
+          <a:chOff x="0" y="0"/>
+          <a:chExt cx="0" cy="0"/>
+        </a:xfrm>
+      </p:grpSpPr>
+      <p:sp>
+        <p:nvSpPr>
+          <p:cNvPr id="2" name="Header Placeholder 1"/>
+          <p:cNvSpPr>
+            <a:spLocks noGrp="1"/>
+          </p:cNvSpPr>
+          <p:nvPr>
+            <p:ph type="hdr" sz="quarter"/>
+          </p:nvPr>
+        </p:nvSpPr>
+        <p:spPr>
+          <a:xfrm>
+            <a:off x="0" y="0"/>
+            <a:ext cx="2971800" cy="457200"/>
+          </a:xfrm>
+          <a:prstGeom prst="rect">
+            <a:avLst/>
+          </a:prstGeom>
+        </p:spPr>
+        <p:txBody>
+          <a:bodyPr vert="horz" lIns="91440" tIns="45720" rIns="91440" bIns="45720" rtlCol="0"/>
+          <a:lstStyle>
+            <a:lvl1pPr algn="l">
+              <a:defRPr sz="1200"/>
+            </a:lvl1pPr>
+          </a:lstStyle>
+          <a:p>
+            <a:endParaRPr lang="en-US"/>
+          </a:p>
+        </p:txBody>
+      </p:sp>
+      <p:sp>
+        <p:nvSpPr>
+          <p:cNvPr id="3" name="Date Placeholder 2"/>
+          <p:cNvSpPr>
+            <a:spLocks noGrp="1"/>
+          </p:cNvSpPr>
+          <p:nvPr>
+            <p:ph type="dt" idx="1"/>
+          </p:nvPr>
+        </p:nvSpPr>
+        <p:spPr>
+          <a:xfrm>
+            <a:off x="3884613" y="0"/>
+            <a:ext cx="2971800" cy="457200"/>
+          </a:xfrm>
+          <a:prstGeom prst="rect">
+            <a:avLst/>
+          </a:prstGeom>
+        </p:spPr>
+        <p:txBody>
+          <a:bodyPr vert="horz" lIns="91440" tIns="45720" rIns="91440" bIns="45720" rtlCol="0"/>
+          <a:lstStyle>
+            <a:lvl1pPr algn="r">
+              <a:defRPr sz="1200"/>
+            </a:lvl1pPr>
+          </a:lstStyle>
+          <a:p>
+            <a:fld id="{4CDA876A-5EA8-4039-8140-156374533FEF}" type="datetimeFigureOut">
+              <a:rPr lang="en-US" smtClean="0"/>
+              <a:t>5/5/2014</a:t>
+            </a:fld>
+            <a:endParaRPr lang="en-US"/>
+          </a:p>
+        </p:txBody>
+      </p:sp>
+      <p:sp>
+        <p:nvSpPr>
+          <p:cNvPr id="4" name="Slide Image Placeholder 3"/>
+          <p:cNvSpPr>
+            <a:spLocks noGrp="1" noRot="1" noChangeAspect="1"/>
+          </p:cNvSpPr>
+          <p:nvPr>
+            <p:ph type="sldImg" idx="2"/>
+          </p:nvPr>
+        </p:nvSpPr>
+        <p:spPr>
+          <a:xfrm>
+            <a:off x="1143000" y="685800"/>
+            <a:ext cx="4572000" cy="3429000"/>
+          </a:xfrm>
+          <a:prstGeom prst="rect">
+            <a:avLst/>
+          </a:prstGeom>
+          <a:noFill/>
+          <a:ln w="12700">
+            <a:solidFill>
+              <a:prstClr val="black"/>
+            </a:solidFill>
+          </a:ln>
+        </p:spPr>
+        <p:txBody>
+          <a:bodyPr vert="horz" lIns="91440" tIns="45720" rIns="91440" bIns="45720" rtlCol="0" anchor="ctr"/>
+          <a:lstStyle/>
+          <a:p>
+            <a:endParaRPr lang="en-US"/>
+          </a:p>
+        </p:txBody>
+      </p:sp>
+      <p:sp>
+        <p:nvSpPr>
+          <p:cNvPr id="5" name="Notes Placeholder 4"/>
+          <p:cNvSpPr>
+            <a:spLocks noGrp="1"/>
+          </p:cNvSpPr>
+          <p:nvPr>
+            <p:ph type="body" sz="quarter" idx="3"/>
+          </p:nvPr>
+        </p:nvSpPr>
+        <p:spPr>
+          <a:xfrm>
+            <a:off x="685800" y="4343400"/>
+            <a:ext cx="5486400" cy="4114800"/>
+          </a:xfrm>
+          <a:prstGeom prst="rect">
+            <a:avLst/>
+          </a:prstGeom>
+        </p:spPr>
+        <p:txBody>
+          <a:bodyPr vert="horz" lIns="91440" tIns="45720" rIns="91440" bIns="45720" rtlCol="0"/>
+          <a:lstStyle/>
+          <a:p>
+            <a:pPr lvl="0"/>
+            <a:r>
+              <a:rPr lang="en-US" smtClean="0"/>
+              <a:t>Click to edit Master text styles</a:t>
+            </a:r>
+          </a:p>
+          <a:p>
+            <a:pPr lvl="1"/>
+            <a:r>
+              <a:rPr lang="en-US" smtClean="0"/>
+              <a:t>Second level</a:t>
+            </a:r>
+          </a:p>
+          <a:p>
+            <a:pPr lvl="2"/>
+            <a:r>
+              <a:rPr lang="en-US" smtClean="0"/>
+              <a:t>Third level</a:t>
+            </a:r>
+          </a:p>
+          <a:p>
+            <a:pPr lvl="3"/>
+            <a:r>
+              <a:rPr lang="en-US" smtClean="0"/>
+              <a:t>Fourth level</a:t>
+            </a:r>
+          </a:p>
+          <a:p>
+            <a:pPr lvl="4"/>
+            <a:r>
+              <a:rPr lang="en-US" smtClean="0"/>
+              <a:t>Fifth level</a:t>
+            </a:r>
+            <a:endParaRPr lang="en-US"/>
+          </a:p>
+        </p:txBody>
+      </p:sp>
+      <p:sp>
+        <p:nvSpPr>
+          <p:cNvPr id="6" name="Footer Placeholder 5"/>
+          <p:cNvSpPr>
+            <a:spLocks noGrp="1"/>
+          </p:cNvSpPr>
+          <p:nvPr>
+            <p:ph type="ftr" sz="quarter" idx="4"/>
+          </p:nvPr>
+        </p:nvSpPr>
+        <p:spPr>
+          <a:xfrm>
+            <a:off x="0" y="8685213"/>
+            <a:ext cx="2971800" cy="457200"/>
+          </a:xfrm>
+          <a:prstGeom prst="rect">
+            <a:avLst/>
+          </a:prstGeom>
+        </p:spPr>
+        <p:txBody>
+          <a:bodyPr vert="horz" lIns="91440" tIns="45720" rIns="91440" bIns="45720" rtlCol="0" anchor="b"/>
+          <a:lstStyle>
+            <a:lvl1pPr algn="l">
+              <a:defRPr sz="1200"/>
+            </a:lvl1pPr>
+          </a:lstStyle>
+          <a:p>
+            <a:endParaRPr lang="en-US"/>
+          </a:p>
+        </p:txBody>
+      </p:sp>
+      <p:sp>
+        <p:nvSpPr>
+          <p:cNvPr id="7" name="Slide Number Placeholder 6"/>
+          <p:cNvSpPr>
+            <a:spLocks noGrp="1"/>
+          </p:cNvSpPr>
+          <p:nvPr>
+            <p:ph type="sldNum" sz="quarter" idx="5"/>
+          </p:nvPr>
+        </p:nvSpPr>
+        <p:spPr>
+          <a:xfrm>
+            <a:off x="3884613" y="8685213"/>
+            <a:ext cx="2971800" cy="457200"/>
+          </a:xfrm>
+          <a:prstGeom prst="rect">
+            <a:avLst/>
+          </a:prstGeom>
+        </p:spPr>
+        <p:txBody>
+          <a:bodyPr vert="horz" lIns="91440" tIns="45720" rIns="91440" bIns="45720" rtlCol="0" anchor="b"/>
+          <a:lstStyle>
+            <a:lvl1pPr algn="r">
+              <a:defRPr sz="1200"/>
+            </a:lvl1pPr>
+          </a:lstStyle>
+          <a:p>
+            <a:fld id="{5EEA4EF7-1170-4BDC-97FA-BEEDBF3971E5}" type="slidenum">
+              <a:rPr lang="en-US" smtClean="0"/>
+              <a:t>‹#›</a:t>
+            </a:fld>
+            <a:endParaRPr lang="en-US"/>
+          </a:p>
+        </p:txBody>
+      </p:sp>
+    </p:spTree>
+    <p:extLst>
+      <p:ext uri="{BB962C8B-B14F-4D97-AF65-F5344CB8AC3E}">
+        <p14:creationId xmlns:p14="http://schemas.microsoft.com/office/powerpoint/2010/main" val="4288265937"/>
+      </p:ext>
+    </p:extLst>
+  </p:cSld>
+  <p:clrMap bg1="lt1" tx1="dk1" bg2="lt2" tx2="dk2" accent1="accent1" accent2="accent2" accent3="accent3" accent4="accent4" accent5="accent5" accent6="accent6" hlink="hlink" folHlink="folHlink"/>
+  <p:notesStyle>
+    <a:lvl1pPr marL="0" algn="l" defTabSz="914400" rtl="0" eaLnBrk="1" latinLnBrk="0" hangingPunct="1">
+      <a:defRPr sz="1200" kern="1200">
+        <a:solidFill>
+          <a:schemeClr val="tx1"/>
+        </a:solidFill>
+        <a:latin typeface="+mn-lt"/>
+        <a:ea typeface="+mn-ea"/>
+        <a:cs typeface="+mn-cs"/>
+      </a:defRPr>
+    </a:lvl1pPr>
+    <a:lvl2pPr marL="457200" algn="l" defTabSz="914400" rtl="0" eaLnBrk="1" latinLnBrk="0" hangingPunct="1">
+      <a:defRPr sz="1200" kern="1200">
+        <a:solidFill>
+          <a:schemeClr val="tx1"/>
+        </a:solidFill>
+        <a:latin typeface="+mn-lt"/>
+        <a:ea typeface="+mn-ea"/>
+        <a:cs typeface="+mn-cs"/>
+      </a:defRPr>
+    </a:lvl2pPr>
+    <a:lvl3pPr marL="914400" algn="l" defTabSz="914400" rtl="0" eaLnBrk="1" latinLnBrk="0" hangingPunct="1">
+      <a:defRPr sz="1200" kern="1200">
+        <a:solidFill>
+          <a:schemeClr val="tx1"/>
+        </a:solidFill>
+        <a:latin typeface="+mn-lt"/>
+        <a:ea typeface="+mn-ea"/>
+        <a:cs typeface="+mn-cs"/>
+      </a:defRPr>
+    </a:lvl3pPr>
+    <a:lvl4pPr marL="1371600" algn="l" defTabSz="914400" rtl="0" eaLnBrk="1" latinLnBrk="0" hangingPunct="1">
+      <a:defRPr sz="1200" kern="1200">
+        <a:solidFill>
+          <a:schemeClr val="tx1"/>
+        </a:solidFill>
+        <a:latin typeface="+mn-lt"/>
+        <a:ea typeface="+mn-ea"/>
+        <a:cs typeface="+mn-cs"/>
+      </a:defRPr>
+    </a:lvl4pPr>
+    <a:lvl5pPr marL="1828800" algn="l" defTabSz="914400" rtl="0" eaLnBrk="1" latinLnBrk="0" hangingPunct="1">
+      <a:defRPr sz="1200" kern="1200">
+        <a:solidFill>
+          <a:schemeClr val="tx1"/>
+        </a:solidFill>
+        <a:latin typeface="+mn-lt"/>
+        <a:ea typeface="+mn-ea"/>
+        <a:cs typeface="+mn-cs"/>
+      </a:defRPr>
+    </a:lvl5pPr>
+    <a:lvl6pPr marL="2286000" algn="l" defTabSz="914400" rtl="0" eaLnBrk="1" latinLnBrk="0" hangingPunct="1">
+      <a:defRPr sz="1200" kern="1200">
+        <a:solidFill>
+          <a:schemeClr val="tx1"/>
+        </a:solidFill>
+        <a:latin typeface="+mn-lt"/>
+        <a:ea typeface="+mn-ea"/>
+        <a:cs typeface="+mn-cs"/>
+      </a:defRPr>
+    </a:lvl6pPr>
+    <a:lvl7pPr marL="2743200" algn="l" defTabSz="914400" rtl="0" eaLnBrk="1" latinLnBrk="0" hangingPunct="1">
+      <a:defRPr sz="1200" kern="1200">
+        <a:solidFill>
+          <a:schemeClr val="tx1"/>
+        </a:solidFill>
+        <a:latin typeface="+mn-lt"/>
+        <a:ea typeface="+mn-ea"/>
+        <a:cs typeface="+mn-cs"/>
+      </a:defRPr>
+    </a:lvl7pPr>
+    <a:lvl8pPr marL="3200400" algn="l" defTabSz="914400" rtl="0" eaLnBrk="1" latinLnBrk="0" hangingPunct="1">
+      <a:defRPr sz="1200" kern="1200">
+        <a:solidFill>
+          <a:schemeClr val="tx1"/>
+        </a:solidFill>
+        <a:latin typeface="+mn-lt"/>
+        <a:ea typeface="+mn-ea"/>
+        <a:cs typeface="+mn-cs"/>
+      </a:defRPr>
+    </a:lvl8pPr>
+    <a:lvl9pPr marL="3657600" algn="l" defTabSz="914400" rtl="0" eaLnBrk="1" latinLnBrk="0" hangingPunct="1">
+      <a:defRPr sz="1200" kern="1200">
+        <a:solidFill>
+          <a:schemeClr val="tx1"/>
+        </a:solidFill>
+        <a:latin typeface="+mn-lt"/>
+        <a:ea typeface="+mn-ea"/>
+        <a:cs typeface="+mn-cs"/>
+      </a:defRPr>
+    </a:lvl9pPr>
+  </p:notesStyle>
+</p:notesMaster>
+</file>
+
+<file path=ppt/notesSlides/notesSlide1.xml><?xml version="1.0" encoding="utf-8"?>
+<p:notes xmlns:a="http://schemas.openxmlformats.org/drawingml/2006/main" xmlns:r="http://schemas.openxmlformats.org/officeDocument/2006/relationships" xmlns:p="http://schemas.openxmlformats.org/presentationml/2006/main">
+  <p:cSld>
+    <p:spTree>
+      <p:nvGrpSpPr>
+        <p:cNvPr id="1" name=""/>
+        <p:cNvGrpSpPr/>
+        <p:nvPr/>
+      </p:nvGrpSpPr>
+      <p:grpSpPr>
+        <a:xfrm>
+          <a:off x="0" y="0"/>
+          <a:ext cx="0" cy="0"/>
+          <a:chOff x="0" y="0"/>
+          <a:chExt cx="0" cy="0"/>
+        </a:xfrm>
+      </p:grpSpPr>
+      <p:sp>
+        <p:nvSpPr>
+          <p:cNvPr id="2" name="Slide Image Placeholder 1"/>
+          <p:cNvSpPr>
+            <a:spLocks noGrp="1" noRot="1" noChangeAspect="1"/>
+          </p:cNvSpPr>
+          <p:nvPr>
+            <p:ph type="sldImg"/>
+          </p:nvPr>
+        </p:nvSpPr>
+        <p:spPr/>
+      </p:sp>
+      <p:sp>
+        <p:nvSpPr>
+          <p:cNvPr id="3" name="Notes Placeholder 2"/>
+          <p:cNvSpPr>
+            <a:spLocks noGrp="1"/>
+          </p:cNvSpPr>
+          <p:nvPr>
+            <p:ph type="body" idx="1"/>
+          </p:nvPr>
+        </p:nvSpPr>
+        <p:spPr/>
+        <p:txBody>
+          <a:bodyPr/>
+          <a:lstStyle/>
+          <a:p>
+            <a:r>
+              <a:rPr lang="en-US" dirty="0" smtClean="0"/>
+              <a:t>If you</a:t>
+            </a:r>
+            <a:r>
+              <a:rPr lang="en-US" baseline="0" dirty="0" smtClean="0"/>
+              <a:t> add a method call in your code to a method that throws an exception, the compiler will complain saying that there in an unhandled exception.</a:t>
+            </a:r>
+          </a:p>
+          <a:p>
+            <a:r>
+              <a:rPr lang="en-US" baseline="0" dirty="0" smtClean="0"/>
+              <a:t>You can then decide to declare that your method throws the exception, or try to catch it.</a:t>
+            </a:r>
+            <a:endParaRPr lang="en-US" dirty="0"/>
+          </a:p>
+        </p:txBody>
+      </p:sp>
+      <p:sp>
+        <p:nvSpPr>
+          <p:cNvPr id="4" name="Slide Number Placeholder 3"/>
+          <p:cNvSpPr>
+            <a:spLocks noGrp="1"/>
+          </p:cNvSpPr>
+          <p:nvPr>
+            <p:ph type="sldNum" sz="quarter" idx="10"/>
+          </p:nvPr>
+        </p:nvSpPr>
+        <p:spPr/>
+        <p:txBody>
+          <a:bodyPr/>
+          <a:lstStyle/>
+          <a:p>
+            <a:fld id="{5EEA4EF7-1170-4BDC-97FA-BEEDBF3971E5}" type="slidenum">
+              <a:rPr lang="en-US" smtClean="0"/>
+              <a:t>3</a:t>
+            </a:fld>
+            <a:endParaRPr lang="en-US"/>
+          </a:p>
+        </p:txBody>
+      </p:sp>
+    </p:spTree>
+    <p:extLst>
+      <p:ext uri="{BB962C8B-B14F-4D97-AF65-F5344CB8AC3E}">
+        <p14:creationId xmlns:p14="http://schemas.microsoft.com/office/powerpoint/2010/main" val="2403355962"/>
+      </p:ext>
+    </p:extLst>
+  </p:cSld>
+  <p:clrMapOvr>
+    <a:masterClrMapping/>
+  </p:clrMapOvr>
+</p:notes>
+</file>
+
+<file path=ppt/notesSlides/notesSlide10.xml><?xml version="1.0" encoding="utf-8"?>
+<p:notes xmlns:a="http://schemas.openxmlformats.org/drawingml/2006/main" xmlns:r="http://schemas.openxmlformats.org/officeDocument/2006/relationships" xmlns:p="http://schemas.openxmlformats.org/presentationml/2006/main">
+  <p:cSld>
+    <p:spTree>
+      <p:nvGrpSpPr>
+        <p:cNvPr id="1" name=""/>
+        <p:cNvGrpSpPr/>
+        <p:nvPr/>
+      </p:nvGrpSpPr>
+      <p:grpSpPr>
+        <a:xfrm>
+          <a:off x="0" y="0"/>
+          <a:ext cx="0" cy="0"/>
+          <a:chOff x="0" y="0"/>
+          <a:chExt cx="0" cy="0"/>
+        </a:xfrm>
+      </p:grpSpPr>
+      <p:sp>
+        <p:nvSpPr>
+          <p:cNvPr id="2" name="Slide Image Placeholder 1"/>
+          <p:cNvSpPr>
+            <a:spLocks noGrp="1" noRot="1" noChangeAspect="1"/>
+          </p:cNvSpPr>
+          <p:nvPr>
+            <p:ph type="sldImg"/>
+          </p:nvPr>
+        </p:nvSpPr>
+        <p:spPr/>
+      </p:sp>
+      <p:sp>
+        <p:nvSpPr>
+          <p:cNvPr id="3" name="Notes Placeholder 2"/>
+          <p:cNvSpPr>
+            <a:spLocks noGrp="1"/>
+          </p:cNvSpPr>
+          <p:nvPr>
+            <p:ph type="body" idx="1"/>
+          </p:nvPr>
+        </p:nvSpPr>
+        <p:spPr/>
+        <p:txBody>
+          <a:bodyPr/>
+          <a:lstStyle/>
+          <a:p>
+            <a:r>
+              <a:rPr lang="en-US" dirty="0" smtClean="0"/>
+              <a:t>Notice how we now throw a new exception in the catch clause.</a:t>
+            </a:r>
+          </a:p>
+          <a:p>
+            <a:r>
+              <a:rPr lang="en-US" dirty="0" smtClean="0"/>
+              <a:t>We now see in the stack</a:t>
+            </a:r>
+            <a:r>
+              <a:rPr lang="en-US" baseline="0" dirty="0" smtClean="0"/>
+              <a:t> </a:t>
+            </a:r>
+            <a:r>
+              <a:rPr lang="en-US" dirty="0" smtClean="0"/>
+              <a:t>trace that there is a “Caused by:” statement.</a:t>
+            </a:r>
+            <a:r>
+              <a:rPr lang="en-US" baseline="0" dirty="0" smtClean="0"/>
+              <a:t> So we can see that we can add some more information to the stack trace that way.</a:t>
+            </a:r>
+          </a:p>
+          <a:p>
+            <a:r>
+              <a:rPr lang="en-US" baseline="0" dirty="0" smtClean="0"/>
+              <a:t>That is the recommended practice if you declare throws, that you also catch the exception that caused it, and then re-throw it.</a:t>
+            </a:r>
+            <a:endParaRPr lang="en-US" dirty="0"/>
+          </a:p>
+        </p:txBody>
+      </p:sp>
+      <p:sp>
+        <p:nvSpPr>
+          <p:cNvPr id="4" name="Slide Number Placeholder 3"/>
+          <p:cNvSpPr>
+            <a:spLocks noGrp="1"/>
+          </p:cNvSpPr>
+          <p:nvPr>
+            <p:ph type="sldNum" sz="quarter" idx="10"/>
+          </p:nvPr>
+        </p:nvSpPr>
+        <p:spPr/>
+        <p:txBody>
+          <a:bodyPr/>
+          <a:lstStyle/>
+          <a:p>
+            <a:fld id="{5EEA4EF7-1170-4BDC-97FA-BEEDBF3971E5}" type="slidenum">
+              <a:rPr lang="en-US" smtClean="0"/>
+              <a:t>12</a:t>
+            </a:fld>
+            <a:endParaRPr lang="en-US"/>
+          </a:p>
+        </p:txBody>
+      </p:sp>
+    </p:spTree>
+    <p:extLst>
+      <p:ext uri="{BB962C8B-B14F-4D97-AF65-F5344CB8AC3E}">
+        <p14:creationId xmlns:p14="http://schemas.microsoft.com/office/powerpoint/2010/main" val="1302118101"/>
+      </p:ext>
+    </p:extLst>
+  </p:cSld>
+  <p:clrMapOvr>
+    <a:masterClrMapping/>
+  </p:clrMapOvr>
+</p:notes>
+</file>
+
+<file path=ppt/notesSlides/notesSlide11.xml><?xml version="1.0" encoding="utf-8"?>
+<p:notes xmlns:a="http://schemas.openxmlformats.org/drawingml/2006/main" xmlns:r="http://schemas.openxmlformats.org/officeDocument/2006/relationships" xmlns:p="http://schemas.openxmlformats.org/presentationml/2006/main">
+  <p:cSld>
+    <p:spTree>
+      <p:nvGrpSpPr>
+        <p:cNvPr id="1" name=""/>
+        <p:cNvGrpSpPr/>
+        <p:nvPr/>
+      </p:nvGrpSpPr>
+      <p:grpSpPr>
+        <a:xfrm>
+          <a:off x="0" y="0"/>
+          <a:ext cx="0" cy="0"/>
+          <a:chOff x="0" y="0"/>
+          <a:chExt cx="0" cy="0"/>
+        </a:xfrm>
+      </p:grpSpPr>
+      <p:sp>
+        <p:nvSpPr>
+          <p:cNvPr id="2" name="Slide Image Placeholder 1"/>
+          <p:cNvSpPr>
+            <a:spLocks noGrp="1" noRot="1" noChangeAspect="1"/>
+          </p:cNvSpPr>
+          <p:nvPr>
+            <p:ph type="sldImg"/>
+          </p:nvPr>
+        </p:nvSpPr>
+        <p:spPr/>
+      </p:sp>
+      <p:sp>
+        <p:nvSpPr>
+          <p:cNvPr id="3" name="Notes Placeholder 2"/>
+          <p:cNvSpPr>
+            <a:spLocks noGrp="1"/>
+          </p:cNvSpPr>
+          <p:nvPr>
+            <p:ph type="body" idx="1"/>
+          </p:nvPr>
+        </p:nvSpPr>
+        <p:spPr/>
+        <p:txBody>
+          <a:bodyPr/>
+          <a:lstStyle/>
+          <a:p>
+            <a:r>
+              <a:rPr lang="en-US" dirty="0" smtClean="0"/>
+              <a:t>Finally,</a:t>
+            </a:r>
+            <a:r>
+              <a:rPr lang="en-US" baseline="0" dirty="0" smtClean="0"/>
+              <a:t> you might want to always do something whether or not an exception was thrown. You put that in the finally clause. Beware that what you do here can also thrown an exception, maybe.</a:t>
+            </a:r>
+          </a:p>
+          <a:p>
+            <a:r>
+              <a:rPr lang="en-US" baseline="0" dirty="0" smtClean="0"/>
+              <a:t>Notice how we got the finally clause executed.</a:t>
+            </a:r>
+            <a:endParaRPr lang="en-US" dirty="0"/>
+          </a:p>
+        </p:txBody>
+      </p:sp>
+      <p:sp>
+        <p:nvSpPr>
+          <p:cNvPr id="4" name="Slide Number Placeholder 3"/>
+          <p:cNvSpPr>
+            <a:spLocks noGrp="1"/>
+          </p:cNvSpPr>
+          <p:nvPr>
+            <p:ph type="sldNum" sz="quarter" idx="10"/>
+          </p:nvPr>
+        </p:nvSpPr>
+        <p:spPr/>
+        <p:txBody>
+          <a:bodyPr/>
+          <a:lstStyle/>
+          <a:p>
+            <a:fld id="{5EEA4EF7-1170-4BDC-97FA-BEEDBF3971E5}" type="slidenum">
+              <a:rPr lang="en-US" smtClean="0"/>
+              <a:t>13</a:t>
+            </a:fld>
+            <a:endParaRPr lang="en-US"/>
+          </a:p>
+        </p:txBody>
+      </p:sp>
+    </p:spTree>
+    <p:extLst>
+      <p:ext uri="{BB962C8B-B14F-4D97-AF65-F5344CB8AC3E}">
+        <p14:creationId xmlns:p14="http://schemas.microsoft.com/office/powerpoint/2010/main" val="3393215399"/>
+      </p:ext>
+    </p:extLst>
+  </p:cSld>
+  <p:clrMapOvr>
+    <a:masterClrMapping/>
+  </p:clrMapOvr>
+</p:notes>
+</file>
+
+<file path=ppt/notesSlides/notesSlide12.xml><?xml version="1.0" encoding="utf-8"?>
+<p:notes xmlns:a="http://schemas.openxmlformats.org/drawingml/2006/main" xmlns:r="http://schemas.openxmlformats.org/officeDocument/2006/relationships" xmlns:p="http://schemas.openxmlformats.org/presentationml/2006/main">
+  <p:cSld>
+    <p:spTree>
+      <p:nvGrpSpPr>
+        <p:cNvPr id="1" name=""/>
+        <p:cNvGrpSpPr/>
+        <p:nvPr/>
+      </p:nvGrpSpPr>
+      <p:grpSpPr>
+        <a:xfrm>
+          <a:off x="0" y="0"/>
+          <a:ext cx="0" cy="0"/>
+          <a:chOff x="0" y="0"/>
+          <a:chExt cx="0" cy="0"/>
+        </a:xfrm>
+      </p:grpSpPr>
+      <p:sp>
+        <p:nvSpPr>
+          <p:cNvPr id="2" name="Slide Image Placeholder 1"/>
+          <p:cNvSpPr>
+            <a:spLocks noGrp="1" noRot="1" noChangeAspect="1"/>
+          </p:cNvSpPr>
+          <p:nvPr>
+            <p:ph type="sldImg"/>
+          </p:nvPr>
+        </p:nvSpPr>
+        <p:spPr/>
+      </p:sp>
+      <p:sp>
+        <p:nvSpPr>
+          <p:cNvPr id="3" name="Notes Placeholder 2"/>
+          <p:cNvSpPr>
+            <a:spLocks noGrp="1"/>
+          </p:cNvSpPr>
+          <p:nvPr>
+            <p:ph type="body" idx="1"/>
+          </p:nvPr>
+        </p:nvSpPr>
+        <p:spPr/>
+        <p:txBody>
+          <a:bodyPr/>
+          <a:lstStyle/>
+          <a:p>
+            <a:r>
+              <a:rPr lang="en-US" dirty="0" smtClean="0"/>
+              <a:t>We created a new class </a:t>
+            </a:r>
+            <a:r>
+              <a:rPr lang="en-US" dirty="0" err="1" smtClean="0"/>
+              <a:t>ReadLineException</a:t>
+            </a:r>
+            <a:r>
+              <a:rPr lang="en-US" baseline="0" dirty="0" smtClean="0"/>
+              <a:t> that extends Exception.</a:t>
+            </a:r>
+          </a:p>
+          <a:p>
+            <a:r>
+              <a:rPr lang="en-US" baseline="0" dirty="0" smtClean="0"/>
+              <a:t>We see in the stack trace that we get our own exception.</a:t>
+            </a:r>
+            <a:endParaRPr lang="en-US" dirty="0"/>
+          </a:p>
+        </p:txBody>
+      </p:sp>
+      <p:sp>
+        <p:nvSpPr>
+          <p:cNvPr id="4" name="Slide Number Placeholder 3"/>
+          <p:cNvSpPr>
+            <a:spLocks noGrp="1"/>
+          </p:cNvSpPr>
+          <p:nvPr>
+            <p:ph type="sldNum" sz="quarter" idx="10"/>
+          </p:nvPr>
+        </p:nvSpPr>
+        <p:spPr/>
+        <p:txBody>
+          <a:bodyPr/>
+          <a:lstStyle/>
+          <a:p>
+            <a:fld id="{5EEA4EF7-1170-4BDC-97FA-BEEDBF3971E5}" type="slidenum">
+              <a:rPr lang="en-US" smtClean="0"/>
+              <a:t>14</a:t>
+            </a:fld>
+            <a:endParaRPr lang="en-US"/>
+          </a:p>
+        </p:txBody>
+      </p:sp>
+    </p:spTree>
+    <p:extLst>
+      <p:ext uri="{BB962C8B-B14F-4D97-AF65-F5344CB8AC3E}">
+        <p14:creationId xmlns:p14="http://schemas.microsoft.com/office/powerpoint/2010/main" val="3224917711"/>
+      </p:ext>
+    </p:extLst>
+  </p:cSld>
+  <p:clrMapOvr>
+    <a:masterClrMapping/>
+  </p:clrMapOvr>
+</p:notes>
+</file>
+
+<file path=ppt/notesSlides/notesSlide2.xml><?xml version="1.0" encoding="utf-8"?>
+<p:notes xmlns:a="http://schemas.openxmlformats.org/drawingml/2006/main" xmlns:r="http://schemas.openxmlformats.org/officeDocument/2006/relationships" xmlns:p="http://schemas.openxmlformats.org/presentationml/2006/main">
+  <p:cSld>
+    <p:spTree>
+      <p:nvGrpSpPr>
+        <p:cNvPr id="1" name=""/>
+        <p:cNvGrpSpPr/>
+        <p:nvPr/>
+      </p:nvGrpSpPr>
+      <p:grpSpPr>
+        <a:xfrm>
+          <a:off x="0" y="0"/>
+          <a:ext cx="0" cy="0"/>
+          <a:chOff x="0" y="0"/>
+          <a:chExt cx="0" cy="0"/>
+        </a:xfrm>
+      </p:grpSpPr>
+      <p:sp>
+        <p:nvSpPr>
+          <p:cNvPr id="2" name="Slide Image Placeholder 1"/>
+          <p:cNvSpPr>
+            <a:spLocks noGrp="1" noRot="1" noChangeAspect="1"/>
+          </p:cNvSpPr>
+          <p:nvPr>
+            <p:ph type="sldImg"/>
+          </p:nvPr>
+        </p:nvSpPr>
+        <p:spPr/>
+      </p:sp>
+      <p:sp>
+        <p:nvSpPr>
+          <p:cNvPr id="3" name="Notes Placeholder 2"/>
+          <p:cNvSpPr>
+            <a:spLocks noGrp="1"/>
+          </p:cNvSpPr>
+          <p:nvPr>
+            <p:ph type="body" idx="1"/>
+          </p:nvPr>
+        </p:nvSpPr>
+        <p:spPr/>
+        <p:txBody>
+          <a:bodyPr/>
+          <a:lstStyle/>
+          <a:p>
+            <a:r>
+              <a:rPr lang="en-US" dirty="0" smtClean="0"/>
+              <a:t>I chose to catch the exception, bu</a:t>
+            </a:r>
+            <a:r>
+              <a:rPr lang="en-US" baseline="0" dirty="0" smtClean="0"/>
+              <a:t>t the compiler is still not happy.</a:t>
+            </a:r>
+          </a:p>
+          <a:p>
+            <a:r>
+              <a:rPr lang="en-US" dirty="0" smtClean="0"/>
+              <a:t>Now because I caught the exception, the</a:t>
+            </a:r>
+            <a:r>
+              <a:rPr lang="en-US" baseline="0" dirty="0" smtClean="0"/>
+              <a:t> method is no longer guaranteed to return a value.</a:t>
+            </a:r>
+            <a:endParaRPr lang="en-US" dirty="0"/>
+          </a:p>
+        </p:txBody>
+      </p:sp>
+      <p:sp>
+        <p:nvSpPr>
+          <p:cNvPr id="4" name="Slide Number Placeholder 3"/>
+          <p:cNvSpPr>
+            <a:spLocks noGrp="1"/>
+          </p:cNvSpPr>
+          <p:nvPr>
+            <p:ph type="sldNum" sz="quarter" idx="10"/>
+          </p:nvPr>
+        </p:nvSpPr>
+        <p:spPr/>
+        <p:txBody>
+          <a:bodyPr/>
+          <a:lstStyle/>
+          <a:p>
+            <a:fld id="{5EEA4EF7-1170-4BDC-97FA-BEEDBF3971E5}" type="slidenum">
+              <a:rPr lang="en-US" smtClean="0"/>
+              <a:t>4</a:t>
+            </a:fld>
+            <a:endParaRPr lang="en-US"/>
+          </a:p>
+        </p:txBody>
+      </p:sp>
+    </p:spTree>
+    <p:extLst>
+      <p:ext uri="{BB962C8B-B14F-4D97-AF65-F5344CB8AC3E}">
+        <p14:creationId xmlns:p14="http://schemas.microsoft.com/office/powerpoint/2010/main" val="4286263845"/>
+      </p:ext>
+    </p:extLst>
+  </p:cSld>
+  <p:clrMapOvr>
+    <a:masterClrMapping/>
+  </p:clrMapOvr>
+</p:notes>
+</file>
+
+<file path=ppt/notesSlides/notesSlide3.xml><?xml version="1.0" encoding="utf-8"?>
+<p:notes xmlns:a="http://schemas.openxmlformats.org/drawingml/2006/main" xmlns:r="http://schemas.openxmlformats.org/officeDocument/2006/relationships" xmlns:p="http://schemas.openxmlformats.org/presentationml/2006/main">
+  <p:cSld>
+    <p:spTree>
+      <p:nvGrpSpPr>
+        <p:cNvPr id="1" name=""/>
+        <p:cNvGrpSpPr/>
+        <p:nvPr/>
+      </p:nvGrpSpPr>
+      <p:grpSpPr>
+        <a:xfrm>
+          <a:off x="0" y="0"/>
+          <a:ext cx="0" cy="0"/>
+          <a:chOff x="0" y="0"/>
+          <a:chExt cx="0" cy="0"/>
+        </a:xfrm>
+      </p:grpSpPr>
+      <p:sp>
+        <p:nvSpPr>
+          <p:cNvPr id="2" name="Slide Image Placeholder 1"/>
+          <p:cNvSpPr>
+            <a:spLocks noGrp="1" noRot="1" noChangeAspect="1"/>
+          </p:cNvSpPr>
+          <p:nvPr>
+            <p:ph type="sldImg"/>
+          </p:nvPr>
+        </p:nvSpPr>
+        <p:spPr/>
+      </p:sp>
+      <p:sp>
+        <p:nvSpPr>
+          <p:cNvPr id="3" name="Notes Placeholder 2"/>
+          <p:cNvSpPr>
+            <a:spLocks noGrp="1"/>
+          </p:cNvSpPr>
+          <p:nvPr>
+            <p:ph type="body" idx="1"/>
+          </p:nvPr>
+        </p:nvSpPr>
+        <p:spPr/>
+        <p:txBody>
+          <a:bodyPr/>
+          <a:lstStyle/>
+          <a:p>
+            <a:r>
+              <a:rPr lang="en-US" dirty="0" smtClean="0"/>
+              <a:t>Now if there was an exception thrown, we will</a:t>
+            </a:r>
+            <a:r>
+              <a:rPr lang="en-US" baseline="0" dirty="0" smtClean="0"/>
+              <a:t> return null.</a:t>
+            </a:r>
+          </a:p>
+          <a:p>
+            <a:r>
+              <a:rPr lang="en-US" baseline="0" dirty="0" smtClean="0"/>
+              <a:t>Notice the </a:t>
+            </a:r>
+            <a:r>
+              <a:rPr lang="en-US" baseline="0" dirty="0" err="1" smtClean="0"/>
+              <a:t>printStackTrace</a:t>
+            </a:r>
+            <a:r>
+              <a:rPr lang="en-US" baseline="0" dirty="0" smtClean="0"/>
+              <a:t> method. It will print out a stack of the previous method calls, so you can track where the error occurred.</a:t>
+            </a:r>
+            <a:endParaRPr lang="en-US" dirty="0"/>
+          </a:p>
+        </p:txBody>
+      </p:sp>
+      <p:sp>
+        <p:nvSpPr>
+          <p:cNvPr id="4" name="Slide Number Placeholder 3"/>
+          <p:cNvSpPr>
+            <a:spLocks noGrp="1"/>
+          </p:cNvSpPr>
+          <p:nvPr>
+            <p:ph type="sldNum" sz="quarter" idx="10"/>
+          </p:nvPr>
+        </p:nvSpPr>
+        <p:spPr/>
+        <p:txBody>
+          <a:bodyPr/>
+          <a:lstStyle/>
+          <a:p>
+            <a:fld id="{5EEA4EF7-1170-4BDC-97FA-BEEDBF3971E5}" type="slidenum">
+              <a:rPr lang="en-US" smtClean="0"/>
+              <a:t>5</a:t>
+            </a:fld>
+            <a:endParaRPr lang="en-US"/>
+          </a:p>
+        </p:txBody>
+      </p:sp>
+    </p:spTree>
+    <p:extLst>
+      <p:ext uri="{BB962C8B-B14F-4D97-AF65-F5344CB8AC3E}">
+        <p14:creationId xmlns:p14="http://schemas.microsoft.com/office/powerpoint/2010/main" val="2070858978"/>
+      </p:ext>
+    </p:extLst>
+  </p:cSld>
+  <p:clrMapOvr>
+    <a:masterClrMapping/>
+  </p:clrMapOvr>
+</p:notes>
+</file>
+
+<file path=ppt/notesSlides/notesSlide4.xml><?xml version="1.0" encoding="utf-8"?>
+<p:notes xmlns:a="http://schemas.openxmlformats.org/drawingml/2006/main" xmlns:r="http://schemas.openxmlformats.org/officeDocument/2006/relationships" xmlns:p="http://schemas.openxmlformats.org/presentationml/2006/main">
+  <p:cSld>
+    <p:spTree>
+      <p:nvGrpSpPr>
+        <p:cNvPr id="1" name=""/>
+        <p:cNvGrpSpPr/>
+        <p:nvPr/>
+      </p:nvGrpSpPr>
+      <p:grpSpPr>
+        <a:xfrm>
+          <a:off x="0" y="0"/>
+          <a:ext cx="0" cy="0"/>
+          <a:chOff x="0" y="0"/>
+          <a:chExt cx="0" cy="0"/>
+        </a:xfrm>
+      </p:grpSpPr>
+      <p:sp>
+        <p:nvSpPr>
+          <p:cNvPr id="2" name="Slide Image Placeholder 1"/>
+          <p:cNvSpPr>
+            <a:spLocks noGrp="1" noRot="1" noChangeAspect="1"/>
+          </p:cNvSpPr>
+          <p:nvPr>
+            <p:ph type="sldImg"/>
+          </p:nvPr>
+        </p:nvSpPr>
+        <p:spPr/>
+      </p:sp>
+      <p:sp>
+        <p:nvSpPr>
+          <p:cNvPr id="3" name="Notes Placeholder 2"/>
+          <p:cNvSpPr>
+            <a:spLocks noGrp="1"/>
+          </p:cNvSpPr>
+          <p:nvPr>
+            <p:ph type="body" idx="1"/>
+          </p:nvPr>
+        </p:nvSpPr>
+        <p:spPr/>
+        <p:txBody>
+          <a:bodyPr/>
+          <a:lstStyle/>
+          <a:p>
+            <a:r>
+              <a:rPr lang="en-US" dirty="0" smtClean="0"/>
+              <a:t>Read from the bottom. Click on any of the links to go to the line.</a:t>
+            </a:r>
+          </a:p>
+          <a:p>
+            <a:r>
+              <a:rPr lang="en-US" dirty="0" smtClean="0"/>
+              <a:t>Notice that the </a:t>
+            </a:r>
+            <a:r>
+              <a:rPr lang="en-US" dirty="0" err="1" smtClean="0"/>
+              <a:t>NullPointerException</a:t>
+            </a:r>
+            <a:r>
+              <a:rPr lang="en-US" dirty="0" smtClean="0"/>
+              <a:t> is</a:t>
+            </a:r>
+            <a:r>
+              <a:rPr lang="en-US" baseline="0" dirty="0" smtClean="0"/>
+              <a:t> not an </a:t>
+            </a:r>
+            <a:r>
+              <a:rPr lang="en-US" baseline="0" dirty="0" err="1" smtClean="0"/>
+              <a:t>IOException</a:t>
+            </a:r>
+            <a:r>
+              <a:rPr lang="en-US" baseline="0" dirty="0" smtClean="0"/>
+              <a:t>.</a:t>
+            </a:r>
+          </a:p>
+          <a:p>
+            <a:endParaRPr lang="en-US" dirty="0"/>
+          </a:p>
+        </p:txBody>
+      </p:sp>
+      <p:sp>
+        <p:nvSpPr>
+          <p:cNvPr id="4" name="Slide Number Placeholder 3"/>
+          <p:cNvSpPr>
+            <a:spLocks noGrp="1"/>
+          </p:cNvSpPr>
+          <p:nvPr>
+            <p:ph type="sldNum" sz="quarter" idx="10"/>
+          </p:nvPr>
+        </p:nvSpPr>
+        <p:spPr/>
+        <p:txBody>
+          <a:bodyPr/>
+          <a:lstStyle/>
+          <a:p>
+            <a:fld id="{5EEA4EF7-1170-4BDC-97FA-BEEDBF3971E5}" type="slidenum">
+              <a:rPr lang="en-US" smtClean="0"/>
+              <a:t>6</a:t>
+            </a:fld>
+            <a:endParaRPr lang="en-US"/>
+          </a:p>
+        </p:txBody>
+      </p:sp>
+    </p:spTree>
+    <p:extLst>
+      <p:ext uri="{BB962C8B-B14F-4D97-AF65-F5344CB8AC3E}">
+        <p14:creationId xmlns:p14="http://schemas.microsoft.com/office/powerpoint/2010/main" val="613990795"/>
+      </p:ext>
+    </p:extLst>
+  </p:cSld>
+  <p:clrMapOvr>
+    <a:masterClrMapping/>
+  </p:clrMapOvr>
+</p:notes>
+</file>
+
+<file path=ppt/notesSlides/notesSlide5.xml><?xml version="1.0" encoding="utf-8"?>
+<p:notes xmlns:a="http://schemas.openxmlformats.org/drawingml/2006/main" xmlns:r="http://schemas.openxmlformats.org/officeDocument/2006/relationships" xmlns:p="http://schemas.openxmlformats.org/presentationml/2006/main">
+  <p:cSld>
+    <p:spTree>
+      <p:nvGrpSpPr>
+        <p:cNvPr id="1" name=""/>
+        <p:cNvGrpSpPr/>
+        <p:nvPr/>
+      </p:nvGrpSpPr>
+      <p:grpSpPr>
+        <a:xfrm>
+          <a:off x="0" y="0"/>
+          <a:ext cx="0" cy="0"/>
+          <a:chOff x="0" y="0"/>
+          <a:chExt cx="0" cy="0"/>
+        </a:xfrm>
+      </p:grpSpPr>
+      <p:sp>
+        <p:nvSpPr>
+          <p:cNvPr id="2" name="Slide Image Placeholder 1"/>
+          <p:cNvSpPr>
+            <a:spLocks noGrp="1" noRot="1" noChangeAspect="1"/>
+          </p:cNvSpPr>
+          <p:nvPr>
+            <p:ph type="sldImg"/>
+          </p:nvPr>
+        </p:nvSpPr>
+        <p:spPr/>
+      </p:sp>
+      <p:sp>
+        <p:nvSpPr>
+          <p:cNvPr id="3" name="Notes Placeholder 2"/>
+          <p:cNvSpPr>
+            <a:spLocks noGrp="1"/>
+          </p:cNvSpPr>
+          <p:nvPr>
+            <p:ph type="body" idx="1"/>
+          </p:nvPr>
+        </p:nvSpPr>
+        <p:spPr/>
+        <p:txBody>
+          <a:bodyPr/>
+          <a:lstStyle/>
+          <a:p>
+            <a:r>
+              <a:rPr lang="en-US" dirty="0" smtClean="0"/>
+              <a:t>We can see that if</a:t>
+            </a:r>
+            <a:r>
+              <a:rPr lang="en-US" baseline="0" dirty="0" smtClean="0"/>
+              <a:t> we add the following line to our code, we don’t see that in the output. So we didn’t actually catch the exception.</a:t>
+            </a:r>
+          </a:p>
+          <a:p>
+            <a:r>
+              <a:rPr lang="en-US" baseline="0" dirty="0" smtClean="0"/>
+              <a:t>That is because </a:t>
+            </a:r>
+            <a:r>
+              <a:rPr lang="en-US" baseline="0" dirty="0" err="1" smtClean="0"/>
+              <a:t>NullPointerException</a:t>
+            </a:r>
+            <a:r>
+              <a:rPr lang="en-US" baseline="0" dirty="0" smtClean="0"/>
+              <a:t> is not an </a:t>
+            </a:r>
+            <a:r>
+              <a:rPr lang="en-US" baseline="0" dirty="0" err="1" smtClean="0"/>
+              <a:t>IOException</a:t>
+            </a:r>
+            <a:r>
+              <a:rPr lang="en-US" baseline="0" dirty="0" smtClean="0"/>
+              <a:t>.</a:t>
+            </a:r>
+            <a:endParaRPr lang="en-US" dirty="0"/>
+          </a:p>
+        </p:txBody>
+      </p:sp>
+      <p:sp>
+        <p:nvSpPr>
+          <p:cNvPr id="4" name="Slide Number Placeholder 3"/>
+          <p:cNvSpPr>
+            <a:spLocks noGrp="1"/>
+          </p:cNvSpPr>
+          <p:nvPr>
+            <p:ph type="sldNum" sz="quarter" idx="10"/>
+          </p:nvPr>
+        </p:nvSpPr>
+        <p:spPr/>
+        <p:txBody>
+          <a:bodyPr/>
+          <a:lstStyle/>
+          <a:p>
+            <a:fld id="{5EEA4EF7-1170-4BDC-97FA-BEEDBF3971E5}" type="slidenum">
+              <a:rPr lang="en-US" smtClean="0"/>
+              <a:t>7</a:t>
+            </a:fld>
+            <a:endParaRPr lang="en-US"/>
+          </a:p>
+        </p:txBody>
+      </p:sp>
+    </p:spTree>
+    <p:extLst>
+      <p:ext uri="{BB962C8B-B14F-4D97-AF65-F5344CB8AC3E}">
+        <p14:creationId xmlns:p14="http://schemas.microsoft.com/office/powerpoint/2010/main" val="1350153984"/>
+      </p:ext>
+    </p:extLst>
+  </p:cSld>
+  <p:clrMapOvr>
+    <a:masterClrMapping/>
+  </p:clrMapOvr>
+</p:notes>
+</file>
+
+<file path=ppt/notesSlides/notesSlide6.xml><?xml version="1.0" encoding="utf-8"?>
+<p:notes xmlns:a="http://schemas.openxmlformats.org/drawingml/2006/main" xmlns:r="http://schemas.openxmlformats.org/officeDocument/2006/relationships" xmlns:p="http://schemas.openxmlformats.org/presentationml/2006/main">
+  <p:cSld>
+    <p:spTree>
+      <p:nvGrpSpPr>
+        <p:cNvPr id="1" name=""/>
+        <p:cNvGrpSpPr/>
+        <p:nvPr/>
+      </p:nvGrpSpPr>
+      <p:grpSpPr>
+        <a:xfrm>
+          <a:off x="0" y="0"/>
+          <a:ext cx="0" cy="0"/>
+          <a:chOff x="0" y="0"/>
+          <a:chExt cx="0" cy="0"/>
+        </a:xfrm>
+      </p:grpSpPr>
+      <p:sp>
+        <p:nvSpPr>
+          <p:cNvPr id="2" name="Slide Image Placeholder 1"/>
+          <p:cNvSpPr>
+            <a:spLocks noGrp="1" noRot="1" noChangeAspect="1"/>
+          </p:cNvSpPr>
+          <p:nvPr>
+            <p:ph type="sldImg"/>
+          </p:nvPr>
+        </p:nvSpPr>
+        <p:spPr/>
+      </p:sp>
+      <p:sp>
+        <p:nvSpPr>
+          <p:cNvPr id="3" name="Notes Placeholder 2"/>
+          <p:cNvSpPr>
+            <a:spLocks noGrp="1"/>
+          </p:cNvSpPr>
+          <p:nvPr>
+            <p:ph type="body" idx="1"/>
+          </p:nvPr>
+        </p:nvSpPr>
+        <p:spPr/>
+        <p:txBody>
+          <a:bodyPr/>
+          <a:lstStyle/>
+          <a:p>
+            <a:r>
+              <a:rPr lang="en-US" dirty="0" smtClean="0"/>
+              <a:t>This exception</a:t>
+            </a:r>
+            <a:r>
+              <a:rPr lang="en-US" baseline="0" dirty="0" smtClean="0"/>
+              <a:t> is a </a:t>
+            </a:r>
+            <a:r>
+              <a:rPr lang="en-US" baseline="0" dirty="0" err="1" smtClean="0"/>
+              <a:t>RuntimeException</a:t>
+            </a:r>
+            <a:r>
+              <a:rPr lang="en-US" baseline="0" dirty="0" smtClean="0"/>
+              <a:t>, and these do not need to be declared.</a:t>
+            </a:r>
+          </a:p>
+          <a:p>
+            <a:r>
+              <a:rPr lang="en-US" baseline="0" dirty="0" smtClean="0"/>
+              <a:t>It still extends from </a:t>
+            </a:r>
+            <a:r>
+              <a:rPr lang="en-US" baseline="0" dirty="0" err="1" smtClean="0"/>
+              <a:t>Throwable</a:t>
+            </a:r>
+            <a:r>
+              <a:rPr lang="en-US" baseline="0" dirty="0" smtClean="0"/>
+              <a:t>, which means that we can catch it. Let’s “try”.</a:t>
+            </a:r>
+            <a:endParaRPr lang="en-US" dirty="0"/>
+          </a:p>
+        </p:txBody>
+      </p:sp>
+      <p:sp>
+        <p:nvSpPr>
+          <p:cNvPr id="4" name="Slide Number Placeholder 3"/>
+          <p:cNvSpPr>
+            <a:spLocks noGrp="1"/>
+          </p:cNvSpPr>
+          <p:nvPr>
+            <p:ph type="sldNum" sz="quarter" idx="10"/>
+          </p:nvPr>
+        </p:nvSpPr>
+        <p:spPr/>
+        <p:txBody>
+          <a:bodyPr/>
+          <a:lstStyle/>
+          <a:p>
+            <a:fld id="{5EEA4EF7-1170-4BDC-97FA-BEEDBF3971E5}" type="slidenum">
+              <a:rPr lang="en-US" smtClean="0"/>
+              <a:t>8</a:t>
+            </a:fld>
+            <a:endParaRPr lang="en-US"/>
+          </a:p>
+        </p:txBody>
+      </p:sp>
+    </p:spTree>
+    <p:extLst>
+      <p:ext uri="{BB962C8B-B14F-4D97-AF65-F5344CB8AC3E}">
+        <p14:creationId xmlns:p14="http://schemas.microsoft.com/office/powerpoint/2010/main" val="3365400722"/>
+      </p:ext>
+    </p:extLst>
+  </p:cSld>
+  <p:clrMapOvr>
+    <a:masterClrMapping/>
+  </p:clrMapOvr>
+</p:notes>
+</file>
+
+<file path=ppt/notesSlides/notesSlide7.xml><?xml version="1.0" encoding="utf-8"?>
+<p:notes xmlns:a="http://schemas.openxmlformats.org/drawingml/2006/main" xmlns:r="http://schemas.openxmlformats.org/officeDocument/2006/relationships" xmlns:p="http://schemas.openxmlformats.org/presentationml/2006/main">
+  <p:cSld>
+    <p:spTree>
+      <p:nvGrpSpPr>
+        <p:cNvPr id="1" name=""/>
+        <p:cNvGrpSpPr/>
+        <p:nvPr/>
+      </p:nvGrpSpPr>
+      <p:grpSpPr>
+        <a:xfrm>
+          <a:off x="0" y="0"/>
+          <a:ext cx="0" cy="0"/>
+          <a:chOff x="0" y="0"/>
+          <a:chExt cx="0" cy="0"/>
+        </a:xfrm>
+      </p:grpSpPr>
+      <p:sp>
+        <p:nvSpPr>
+          <p:cNvPr id="2" name="Slide Image Placeholder 1"/>
+          <p:cNvSpPr>
+            <a:spLocks noGrp="1" noRot="1" noChangeAspect="1"/>
+          </p:cNvSpPr>
+          <p:nvPr>
+            <p:ph type="sldImg"/>
+          </p:nvPr>
+        </p:nvSpPr>
+        <p:spPr/>
+      </p:sp>
+      <p:sp>
+        <p:nvSpPr>
+          <p:cNvPr id="3" name="Notes Placeholder 2"/>
+          <p:cNvSpPr>
+            <a:spLocks noGrp="1"/>
+          </p:cNvSpPr>
+          <p:nvPr>
+            <p:ph type="body" idx="1"/>
+          </p:nvPr>
+        </p:nvSpPr>
+        <p:spPr/>
+        <p:txBody>
+          <a:bodyPr/>
+          <a:lstStyle/>
+          <a:p>
+            <a:r>
+              <a:rPr lang="en-US" dirty="0" smtClean="0"/>
+              <a:t>When an</a:t>
+            </a:r>
+            <a:r>
+              <a:rPr lang="en-US" baseline="0" dirty="0" smtClean="0"/>
+              <a:t> exception is thrown, the JVM goes through the catch clauses in order, so if one exception extends from another, that has to come first, otherwise the more general exception clause is always caught. Let’s try it.</a:t>
+            </a:r>
+            <a:endParaRPr lang="en-US" dirty="0"/>
+          </a:p>
+        </p:txBody>
+      </p:sp>
+      <p:sp>
+        <p:nvSpPr>
+          <p:cNvPr id="4" name="Slide Number Placeholder 3"/>
+          <p:cNvSpPr>
+            <a:spLocks noGrp="1"/>
+          </p:cNvSpPr>
+          <p:nvPr>
+            <p:ph type="sldNum" sz="quarter" idx="10"/>
+          </p:nvPr>
+        </p:nvSpPr>
+        <p:spPr/>
+        <p:txBody>
+          <a:bodyPr/>
+          <a:lstStyle/>
+          <a:p>
+            <a:fld id="{5EEA4EF7-1170-4BDC-97FA-BEEDBF3971E5}" type="slidenum">
+              <a:rPr lang="en-US" smtClean="0"/>
+              <a:t>9</a:t>
+            </a:fld>
+            <a:endParaRPr lang="en-US"/>
+          </a:p>
+        </p:txBody>
+      </p:sp>
+    </p:spTree>
+    <p:extLst>
+      <p:ext uri="{BB962C8B-B14F-4D97-AF65-F5344CB8AC3E}">
+        <p14:creationId xmlns:p14="http://schemas.microsoft.com/office/powerpoint/2010/main" val="911455276"/>
+      </p:ext>
+    </p:extLst>
+  </p:cSld>
+  <p:clrMapOvr>
+    <a:masterClrMapping/>
+  </p:clrMapOvr>
+</p:notes>
+</file>
+
+<file path=ppt/notesSlides/notesSlide8.xml><?xml version="1.0" encoding="utf-8"?>
+<p:notes xmlns:a="http://schemas.openxmlformats.org/drawingml/2006/main" xmlns:r="http://schemas.openxmlformats.org/officeDocument/2006/relationships" xmlns:p="http://schemas.openxmlformats.org/presentationml/2006/main">
+  <p:cSld>
+    <p:spTree>
+      <p:nvGrpSpPr>
+        <p:cNvPr id="1" name=""/>
+        <p:cNvGrpSpPr/>
+        <p:nvPr/>
+      </p:nvGrpSpPr>
+      <p:grpSpPr>
+        <a:xfrm>
+          <a:off x="0" y="0"/>
+          <a:ext cx="0" cy="0"/>
+          <a:chOff x="0" y="0"/>
+          <a:chExt cx="0" cy="0"/>
+        </a:xfrm>
+      </p:grpSpPr>
+      <p:sp>
+        <p:nvSpPr>
+          <p:cNvPr id="2" name="Slide Image Placeholder 1"/>
+          <p:cNvSpPr>
+            <a:spLocks noGrp="1" noRot="1" noChangeAspect="1"/>
+          </p:cNvSpPr>
+          <p:nvPr>
+            <p:ph type="sldImg"/>
+          </p:nvPr>
+        </p:nvSpPr>
+        <p:spPr/>
+      </p:sp>
+      <p:sp>
+        <p:nvSpPr>
+          <p:cNvPr id="3" name="Notes Placeholder 2"/>
+          <p:cNvSpPr>
+            <a:spLocks noGrp="1"/>
+          </p:cNvSpPr>
+          <p:nvPr>
+            <p:ph type="body" idx="1"/>
+          </p:nvPr>
+        </p:nvSpPr>
+        <p:spPr/>
+        <p:txBody>
+          <a:bodyPr/>
+          <a:lstStyle/>
+          <a:p>
+            <a:r>
+              <a:rPr lang="en-US" dirty="0" smtClean="0"/>
+              <a:t>The compiler complains that we tried to catch the more general Exception first.</a:t>
+            </a:r>
+            <a:endParaRPr lang="en-US" dirty="0"/>
+          </a:p>
+        </p:txBody>
+      </p:sp>
+      <p:sp>
+        <p:nvSpPr>
+          <p:cNvPr id="4" name="Slide Number Placeholder 3"/>
+          <p:cNvSpPr>
+            <a:spLocks noGrp="1"/>
+          </p:cNvSpPr>
+          <p:nvPr>
+            <p:ph type="sldNum" sz="quarter" idx="10"/>
+          </p:nvPr>
+        </p:nvSpPr>
+        <p:spPr/>
+        <p:txBody>
+          <a:bodyPr/>
+          <a:lstStyle/>
+          <a:p>
+            <a:fld id="{5EEA4EF7-1170-4BDC-97FA-BEEDBF3971E5}" type="slidenum">
+              <a:rPr lang="en-US" smtClean="0"/>
+              <a:t>10</a:t>
+            </a:fld>
+            <a:endParaRPr lang="en-US"/>
+          </a:p>
+        </p:txBody>
+      </p:sp>
+    </p:spTree>
+    <p:extLst>
+      <p:ext uri="{BB962C8B-B14F-4D97-AF65-F5344CB8AC3E}">
+        <p14:creationId xmlns:p14="http://schemas.microsoft.com/office/powerpoint/2010/main" val="2988615943"/>
+      </p:ext>
+    </p:extLst>
+  </p:cSld>
+  <p:clrMapOvr>
+    <a:masterClrMapping/>
+  </p:clrMapOvr>
+</p:notes>
+</file>
+
+<file path=ppt/notesSlides/notesSlide9.xml><?xml version="1.0" encoding="utf-8"?>
+<p:notes xmlns:a="http://schemas.openxmlformats.org/drawingml/2006/main" xmlns:r="http://schemas.openxmlformats.org/officeDocument/2006/relationships" xmlns:p="http://schemas.openxmlformats.org/presentationml/2006/main">
+  <p:cSld>
+    <p:spTree>
+      <p:nvGrpSpPr>
+        <p:cNvPr id="1" name=""/>
+        <p:cNvGrpSpPr/>
+        <p:nvPr/>
+      </p:nvGrpSpPr>
+      <p:grpSpPr>
+        <a:xfrm>
+          <a:off x="0" y="0"/>
+          <a:ext cx="0" cy="0"/>
+          <a:chOff x="0" y="0"/>
+          <a:chExt cx="0" cy="0"/>
+        </a:xfrm>
+      </p:grpSpPr>
+      <p:sp>
+        <p:nvSpPr>
+          <p:cNvPr id="2" name="Slide Image Placeholder 1"/>
+          <p:cNvSpPr>
+            <a:spLocks noGrp="1" noRot="1" noChangeAspect="1"/>
+          </p:cNvSpPr>
+          <p:nvPr>
+            <p:ph type="sldImg"/>
+          </p:nvPr>
+        </p:nvSpPr>
+        <p:spPr/>
+      </p:sp>
+      <p:sp>
+        <p:nvSpPr>
+          <p:cNvPr id="3" name="Notes Placeholder 2"/>
+          <p:cNvSpPr>
+            <a:spLocks noGrp="1"/>
+          </p:cNvSpPr>
+          <p:nvPr>
+            <p:ph type="body" idx="1"/>
+          </p:nvPr>
+        </p:nvSpPr>
+        <p:spPr/>
+        <p:txBody>
+          <a:bodyPr/>
+          <a:lstStyle/>
+          <a:p>
+            <a:r>
+              <a:rPr lang="en-US" dirty="0" smtClean="0"/>
+              <a:t>We can choose to declare that our method throws </a:t>
+            </a:r>
+            <a:r>
+              <a:rPr lang="en-US" dirty="0" err="1" smtClean="0"/>
+              <a:t>IOException</a:t>
+            </a:r>
+            <a:r>
+              <a:rPr lang="en-US" dirty="0" smtClean="0"/>
+              <a:t>. In that case</a:t>
+            </a:r>
+            <a:r>
+              <a:rPr lang="en-US" baseline="0" dirty="0" smtClean="0"/>
+              <a:t> the problem is moved to the code that calls the method. We can see that now the compiler complains that the main method should catch the exception.</a:t>
+            </a:r>
+            <a:endParaRPr lang="en-US" dirty="0"/>
+          </a:p>
+        </p:txBody>
+      </p:sp>
+      <p:sp>
+        <p:nvSpPr>
+          <p:cNvPr id="4" name="Slide Number Placeholder 3"/>
+          <p:cNvSpPr>
+            <a:spLocks noGrp="1"/>
+          </p:cNvSpPr>
+          <p:nvPr>
+            <p:ph type="sldNum" sz="quarter" idx="10"/>
+          </p:nvPr>
+        </p:nvSpPr>
+        <p:spPr/>
+        <p:txBody>
+          <a:bodyPr/>
+          <a:lstStyle/>
+          <a:p>
+            <a:fld id="{5EEA4EF7-1170-4BDC-97FA-BEEDBF3971E5}" type="slidenum">
+              <a:rPr lang="en-US" smtClean="0"/>
+              <a:t>11</a:t>
+            </a:fld>
+            <a:endParaRPr lang="en-US"/>
+          </a:p>
+        </p:txBody>
+      </p:sp>
+    </p:spTree>
+    <p:extLst>
+      <p:ext uri="{BB962C8B-B14F-4D97-AF65-F5344CB8AC3E}">
+        <p14:creationId xmlns:p14="http://schemas.microsoft.com/office/powerpoint/2010/main" val="2900431038"/>
+      </p:ext>
+    </p:extLst>
+  </p:cSld>
+  <p:clrMapOvr>
+    <a:masterClrMapping/>
+  </p:clrMapOvr>
+</p:notes>
+</file>
+
 <file path=ppt/slideLayouts/slideLayout1.xml><?xml version="1.0" encoding="utf-8"?>
-<p:sldLayout xmlns:a="http://schemas.openxmlformats.org/drawingml/2006/main" xmlns:r="http://schemas.openxmlformats.org/officeDocument/2006/relationships" xmlns:p="http://schemas.openxmlformats.org/presentationml/2006/main" type="title" preserve="1">
+<p:sldLayout xmlns:a="http://schemas.openxmlformats.org/drawingml/2006/main" xmlns:r="http://schemas.openxmlformats.org/officeDocument/2006/relationships" xmlns:p="http://schemas.openxmlformats.org/presentationml/2006/main" preserve="1">
   <p:cSld name="Title Slide">
     <p:spTree>
       <p:nvGrpSpPr>
@@ -132,34 +1740,6 @@
           <a:chExt cx="0" cy="0"/>
         </a:xfrm>
       </p:grpSpPr>
-      <p:sp>
-        <p:nvSpPr>
-          <p:cNvPr id="2" name="Title 1"/>
-          <p:cNvSpPr>
-            <a:spLocks noGrp="1"/>
-          </p:cNvSpPr>
-          <p:nvPr>
-            <p:ph type="ctrTitle"/>
-          </p:nvPr>
-        </p:nvSpPr>
-        <p:spPr>
-          <a:xfrm>
-            <a:off x="685800" y="2130425"/>
-            <a:ext cx="7772400" cy="1470025"/>
-          </a:xfrm>
-        </p:spPr>
-        <p:txBody>
-          <a:bodyPr/>
-          <a:lstStyle/>
-          <a:p>
-            <a:r>
-              <a:rPr lang="en-US" smtClean="0"/>
-              <a:t>Click to edit Master title style</a:t>
-            </a:r>
-            <a:endParaRPr lang="en-US"/>
-          </a:p>
-        </p:txBody>
-      </p:sp>
       <p:sp>
         <p:nvSpPr>
           <p:cNvPr id="3" name="Subtitle 2"/>
@@ -281,7 +1861,30 @@
       </p:sp>
       <p:sp>
         <p:nvSpPr>
-          <p:cNvPr id="4" name="Date Placeholder 3"/>
+          <p:cNvPr id="8" name="Title 7"/>
+          <p:cNvSpPr>
+            <a:spLocks noGrp="1"/>
+          </p:cNvSpPr>
+          <p:nvPr>
+            <p:ph type="title"/>
+          </p:nvPr>
+        </p:nvSpPr>
+        <p:spPr/>
+        <p:txBody>
+          <a:bodyPr/>
+          <a:lstStyle/>
+          <a:p>
+            <a:r>
+              <a:rPr lang="en-US" smtClean="0"/>
+              <a:t>Click to edit Master title style</a:t>
+            </a:r>
+            <a:endParaRPr lang="en-US"/>
+          </a:p>
+        </p:txBody>
+      </p:sp>
+      <p:sp>
+        <p:nvSpPr>
+          <p:cNvPr id="9" name="Date Placeholder 8"/>
           <p:cNvSpPr>
             <a:spLocks noGrp="1"/>
           </p:cNvSpPr>
@@ -296,7 +1899,7 @@
           <a:p>
             <a:fld id="{6F69DFD9-279D-4F8A-9CB8-FA17EBD510E8}" type="datetimeFigureOut">
               <a:rPr lang="en-US" smtClean="0"/>
-              <a:t>4/2/2014</a:t>
+              <a:t>5/5/2014</a:t>
             </a:fld>
             <a:endParaRPr lang="en-US"/>
           </a:p>
@@ -304,7 +1907,7 @@
       </p:sp>
       <p:sp>
         <p:nvSpPr>
-          <p:cNvPr id="5" name="Footer Placeholder 4"/>
+          <p:cNvPr id="10" name="Footer Placeholder 9"/>
           <p:cNvSpPr>
             <a:spLocks noGrp="1"/>
           </p:cNvSpPr>
@@ -323,7 +1926,7 @@
       </p:sp>
       <p:sp>
         <p:nvSpPr>
-          <p:cNvPr id="6" name="Slide Number Placeholder 5"/>
+          <p:cNvPr id="11" name="Slide Number Placeholder 10"/>
           <p:cNvSpPr>
             <a:spLocks noGrp="1"/>
           </p:cNvSpPr>
@@ -347,13 +1950,20 @@
     </p:spTree>
     <p:extLst>
       <p:ext uri="{BB962C8B-B14F-4D97-AF65-F5344CB8AC3E}">
-        <p14:creationId xmlns:p14="http://schemas.microsoft.com/office/powerpoint/2010/main" val="501291990"/>
+        <p14:creationId xmlns:p14="http://schemas.microsoft.com/office/powerpoint/2010/main" val="3415618378"/>
       </p:ext>
     </p:extLst>
   </p:cSld>
   <p:clrMapOvr>
     <a:masterClrMapping/>
   </p:clrMapOvr>
+  <p:timing>
+    <p:tnLst>
+      <p:par>
+        <p:cTn id="1" dur="indefinite" restart="never" nodeType="tmRoot"/>
+      </p:par>
+    </p:tnLst>
+  </p:timing>
 </p:sldLayout>
 </file>
 
@@ -466,7 +2076,7 @@
           <a:p>
             <a:fld id="{6F69DFD9-279D-4F8A-9CB8-FA17EBD510E8}" type="datetimeFigureOut">
               <a:rPr lang="en-US" smtClean="0"/>
-              <a:t>4/2/2014</a:t>
+              <a:t>5/5/2014</a:t>
             </a:fld>
             <a:endParaRPr lang="en-US"/>
           </a:p>
@@ -517,7 +2127,7 @@
     </p:spTree>
     <p:extLst>
       <p:ext uri="{BB962C8B-B14F-4D97-AF65-F5344CB8AC3E}">
-        <p14:creationId xmlns:p14="http://schemas.microsoft.com/office/powerpoint/2010/main" val="2634325576"/>
+        <p14:creationId xmlns:p14="http://schemas.microsoft.com/office/powerpoint/2010/main" val="2705722516"/>
       </p:ext>
     </p:extLst>
   </p:cSld>
@@ -646,7 +2256,7 @@
           <a:p>
             <a:fld id="{6F69DFD9-279D-4F8A-9CB8-FA17EBD510E8}" type="datetimeFigureOut">
               <a:rPr lang="en-US" smtClean="0"/>
-              <a:t>4/2/2014</a:t>
+              <a:t>5/5/2014</a:t>
             </a:fld>
             <a:endParaRPr lang="en-US"/>
           </a:p>
@@ -697,7 +2307,7 @@
     </p:spTree>
     <p:extLst>
       <p:ext uri="{BB962C8B-B14F-4D97-AF65-F5344CB8AC3E}">
-        <p14:creationId xmlns:p14="http://schemas.microsoft.com/office/powerpoint/2010/main" val="653316675"/>
+        <p14:creationId xmlns:p14="http://schemas.microsoft.com/office/powerpoint/2010/main" val="2181790245"/>
       </p:ext>
     </p:extLst>
   </p:cSld>
@@ -816,7 +2426,7 @@
           <a:p>
             <a:fld id="{6F69DFD9-279D-4F8A-9CB8-FA17EBD510E8}" type="datetimeFigureOut">
               <a:rPr lang="en-US" smtClean="0"/>
-              <a:t>4/2/2014</a:t>
+              <a:t>5/5/2014</a:t>
             </a:fld>
             <a:endParaRPr lang="en-US"/>
           </a:p>
@@ -867,13 +2477,20 @@
     </p:spTree>
     <p:extLst>
       <p:ext uri="{BB962C8B-B14F-4D97-AF65-F5344CB8AC3E}">
-        <p14:creationId xmlns:p14="http://schemas.microsoft.com/office/powerpoint/2010/main" val="959065018"/>
+        <p14:creationId xmlns:p14="http://schemas.microsoft.com/office/powerpoint/2010/main" val="2483038740"/>
       </p:ext>
     </p:extLst>
   </p:cSld>
   <p:clrMapOvr>
     <a:masterClrMapping/>
   </p:clrMapOvr>
+  <p:timing>
+    <p:tnLst>
+      <p:par>
+        <p:cTn id="1" dur="indefinite" restart="never" nodeType="tmRoot"/>
+      </p:par>
+    </p:tnLst>
+  </p:timing>
 </p:sldLayout>
 </file>
 
@@ -1062,7 +2679,7 @@
           <a:p>
             <a:fld id="{6F69DFD9-279D-4F8A-9CB8-FA17EBD510E8}" type="datetimeFigureOut">
               <a:rPr lang="en-US" smtClean="0"/>
-              <a:t>4/2/2014</a:t>
+              <a:t>5/5/2014</a:t>
             </a:fld>
             <a:endParaRPr lang="en-US"/>
           </a:p>
@@ -1113,13 +2730,20 @@
     </p:spTree>
     <p:extLst>
       <p:ext uri="{BB962C8B-B14F-4D97-AF65-F5344CB8AC3E}">
-        <p14:creationId xmlns:p14="http://schemas.microsoft.com/office/powerpoint/2010/main" val="3388229205"/>
+        <p14:creationId xmlns:p14="http://schemas.microsoft.com/office/powerpoint/2010/main" val="2821432225"/>
       </p:ext>
     </p:extLst>
   </p:cSld>
   <p:clrMapOvr>
     <a:masterClrMapping/>
   </p:clrMapOvr>
+  <p:timing>
+    <p:tnLst>
+      <p:par>
+        <p:cTn id="1" dur="indefinite" restart="never" nodeType="tmRoot"/>
+      </p:par>
+    </p:tnLst>
+  </p:timing>
 </p:sldLayout>
 </file>
 
@@ -1350,7 +2974,7 @@
           <a:p>
             <a:fld id="{6F69DFD9-279D-4F8A-9CB8-FA17EBD510E8}" type="datetimeFigureOut">
               <a:rPr lang="en-US" smtClean="0"/>
-              <a:t>4/2/2014</a:t>
+              <a:t>5/5/2014</a:t>
             </a:fld>
             <a:endParaRPr lang="en-US"/>
           </a:p>
@@ -1401,7 +3025,7 @@
     </p:spTree>
     <p:extLst>
       <p:ext uri="{BB962C8B-B14F-4D97-AF65-F5344CB8AC3E}">
-        <p14:creationId xmlns:p14="http://schemas.microsoft.com/office/powerpoint/2010/main" val="1330683744"/>
+        <p14:creationId xmlns:p14="http://schemas.microsoft.com/office/powerpoint/2010/main" val="2181612688"/>
       </p:ext>
     </p:extLst>
   </p:cSld>
@@ -1772,7 +3396,7 @@
           <a:p>
             <a:fld id="{6F69DFD9-279D-4F8A-9CB8-FA17EBD510E8}" type="datetimeFigureOut">
               <a:rPr lang="en-US" smtClean="0"/>
-              <a:t>4/2/2014</a:t>
+              <a:t>5/5/2014</a:t>
             </a:fld>
             <a:endParaRPr lang="en-US"/>
           </a:p>
@@ -1823,7 +3447,7 @@
     </p:spTree>
     <p:extLst>
       <p:ext uri="{BB962C8B-B14F-4D97-AF65-F5344CB8AC3E}">
-        <p14:creationId xmlns:p14="http://schemas.microsoft.com/office/powerpoint/2010/main" val="4153886323"/>
+        <p14:creationId xmlns:p14="http://schemas.microsoft.com/office/powerpoint/2010/main" val="1192096842"/>
       </p:ext>
     </p:extLst>
   </p:cSld>
@@ -1890,7 +3514,7 @@
           <a:p>
             <a:fld id="{6F69DFD9-279D-4F8A-9CB8-FA17EBD510E8}" type="datetimeFigureOut">
               <a:rPr lang="en-US" smtClean="0"/>
-              <a:t>4/2/2014</a:t>
+              <a:t>5/5/2014</a:t>
             </a:fld>
             <a:endParaRPr lang="en-US"/>
           </a:p>
@@ -1941,7 +3565,7 @@
     </p:spTree>
     <p:extLst>
       <p:ext uri="{BB962C8B-B14F-4D97-AF65-F5344CB8AC3E}">
-        <p14:creationId xmlns:p14="http://schemas.microsoft.com/office/powerpoint/2010/main" val="3943433804"/>
+        <p14:creationId xmlns:p14="http://schemas.microsoft.com/office/powerpoint/2010/main" val="800392811"/>
       </p:ext>
     </p:extLst>
   </p:cSld>
@@ -1985,7 +3609,7 @@
           <a:p>
             <a:fld id="{6F69DFD9-279D-4F8A-9CB8-FA17EBD510E8}" type="datetimeFigureOut">
               <a:rPr lang="en-US" smtClean="0"/>
-              <a:t>4/2/2014</a:t>
+              <a:t>5/5/2014</a:t>
             </a:fld>
             <a:endParaRPr lang="en-US"/>
           </a:p>
@@ -2036,7 +3660,7 @@
     </p:spTree>
     <p:extLst>
       <p:ext uri="{BB962C8B-B14F-4D97-AF65-F5344CB8AC3E}">
-        <p14:creationId xmlns:p14="http://schemas.microsoft.com/office/powerpoint/2010/main" val="1633464225"/>
+        <p14:creationId xmlns:p14="http://schemas.microsoft.com/office/powerpoint/2010/main" val="2601541109"/>
       </p:ext>
     </p:extLst>
   </p:cSld>
@@ -2262,7 +3886,7 @@
           <a:p>
             <a:fld id="{6F69DFD9-279D-4F8A-9CB8-FA17EBD510E8}" type="datetimeFigureOut">
               <a:rPr lang="en-US" smtClean="0"/>
-              <a:t>4/2/2014</a:t>
+              <a:t>5/5/2014</a:t>
             </a:fld>
             <a:endParaRPr lang="en-US"/>
           </a:p>
@@ -2313,7 +3937,7 @@
     </p:spTree>
     <p:extLst>
       <p:ext uri="{BB962C8B-B14F-4D97-AF65-F5344CB8AC3E}">
-        <p14:creationId xmlns:p14="http://schemas.microsoft.com/office/powerpoint/2010/main" val="1006651834"/>
+        <p14:creationId xmlns:p14="http://schemas.microsoft.com/office/powerpoint/2010/main" val="3684951328"/>
       </p:ext>
     </p:extLst>
   </p:cSld>
@@ -2429,7 +4053,11 @@
             </a:lvl9pPr>
           </a:lstStyle>
           <a:p>
-            <a:endParaRPr lang="en-US"/>
+            <a:r>
+              <a:rPr lang="en-US" smtClean="0"/>
+              <a:t>Click icon to add picture</a:t>
+            </a:r>
+            <a:endParaRPr lang="en-US" dirty="0"/>
           </a:p>
         </p:txBody>
       </p:sp>
@@ -2515,7 +4143,7 @@
           <a:p>
             <a:fld id="{6F69DFD9-279D-4F8A-9CB8-FA17EBD510E8}" type="datetimeFigureOut">
               <a:rPr lang="en-US" smtClean="0"/>
-              <a:t>4/2/2014</a:t>
+              <a:t>5/5/2014</a:t>
             </a:fld>
             <a:endParaRPr lang="en-US"/>
           </a:p>
@@ -2566,7 +4194,7 @@
     </p:spTree>
     <p:extLst>
       <p:ext uri="{BB962C8B-B14F-4D97-AF65-F5344CB8AC3E}">
-        <p14:creationId xmlns:p14="http://schemas.microsoft.com/office/powerpoint/2010/main" val="2121900512"/>
+        <p14:creationId xmlns:p14="http://schemas.microsoft.com/office/powerpoint/2010/main" val="2712212200"/>
       </p:ext>
     </p:extLst>
   </p:cSld>
@@ -2580,9 +4208,19 @@
 <p:sldMaster xmlns:a="http://schemas.openxmlformats.org/drawingml/2006/main" xmlns:r="http://schemas.openxmlformats.org/officeDocument/2006/relationships" xmlns:p="http://schemas.openxmlformats.org/presentationml/2006/main">
   <p:cSld>
     <p:bg>
-      <p:bgRef idx="1001">
-        <a:schemeClr val="bg1"/>
-      </p:bgRef>
+      <p:bgPr>
+        <a:blipFill dpi="0" rotWithShape="1">
+          <a:blip r:embed="rId13">
+            <a:alphaModFix amt="5000"/>
+            <a:lum/>
+          </a:blip>
+          <a:srcRect/>
+          <a:stretch>
+            <a:fillRect l="10000" t="5000" r="10000" b="5000"/>
+          </a:stretch>
+        </a:blipFill>
+        <a:effectLst/>
+      </p:bgPr>
     </p:bg>
     <p:spTree>
       <p:nvGrpSpPr>
@@ -2728,7 +4366,7 @@
           <a:p>
             <a:fld id="{6F69DFD9-279D-4F8A-9CB8-FA17EBD510E8}" type="datetimeFigureOut">
               <a:rPr lang="en-US" smtClean="0"/>
-              <a:t>4/2/2014</a:t>
+              <a:t>5/5/2014</a:t>
             </a:fld>
             <a:endParaRPr lang="en-US"/>
           </a:p>
@@ -2812,27 +4450,140 @@
           </a:p>
         </p:txBody>
       </p:sp>
+      <p:pic>
+        <p:nvPicPr>
+          <p:cNvPr id="7" name="Picture 2"/>
+          <p:cNvPicPr>
+            <a:picLocks noChangeAspect="1" noChangeArrowheads="1"/>
+          </p:cNvPicPr>
+          <p:nvPr/>
+        </p:nvPicPr>
+        <p:blipFill>
+          <a:blip r:embed="rId14" cstate="print">
+            <a:extLst>
+              <a:ext uri="{28A0092B-C50C-407E-A947-70E740481C1C}">
+                <a14:useLocalDpi xmlns:a14="http://schemas.microsoft.com/office/drawing/2010/main" val="0"/>
+              </a:ext>
+            </a:extLst>
+          </a:blip>
+          <a:srcRect/>
+          <a:stretch>
+            <a:fillRect/>
+          </a:stretch>
+        </p:blipFill>
+        <p:spPr bwMode="auto">
+          <a:xfrm>
+            <a:off x="0" y="152400"/>
+            <a:ext cx="1371600" cy="1168603"/>
+          </a:xfrm>
+          <a:prstGeom prst="rect">
+            <a:avLst/>
+          </a:prstGeom>
+          <a:noFill/>
+          <a:ln>
+            <a:noFill/>
+          </a:ln>
+          <a:extLst>
+            <a:ext uri="{909E8E84-426E-40DD-AFC4-6F175D3DCCD1}">
+              <a14:hiddenFill xmlns:a14="http://schemas.microsoft.com/office/drawing/2010/main">
+                <a:solidFill>
+                  <a:schemeClr val="accent1"/>
+                </a:solidFill>
+              </a14:hiddenFill>
+            </a:ext>
+            <a:ext uri="{91240B29-F687-4F45-9708-019B960494DF}">
+              <a14:hiddenLine xmlns:a14="http://schemas.microsoft.com/office/drawing/2010/main" w="9525">
+                <a:solidFill>
+                  <a:schemeClr val="tx1"/>
+                </a:solidFill>
+                <a:miter lim="800000"/>
+                <a:headEnd/>
+                <a:tailEnd/>
+              </a14:hiddenLine>
+            </a:ext>
+          </a:extLst>
+        </p:spPr>
+      </p:pic>
+      <p:sp>
+        <p:nvSpPr>
+          <p:cNvPr id="8" name="TextBox 7"/>
+          <p:cNvSpPr txBox="1"/>
+          <p:nvPr/>
+        </p:nvSpPr>
+        <p:spPr>
+          <a:xfrm>
+            <a:off x="-60543" y="-50104"/>
+            <a:ext cx="3224601" cy="276999"/>
+          </a:xfrm>
+          <a:prstGeom prst="rect">
+            <a:avLst/>
+          </a:prstGeom>
+          <a:noFill/>
+        </p:spPr>
+        <p:txBody>
+          <a:bodyPr wrap="none" rtlCol="0">
+            <a:spAutoFit/>
+          </a:bodyPr>
+          <a:lstStyle/>
+          <a:p>
+            <a:r>
+              <a:rPr lang="en-US" sz="1200" dirty="0" smtClean="0">
+                <a:solidFill>
+                  <a:schemeClr val="bg1">
+                    <a:lumMod val="50000"/>
+                  </a:schemeClr>
+                </a:solidFill>
+              </a:rPr>
+              <a:t>Copyright © 2014, Morning Star Christian</a:t>
+            </a:r>
+            <a:r>
+              <a:rPr lang="en-US" sz="1200" baseline="0" dirty="0" smtClean="0">
+                <a:solidFill>
+                  <a:schemeClr val="bg1">
+                    <a:lumMod val="50000"/>
+                  </a:schemeClr>
+                </a:solidFill>
+              </a:rPr>
+              <a:t> School</a:t>
+            </a:r>
+            <a:endParaRPr lang="en-US" sz="1200" dirty="0">
+              <a:solidFill>
+                <a:schemeClr val="bg1">
+                  <a:lumMod val="50000"/>
+                </a:schemeClr>
+              </a:solidFill>
+            </a:endParaRPr>
+          </a:p>
+        </p:txBody>
+      </p:sp>
     </p:spTree>
     <p:extLst>
       <p:ext uri="{BB962C8B-B14F-4D97-AF65-F5344CB8AC3E}">
-        <p14:creationId xmlns:p14="http://schemas.microsoft.com/office/powerpoint/2010/main" val="1062037028"/>
+        <p14:creationId xmlns:p14="http://schemas.microsoft.com/office/powerpoint/2010/main" val="715668668"/>
       </p:ext>
     </p:extLst>
   </p:cSld>
   <p:clrMap bg1="lt1" tx1="dk1" bg2="lt2" tx2="dk2" accent1="accent1" accent2="accent2" accent3="accent3" accent4="accent4" accent5="accent5" accent6="accent6" hlink="hlink" folHlink="folHlink"/>
   <p:sldLayoutIdLst>
-    <p:sldLayoutId id="2147483649" r:id="rId1"/>
-    <p:sldLayoutId id="2147483650" r:id="rId2"/>
-    <p:sldLayoutId id="2147483651" r:id="rId3"/>
-    <p:sldLayoutId id="2147483652" r:id="rId4"/>
-    <p:sldLayoutId id="2147483653" r:id="rId5"/>
-    <p:sldLayoutId id="2147483654" r:id="rId6"/>
-    <p:sldLayoutId id="2147483655" r:id="rId7"/>
-    <p:sldLayoutId id="2147483656" r:id="rId8"/>
-    <p:sldLayoutId id="2147483657" r:id="rId9"/>
-    <p:sldLayoutId id="2147483658" r:id="rId10"/>
-    <p:sldLayoutId id="2147483659" r:id="rId11"/>
+    <p:sldLayoutId id="2147483661" r:id="rId1"/>
+    <p:sldLayoutId id="2147483662" r:id="rId2"/>
+    <p:sldLayoutId id="2147483663" r:id="rId3"/>
+    <p:sldLayoutId id="2147483664" r:id="rId4"/>
+    <p:sldLayoutId id="2147483665" r:id="rId5"/>
+    <p:sldLayoutId id="2147483666" r:id="rId6"/>
+    <p:sldLayoutId id="2147483667" r:id="rId7"/>
+    <p:sldLayoutId id="2147483668" r:id="rId8"/>
+    <p:sldLayoutId id="2147483669" r:id="rId9"/>
+    <p:sldLayoutId id="2147483670" r:id="rId10"/>
+    <p:sldLayoutId id="2147483671" r:id="rId11"/>
   </p:sldLayoutIdLst>
+  <p:timing>
+    <p:tnLst>
+      <p:par>
+        <p:cTn id="1" dur="indefinite" restart="never" nodeType="tmRoot"/>
+      </p:par>
+    </p:tnLst>
+  </p:timing>
   <p:txStyles>
     <p:titleStyle>
       <a:lvl1pPr algn="ctr" defTabSz="914400" rtl="0" eaLnBrk="1" latinLnBrk="0" hangingPunct="1">
@@ -3105,36 +4856,6 @@
       </p:grpSpPr>
       <p:sp>
         <p:nvSpPr>
-          <p:cNvPr id="2" name="Title 1"/>
-          <p:cNvSpPr>
-            <a:spLocks noGrp="1"/>
-          </p:cNvSpPr>
-          <p:nvPr>
-            <p:ph type="ctrTitle"/>
-          </p:nvPr>
-        </p:nvSpPr>
-        <p:spPr/>
-        <p:txBody>
-          <a:bodyPr/>
-          <a:lstStyle/>
-          <a:p>
-            <a:r>
-              <a:rPr lang="en-US" dirty="0" smtClean="0"/>
-              <a:t>Lesson 4</a:t>
-            </a:r>
-            <a:br>
-              <a:rPr lang="en-US" dirty="0" smtClean="0"/>
-            </a:br>
-            <a:r>
-              <a:rPr lang="en-US" dirty="0" smtClean="0"/>
-              <a:t>Chapters 7-8</a:t>
-            </a:r>
-            <a:endParaRPr lang="en-US" dirty="0"/>
-          </a:p>
-        </p:txBody>
-      </p:sp>
-      <p:sp>
-        <p:nvSpPr>
           <p:cNvPr id="3" name="Subtitle 2"/>
           <p:cNvSpPr>
             <a:spLocks noGrp="1"/>
@@ -3175,6 +4896,38 @@
             <a:r>
               <a:rPr lang="en-US" dirty="0" smtClean="0"/>
               <a:t>UML</a:t>
+            </a:r>
+            <a:endParaRPr lang="en-US" dirty="0"/>
+          </a:p>
+        </p:txBody>
+      </p:sp>
+      <p:sp>
+        <p:nvSpPr>
+          <p:cNvPr id="2" name="Title 1"/>
+          <p:cNvSpPr>
+            <a:spLocks noGrp="1"/>
+          </p:cNvSpPr>
+          <p:nvPr>
+            <p:ph type="title"/>
+          </p:nvPr>
+        </p:nvSpPr>
+        <p:spPr/>
+        <p:txBody>
+          <a:bodyPr>
+            <a:normAutofit fontScale="90000"/>
+          </a:bodyPr>
+          <a:lstStyle/>
+          <a:p>
+            <a:r>
+              <a:rPr lang="en-US" dirty="0" smtClean="0"/>
+              <a:t>Lesson 4</a:t>
+            </a:r>
+            <a:br>
+              <a:rPr lang="en-US" dirty="0" smtClean="0"/>
+            </a:br>
+            <a:r>
+              <a:rPr lang="en-US" dirty="0" smtClean="0"/>
+              <a:t>Chapters 7-8</a:t>
             </a:r>
             <a:endParaRPr lang="en-US" dirty="0"/>
           </a:p>
@@ -3200,7 +4953,7 @@
 </p:sld>
 </file>
 
-<file path=ppt/slides/slide2.xml><?xml version="1.0" encoding="utf-8"?>
+<file path=ppt/slides/slide10.xml><?xml version="1.0" encoding="utf-8"?>
 <p:sld xmlns:a="http://schemas.openxmlformats.org/drawingml/2006/main" xmlns:r="http://schemas.openxmlformats.org/officeDocument/2006/relationships" xmlns:p="http://schemas.openxmlformats.org/presentationml/2006/main">
   <p:cSld>
     <p:spTree>
@@ -3224,7 +4977,816 @@
             <a:spLocks noGrp="1"/>
           </p:cNvSpPr>
           <p:nvPr>
-            <p:ph type="ctrTitle"/>
+            <p:ph type="title"/>
+          </p:nvPr>
+        </p:nvSpPr>
+        <p:spPr/>
+        <p:txBody>
+          <a:bodyPr/>
+          <a:lstStyle/>
+          <a:p>
+            <a:r>
+              <a:rPr lang="en-US" dirty="0" smtClean="0"/>
+              <a:t>Catch order</a:t>
+            </a:r>
+            <a:endParaRPr lang="en-US" dirty="0"/>
+          </a:p>
+        </p:txBody>
+      </p:sp>
+      <p:pic>
+        <p:nvPicPr>
+          <p:cNvPr id="8194" name="Picture 2"/>
+          <p:cNvPicPr>
+            <a:picLocks noChangeAspect="1" noChangeArrowheads="1"/>
+          </p:cNvPicPr>
+          <p:nvPr/>
+        </p:nvPicPr>
+        <p:blipFill>
+          <a:blip r:embed="rId3">
+            <a:extLst>
+              <a:ext uri="{28A0092B-C50C-407E-A947-70E740481C1C}">
+                <a14:useLocalDpi xmlns:a14="http://schemas.microsoft.com/office/drawing/2010/main" val="0"/>
+              </a:ext>
+            </a:extLst>
+          </a:blip>
+          <a:srcRect/>
+          <a:stretch>
+            <a:fillRect/>
+          </a:stretch>
+        </p:blipFill>
+        <p:spPr bwMode="auto">
+          <a:xfrm>
+            <a:off x="228600" y="1909996"/>
+            <a:ext cx="8827212" cy="2628900"/>
+          </a:xfrm>
+          <a:prstGeom prst="rect">
+            <a:avLst/>
+          </a:prstGeom>
+          <a:noFill/>
+          <a:ln>
+            <a:noFill/>
+          </a:ln>
+          <a:extLst>
+            <a:ext uri="{909E8E84-426E-40DD-AFC4-6F175D3DCCD1}">
+              <a14:hiddenFill xmlns:a14="http://schemas.microsoft.com/office/drawing/2010/main">
+                <a:solidFill>
+                  <a:schemeClr val="accent1"/>
+                </a:solidFill>
+              </a14:hiddenFill>
+            </a:ext>
+            <a:ext uri="{91240B29-F687-4F45-9708-019B960494DF}">
+              <a14:hiddenLine xmlns:a14="http://schemas.microsoft.com/office/drawing/2010/main" w="9525">
+                <a:solidFill>
+                  <a:schemeClr val="tx1"/>
+                </a:solidFill>
+                <a:miter lim="800000"/>
+                <a:headEnd/>
+                <a:tailEnd/>
+              </a14:hiddenLine>
+            </a:ext>
+          </a:extLst>
+        </p:spPr>
+      </p:pic>
+    </p:spTree>
+    <p:extLst>
+      <p:ext uri="{BB962C8B-B14F-4D97-AF65-F5344CB8AC3E}">
+        <p14:creationId xmlns:p14="http://schemas.microsoft.com/office/powerpoint/2010/main" val="3312973039"/>
+      </p:ext>
+    </p:extLst>
+  </p:cSld>
+  <p:clrMapOvr>
+    <a:masterClrMapping/>
+  </p:clrMapOvr>
+  <p:timing>
+    <p:tnLst>
+      <p:par>
+        <p:cTn id="1" dur="indefinite" restart="never" nodeType="tmRoot"/>
+      </p:par>
+    </p:tnLst>
+  </p:timing>
+</p:sld>
+</file>
+
+<file path=ppt/slides/slide11.xml><?xml version="1.0" encoding="utf-8"?>
+<p:sld xmlns:a="http://schemas.openxmlformats.org/drawingml/2006/main" xmlns:r="http://schemas.openxmlformats.org/officeDocument/2006/relationships" xmlns:p="http://schemas.openxmlformats.org/presentationml/2006/main">
+  <p:cSld>
+    <p:spTree>
+      <p:nvGrpSpPr>
+        <p:cNvPr id="1" name=""/>
+        <p:cNvGrpSpPr/>
+        <p:nvPr/>
+      </p:nvGrpSpPr>
+      <p:grpSpPr>
+        <a:xfrm>
+          <a:off x="0" y="0"/>
+          <a:ext cx="0" cy="0"/>
+          <a:chOff x="0" y="0"/>
+          <a:chExt cx="0" cy="0"/>
+        </a:xfrm>
+      </p:grpSpPr>
+      <p:sp>
+        <p:nvSpPr>
+          <p:cNvPr id="2" name="Title 1"/>
+          <p:cNvSpPr>
+            <a:spLocks noGrp="1"/>
+          </p:cNvSpPr>
+          <p:nvPr>
+            <p:ph type="title"/>
+          </p:nvPr>
+        </p:nvSpPr>
+        <p:spPr/>
+        <p:txBody>
+          <a:bodyPr/>
+          <a:lstStyle/>
+          <a:p>
+            <a:r>
+              <a:rPr lang="en-US" dirty="0" smtClean="0"/>
+              <a:t>Throws</a:t>
+            </a:r>
+            <a:endParaRPr lang="en-US" dirty="0"/>
+          </a:p>
+        </p:txBody>
+      </p:sp>
+      <p:pic>
+        <p:nvPicPr>
+          <p:cNvPr id="9218" name="Picture 2"/>
+          <p:cNvPicPr>
+            <a:picLocks noChangeAspect="1" noChangeArrowheads="1"/>
+          </p:cNvPicPr>
+          <p:nvPr/>
+        </p:nvPicPr>
+        <p:blipFill>
+          <a:blip r:embed="rId3">
+            <a:extLst>
+              <a:ext uri="{28A0092B-C50C-407E-A947-70E740481C1C}">
+                <a14:useLocalDpi xmlns:a14="http://schemas.microsoft.com/office/drawing/2010/main" val="0"/>
+              </a:ext>
+            </a:extLst>
+          </a:blip>
+          <a:srcRect/>
+          <a:stretch>
+            <a:fillRect/>
+          </a:stretch>
+        </p:blipFill>
+        <p:spPr bwMode="auto">
+          <a:xfrm>
+            <a:off x="838200" y="2209800"/>
+            <a:ext cx="8086725" cy="2157413"/>
+          </a:xfrm>
+          <a:prstGeom prst="rect">
+            <a:avLst/>
+          </a:prstGeom>
+          <a:noFill/>
+          <a:ln>
+            <a:noFill/>
+          </a:ln>
+          <a:extLst>
+            <a:ext uri="{909E8E84-426E-40DD-AFC4-6F175D3DCCD1}">
+              <a14:hiddenFill xmlns:a14="http://schemas.microsoft.com/office/drawing/2010/main">
+                <a:solidFill>
+                  <a:schemeClr val="accent1"/>
+                </a:solidFill>
+              </a14:hiddenFill>
+            </a:ext>
+            <a:ext uri="{91240B29-F687-4F45-9708-019B960494DF}">
+              <a14:hiddenLine xmlns:a14="http://schemas.microsoft.com/office/drawing/2010/main" w="9525">
+                <a:solidFill>
+                  <a:schemeClr val="tx1"/>
+                </a:solidFill>
+                <a:miter lim="800000"/>
+                <a:headEnd/>
+                <a:tailEnd/>
+              </a14:hiddenLine>
+            </a:ext>
+          </a:extLst>
+        </p:spPr>
+      </p:pic>
+    </p:spTree>
+    <p:extLst>
+      <p:ext uri="{BB962C8B-B14F-4D97-AF65-F5344CB8AC3E}">
+        <p14:creationId xmlns:p14="http://schemas.microsoft.com/office/powerpoint/2010/main" val="3923226090"/>
+      </p:ext>
+    </p:extLst>
+  </p:cSld>
+  <p:clrMapOvr>
+    <a:masterClrMapping/>
+  </p:clrMapOvr>
+  <p:timing>
+    <p:tnLst>
+      <p:par>
+        <p:cTn id="1" dur="indefinite" restart="never" nodeType="tmRoot"/>
+      </p:par>
+    </p:tnLst>
+  </p:timing>
+</p:sld>
+</file>
+
+<file path=ppt/slides/slide12.xml><?xml version="1.0" encoding="utf-8"?>
+<p:sld xmlns:a="http://schemas.openxmlformats.org/drawingml/2006/main" xmlns:r="http://schemas.openxmlformats.org/officeDocument/2006/relationships" xmlns:p="http://schemas.openxmlformats.org/presentationml/2006/main">
+  <p:cSld>
+    <p:spTree>
+      <p:nvGrpSpPr>
+        <p:cNvPr id="1" name=""/>
+        <p:cNvGrpSpPr/>
+        <p:nvPr/>
+      </p:nvGrpSpPr>
+      <p:grpSpPr>
+        <a:xfrm>
+          <a:off x="0" y="0"/>
+          <a:ext cx="0" cy="0"/>
+          <a:chOff x="0" y="0"/>
+          <a:chExt cx="0" cy="0"/>
+        </a:xfrm>
+      </p:grpSpPr>
+      <p:sp>
+        <p:nvSpPr>
+          <p:cNvPr id="2" name="Title 1"/>
+          <p:cNvSpPr>
+            <a:spLocks noGrp="1"/>
+          </p:cNvSpPr>
+          <p:nvPr>
+            <p:ph type="title"/>
+          </p:nvPr>
+        </p:nvSpPr>
+        <p:spPr/>
+        <p:txBody>
+          <a:bodyPr/>
+          <a:lstStyle/>
+          <a:p>
+            <a:r>
+              <a:rPr lang="en-US" dirty="0" smtClean="0"/>
+              <a:t>Throw</a:t>
+            </a:r>
+            <a:endParaRPr lang="en-US" dirty="0"/>
+          </a:p>
+        </p:txBody>
+      </p:sp>
+      <p:pic>
+        <p:nvPicPr>
+          <p:cNvPr id="10242" name="Picture 2"/>
+          <p:cNvPicPr>
+            <a:picLocks noChangeAspect="1" noChangeArrowheads="1"/>
+          </p:cNvPicPr>
+          <p:nvPr/>
+        </p:nvPicPr>
+        <p:blipFill>
+          <a:blip r:embed="rId3">
+            <a:extLst>
+              <a:ext uri="{28A0092B-C50C-407E-A947-70E740481C1C}">
+                <a14:useLocalDpi xmlns:a14="http://schemas.microsoft.com/office/drawing/2010/main" val="0"/>
+              </a:ext>
+            </a:extLst>
+          </a:blip>
+          <a:srcRect/>
+          <a:stretch>
+            <a:fillRect/>
+          </a:stretch>
+        </p:blipFill>
+        <p:spPr bwMode="auto">
+          <a:xfrm>
+            <a:off x="609600" y="1524000"/>
+            <a:ext cx="6267450" cy="2505075"/>
+          </a:xfrm>
+          <a:prstGeom prst="rect">
+            <a:avLst/>
+          </a:prstGeom>
+          <a:noFill/>
+          <a:ln>
+            <a:noFill/>
+          </a:ln>
+          <a:extLst>
+            <a:ext uri="{909E8E84-426E-40DD-AFC4-6F175D3DCCD1}">
+              <a14:hiddenFill xmlns:a14="http://schemas.microsoft.com/office/drawing/2010/main">
+                <a:solidFill>
+                  <a:schemeClr val="accent1"/>
+                </a:solidFill>
+              </a14:hiddenFill>
+            </a:ext>
+            <a:ext uri="{91240B29-F687-4F45-9708-019B960494DF}">
+              <a14:hiddenLine xmlns:a14="http://schemas.microsoft.com/office/drawing/2010/main" w="9525">
+                <a:solidFill>
+                  <a:schemeClr val="tx1"/>
+                </a:solidFill>
+                <a:miter lim="800000"/>
+                <a:headEnd/>
+                <a:tailEnd/>
+              </a14:hiddenLine>
+            </a:ext>
+          </a:extLst>
+        </p:spPr>
+      </p:pic>
+      <p:pic>
+        <p:nvPicPr>
+          <p:cNvPr id="10243" name="Picture 3"/>
+          <p:cNvPicPr>
+            <a:picLocks noChangeAspect="1" noChangeArrowheads="1"/>
+          </p:cNvPicPr>
+          <p:nvPr/>
+        </p:nvPicPr>
+        <p:blipFill>
+          <a:blip r:embed="rId4">
+            <a:extLst>
+              <a:ext uri="{28A0092B-C50C-407E-A947-70E740481C1C}">
+                <a14:useLocalDpi xmlns:a14="http://schemas.microsoft.com/office/drawing/2010/main" val="0"/>
+              </a:ext>
+            </a:extLst>
+          </a:blip>
+          <a:srcRect/>
+          <a:stretch>
+            <a:fillRect/>
+          </a:stretch>
+        </p:blipFill>
+        <p:spPr bwMode="auto">
+          <a:xfrm>
+            <a:off x="3048000" y="4100747"/>
+            <a:ext cx="5019675" cy="2228850"/>
+          </a:xfrm>
+          <a:prstGeom prst="rect">
+            <a:avLst/>
+          </a:prstGeom>
+          <a:noFill/>
+          <a:ln>
+            <a:noFill/>
+          </a:ln>
+          <a:extLst>
+            <a:ext uri="{909E8E84-426E-40DD-AFC4-6F175D3DCCD1}">
+              <a14:hiddenFill xmlns:a14="http://schemas.microsoft.com/office/drawing/2010/main">
+                <a:solidFill>
+                  <a:schemeClr val="accent1"/>
+                </a:solidFill>
+              </a14:hiddenFill>
+            </a:ext>
+            <a:ext uri="{91240B29-F687-4F45-9708-019B960494DF}">
+              <a14:hiddenLine xmlns:a14="http://schemas.microsoft.com/office/drawing/2010/main" w="9525">
+                <a:solidFill>
+                  <a:schemeClr val="tx1"/>
+                </a:solidFill>
+                <a:miter lim="800000"/>
+                <a:headEnd/>
+                <a:tailEnd/>
+              </a14:hiddenLine>
+            </a:ext>
+          </a:extLst>
+        </p:spPr>
+      </p:pic>
+    </p:spTree>
+    <p:extLst>
+      <p:ext uri="{BB962C8B-B14F-4D97-AF65-F5344CB8AC3E}">
+        <p14:creationId xmlns:p14="http://schemas.microsoft.com/office/powerpoint/2010/main" val="2748588641"/>
+      </p:ext>
+    </p:extLst>
+  </p:cSld>
+  <p:clrMapOvr>
+    <a:masterClrMapping/>
+  </p:clrMapOvr>
+  <p:timing>
+    <p:tnLst>
+      <p:par>
+        <p:cTn id="1" dur="indefinite" restart="never" nodeType="tmRoot"/>
+      </p:par>
+    </p:tnLst>
+  </p:timing>
+</p:sld>
+</file>
+
+<file path=ppt/slides/slide13.xml><?xml version="1.0" encoding="utf-8"?>
+<p:sld xmlns:a="http://schemas.openxmlformats.org/drawingml/2006/main" xmlns:r="http://schemas.openxmlformats.org/officeDocument/2006/relationships" xmlns:p="http://schemas.openxmlformats.org/presentationml/2006/main">
+  <p:cSld>
+    <p:spTree>
+      <p:nvGrpSpPr>
+        <p:cNvPr id="1" name=""/>
+        <p:cNvGrpSpPr/>
+        <p:nvPr/>
+      </p:nvGrpSpPr>
+      <p:grpSpPr>
+        <a:xfrm>
+          <a:off x="0" y="0"/>
+          <a:ext cx="0" cy="0"/>
+          <a:chOff x="0" y="0"/>
+          <a:chExt cx="0" cy="0"/>
+        </a:xfrm>
+      </p:grpSpPr>
+      <p:sp>
+        <p:nvSpPr>
+          <p:cNvPr id="2" name="Title 1"/>
+          <p:cNvSpPr>
+            <a:spLocks noGrp="1"/>
+          </p:cNvSpPr>
+          <p:nvPr>
+            <p:ph type="title"/>
+          </p:nvPr>
+        </p:nvSpPr>
+        <p:spPr/>
+        <p:txBody>
+          <a:bodyPr/>
+          <a:lstStyle/>
+          <a:p>
+            <a:r>
+              <a:rPr lang="en-US" dirty="0" smtClean="0"/>
+              <a:t>Finally</a:t>
+            </a:r>
+            <a:endParaRPr lang="en-US" dirty="0"/>
+          </a:p>
+        </p:txBody>
+      </p:sp>
+      <p:pic>
+        <p:nvPicPr>
+          <p:cNvPr id="11266" name="Picture 2"/>
+          <p:cNvPicPr>
+            <a:picLocks noChangeAspect="1" noChangeArrowheads="1"/>
+          </p:cNvPicPr>
+          <p:nvPr/>
+        </p:nvPicPr>
+        <p:blipFill>
+          <a:blip r:embed="rId3">
+            <a:extLst>
+              <a:ext uri="{28A0092B-C50C-407E-A947-70E740481C1C}">
+                <a14:useLocalDpi xmlns:a14="http://schemas.microsoft.com/office/drawing/2010/main" val="0"/>
+              </a:ext>
+            </a:extLst>
+          </a:blip>
+          <a:srcRect/>
+          <a:stretch>
+            <a:fillRect/>
+          </a:stretch>
+        </p:blipFill>
+        <p:spPr bwMode="auto">
+          <a:xfrm>
+            <a:off x="838200" y="1828800"/>
+            <a:ext cx="5038725" cy="1495425"/>
+          </a:xfrm>
+          <a:prstGeom prst="rect">
+            <a:avLst/>
+          </a:prstGeom>
+          <a:noFill/>
+          <a:ln>
+            <a:noFill/>
+          </a:ln>
+          <a:extLst>
+            <a:ext uri="{909E8E84-426E-40DD-AFC4-6F175D3DCCD1}">
+              <a14:hiddenFill xmlns:a14="http://schemas.microsoft.com/office/drawing/2010/main">
+                <a:solidFill>
+                  <a:schemeClr val="accent1"/>
+                </a:solidFill>
+              </a14:hiddenFill>
+            </a:ext>
+            <a:ext uri="{91240B29-F687-4F45-9708-019B960494DF}">
+              <a14:hiddenLine xmlns:a14="http://schemas.microsoft.com/office/drawing/2010/main" w="9525">
+                <a:solidFill>
+                  <a:schemeClr val="tx1"/>
+                </a:solidFill>
+                <a:miter lim="800000"/>
+                <a:headEnd/>
+                <a:tailEnd/>
+              </a14:hiddenLine>
+            </a:ext>
+          </a:extLst>
+        </p:spPr>
+      </p:pic>
+      <p:pic>
+        <p:nvPicPr>
+          <p:cNvPr id="11267" name="Picture 3"/>
+          <p:cNvPicPr>
+            <a:picLocks noChangeAspect="1" noChangeArrowheads="1"/>
+          </p:cNvPicPr>
+          <p:nvPr/>
+        </p:nvPicPr>
+        <p:blipFill>
+          <a:blip r:embed="rId4">
+            <a:extLst>
+              <a:ext uri="{28A0092B-C50C-407E-A947-70E740481C1C}">
+                <a14:useLocalDpi xmlns:a14="http://schemas.microsoft.com/office/drawing/2010/main" val="0"/>
+              </a:ext>
+            </a:extLst>
+          </a:blip>
+          <a:srcRect/>
+          <a:stretch>
+            <a:fillRect/>
+          </a:stretch>
+        </p:blipFill>
+        <p:spPr bwMode="auto">
+          <a:xfrm>
+            <a:off x="3048000" y="3657600"/>
+            <a:ext cx="4924425" cy="2286000"/>
+          </a:xfrm>
+          <a:prstGeom prst="rect">
+            <a:avLst/>
+          </a:prstGeom>
+          <a:noFill/>
+          <a:ln>
+            <a:noFill/>
+          </a:ln>
+          <a:extLst>
+            <a:ext uri="{909E8E84-426E-40DD-AFC4-6F175D3DCCD1}">
+              <a14:hiddenFill xmlns:a14="http://schemas.microsoft.com/office/drawing/2010/main">
+                <a:solidFill>
+                  <a:schemeClr val="accent1"/>
+                </a:solidFill>
+              </a14:hiddenFill>
+            </a:ext>
+            <a:ext uri="{91240B29-F687-4F45-9708-019B960494DF}">
+              <a14:hiddenLine xmlns:a14="http://schemas.microsoft.com/office/drawing/2010/main" w="9525">
+                <a:solidFill>
+                  <a:schemeClr val="tx1"/>
+                </a:solidFill>
+                <a:miter lim="800000"/>
+                <a:headEnd/>
+                <a:tailEnd/>
+              </a14:hiddenLine>
+            </a:ext>
+          </a:extLst>
+        </p:spPr>
+      </p:pic>
+    </p:spTree>
+    <p:extLst>
+      <p:ext uri="{BB962C8B-B14F-4D97-AF65-F5344CB8AC3E}">
+        <p14:creationId xmlns:p14="http://schemas.microsoft.com/office/powerpoint/2010/main" val="3489605814"/>
+      </p:ext>
+    </p:extLst>
+  </p:cSld>
+  <p:clrMapOvr>
+    <a:masterClrMapping/>
+  </p:clrMapOvr>
+  <p:timing>
+    <p:tnLst>
+      <p:par>
+        <p:cTn id="1" dur="indefinite" restart="never" nodeType="tmRoot"/>
+      </p:par>
+    </p:tnLst>
+  </p:timing>
+</p:sld>
+</file>
+
+<file path=ppt/slides/slide14.xml><?xml version="1.0" encoding="utf-8"?>
+<p:sld xmlns:a="http://schemas.openxmlformats.org/drawingml/2006/main" xmlns:r="http://schemas.openxmlformats.org/officeDocument/2006/relationships" xmlns:p="http://schemas.openxmlformats.org/presentationml/2006/main">
+  <p:cSld>
+    <p:spTree>
+      <p:nvGrpSpPr>
+        <p:cNvPr id="1" name=""/>
+        <p:cNvGrpSpPr/>
+        <p:nvPr/>
+      </p:nvGrpSpPr>
+      <p:grpSpPr>
+        <a:xfrm>
+          <a:off x="0" y="0"/>
+          <a:ext cx="0" cy="0"/>
+          <a:chOff x="0" y="0"/>
+          <a:chExt cx="0" cy="0"/>
+        </a:xfrm>
+      </p:grpSpPr>
+      <p:sp>
+        <p:nvSpPr>
+          <p:cNvPr id="2" name="Title 1"/>
+          <p:cNvSpPr>
+            <a:spLocks noGrp="1"/>
+          </p:cNvSpPr>
+          <p:nvPr>
+            <p:ph type="title"/>
+          </p:nvPr>
+        </p:nvSpPr>
+        <p:spPr/>
+        <p:txBody>
+          <a:bodyPr/>
+          <a:lstStyle/>
+          <a:p>
+            <a:r>
+              <a:rPr lang="en-US" dirty="0" smtClean="0"/>
+              <a:t>Create your own</a:t>
+            </a:r>
+            <a:endParaRPr lang="en-US" dirty="0"/>
+          </a:p>
+        </p:txBody>
+      </p:sp>
+      <p:pic>
+        <p:nvPicPr>
+          <p:cNvPr id="12290" name="Picture 2"/>
+          <p:cNvPicPr>
+            <a:picLocks noChangeAspect="1" noChangeArrowheads="1"/>
+          </p:cNvPicPr>
+          <p:nvPr/>
+        </p:nvPicPr>
+        <p:blipFill>
+          <a:blip r:embed="rId3">
+            <a:extLst>
+              <a:ext uri="{28A0092B-C50C-407E-A947-70E740481C1C}">
+                <a14:useLocalDpi xmlns:a14="http://schemas.microsoft.com/office/drawing/2010/main" val="0"/>
+              </a:ext>
+            </a:extLst>
+          </a:blip>
+          <a:srcRect/>
+          <a:stretch>
+            <a:fillRect/>
+          </a:stretch>
+        </p:blipFill>
+        <p:spPr bwMode="auto">
+          <a:xfrm>
+            <a:off x="762000" y="1752600"/>
+            <a:ext cx="4905375" cy="1200150"/>
+          </a:xfrm>
+          <a:prstGeom prst="rect">
+            <a:avLst/>
+          </a:prstGeom>
+          <a:noFill/>
+          <a:ln>
+            <a:noFill/>
+          </a:ln>
+          <a:extLst>
+            <a:ext uri="{909E8E84-426E-40DD-AFC4-6F175D3DCCD1}">
+              <a14:hiddenFill xmlns:a14="http://schemas.microsoft.com/office/drawing/2010/main">
+                <a:solidFill>
+                  <a:schemeClr val="accent1"/>
+                </a:solidFill>
+              </a14:hiddenFill>
+            </a:ext>
+            <a:ext uri="{91240B29-F687-4F45-9708-019B960494DF}">
+              <a14:hiddenLine xmlns:a14="http://schemas.microsoft.com/office/drawing/2010/main" w="9525">
+                <a:solidFill>
+                  <a:schemeClr val="tx1"/>
+                </a:solidFill>
+                <a:miter lim="800000"/>
+                <a:headEnd/>
+                <a:tailEnd/>
+              </a14:hiddenLine>
+            </a:ext>
+          </a:extLst>
+        </p:spPr>
+      </p:pic>
+      <p:pic>
+        <p:nvPicPr>
+          <p:cNvPr id="12291" name="Picture 3"/>
+          <p:cNvPicPr>
+            <a:picLocks noChangeAspect="1" noChangeArrowheads="1"/>
+          </p:cNvPicPr>
+          <p:nvPr/>
+        </p:nvPicPr>
+        <p:blipFill>
+          <a:blip r:embed="rId4">
+            <a:extLst>
+              <a:ext uri="{28A0092B-C50C-407E-A947-70E740481C1C}">
+                <a14:useLocalDpi xmlns:a14="http://schemas.microsoft.com/office/drawing/2010/main" val="0"/>
+              </a:ext>
+            </a:extLst>
+          </a:blip>
+          <a:srcRect/>
+          <a:stretch>
+            <a:fillRect/>
+          </a:stretch>
+        </p:blipFill>
+        <p:spPr bwMode="auto">
+          <a:xfrm>
+            <a:off x="1752600" y="3048000"/>
+            <a:ext cx="4943475" cy="1476375"/>
+          </a:xfrm>
+          <a:prstGeom prst="rect">
+            <a:avLst/>
+          </a:prstGeom>
+          <a:noFill/>
+          <a:ln>
+            <a:noFill/>
+          </a:ln>
+          <a:extLst>
+            <a:ext uri="{909E8E84-426E-40DD-AFC4-6F175D3DCCD1}">
+              <a14:hiddenFill xmlns:a14="http://schemas.microsoft.com/office/drawing/2010/main">
+                <a:solidFill>
+                  <a:schemeClr val="accent1"/>
+                </a:solidFill>
+              </a14:hiddenFill>
+            </a:ext>
+            <a:ext uri="{91240B29-F687-4F45-9708-019B960494DF}">
+              <a14:hiddenLine xmlns:a14="http://schemas.microsoft.com/office/drawing/2010/main" w="9525">
+                <a:solidFill>
+                  <a:schemeClr val="tx1"/>
+                </a:solidFill>
+                <a:miter lim="800000"/>
+                <a:headEnd/>
+                <a:tailEnd/>
+              </a14:hiddenLine>
+            </a:ext>
+          </a:extLst>
+        </p:spPr>
+      </p:pic>
+      <p:pic>
+        <p:nvPicPr>
+          <p:cNvPr id="12292" name="Picture 4"/>
+          <p:cNvPicPr>
+            <a:picLocks noChangeAspect="1" noChangeArrowheads="1"/>
+          </p:cNvPicPr>
+          <p:nvPr/>
+        </p:nvPicPr>
+        <p:blipFill>
+          <a:blip r:embed="rId5">
+            <a:extLst>
+              <a:ext uri="{28A0092B-C50C-407E-A947-70E740481C1C}">
+                <a14:useLocalDpi xmlns:a14="http://schemas.microsoft.com/office/drawing/2010/main" val="0"/>
+              </a:ext>
+            </a:extLst>
+          </a:blip>
+          <a:srcRect/>
+          <a:stretch>
+            <a:fillRect/>
+          </a:stretch>
+        </p:blipFill>
+        <p:spPr bwMode="auto">
+          <a:xfrm>
+            <a:off x="2971800" y="4724400"/>
+            <a:ext cx="4619625" cy="1466850"/>
+          </a:xfrm>
+          <a:prstGeom prst="rect">
+            <a:avLst/>
+          </a:prstGeom>
+          <a:noFill/>
+          <a:ln>
+            <a:noFill/>
+          </a:ln>
+          <a:extLst>
+            <a:ext uri="{909E8E84-426E-40DD-AFC4-6F175D3DCCD1}">
+              <a14:hiddenFill xmlns:a14="http://schemas.microsoft.com/office/drawing/2010/main">
+                <a:solidFill>
+                  <a:schemeClr val="accent1"/>
+                </a:solidFill>
+              </a14:hiddenFill>
+            </a:ext>
+            <a:ext uri="{91240B29-F687-4F45-9708-019B960494DF}">
+              <a14:hiddenLine xmlns:a14="http://schemas.microsoft.com/office/drawing/2010/main" w="9525">
+                <a:solidFill>
+                  <a:schemeClr val="tx1"/>
+                </a:solidFill>
+                <a:miter lim="800000"/>
+                <a:headEnd/>
+                <a:tailEnd/>
+              </a14:hiddenLine>
+            </a:ext>
+          </a:extLst>
+        </p:spPr>
+      </p:pic>
+    </p:spTree>
+    <p:extLst>
+      <p:ext uri="{BB962C8B-B14F-4D97-AF65-F5344CB8AC3E}">
+        <p14:creationId xmlns:p14="http://schemas.microsoft.com/office/powerpoint/2010/main" val="123452926"/>
+      </p:ext>
+    </p:extLst>
+  </p:cSld>
+  <p:clrMapOvr>
+    <a:masterClrMapping/>
+  </p:clrMapOvr>
+  <p:timing>
+    <p:tnLst>
+      <p:par>
+        <p:cTn id="1" dur="indefinite" restart="never" nodeType="tmRoot"/>
+      </p:par>
+    </p:tnLst>
+  </p:timing>
+</p:sld>
+</file>
+
+<file path=ppt/slides/slide15.xml><?xml version="1.0" encoding="utf-8"?>
+<p:sld xmlns:a="http://schemas.openxmlformats.org/drawingml/2006/main" xmlns:r="http://schemas.openxmlformats.org/officeDocument/2006/relationships" xmlns:p="http://schemas.openxmlformats.org/presentationml/2006/main">
+  <p:cSld>
+    <p:spTree>
+      <p:nvGrpSpPr>
+        <p:cNvPr id="1" name=""/>
+        <p:cNvGrpSpPr/>
+        <p:nvPr/>
+      </p:nvGrpSpPr>
+      <p:grpSpPr>
+        <a:xfrm>
+          <a:off x="0" y="0"/>
+          <a:ext cx="0" cy="0"/>
+          <a:chOff x="0" y="0"/>
+          <a:chExt cx="0" cy="0"/>
+        </a:xfrm>
+      </p:grpSpPr>
+      <p:sp>
+        <p:nvSpPr>
+          <p:cNvPr id="3" name="Subtitle 2"/>
+          <p:cNvSpPr>
+            <a:spLocks noGrp="1"/>
+          </p:cNvSpPr>
+          <p:nvPr>
+            <p:ph type="subTitle" idx="1"/>
+          </p:nvPr>
+        </p:nvSpPr>
+        <p:spPr/>
+        <p:txBody>
+          <a:bodyPr/>
+          <a:lstStyle/>
+          <a:p>
+            <a:r>
+              <a:rPr lang="en-US" dirty="0" smtClean="0"/>
+              <a:t> Class Diagram</a:t>
+            </a:r>
+            <a:endParaRPr lang="en-US" dirty="0"/>
+          </a:p>
+        </p:txBody>
+      </p:sp>
+      <p:sp>
+        <p:nvSpPr>
+          <p:cNvPr id="2" name="Title 1"/>
+          <p:cNvSpPr>
+            <a:spLocks noGrp="1"/>
+          </p:cNvSpPr>
+          <p:nvPr>
+            <p:ph type="title"/>
           </p:nvPr>
         </p:nvSpPr>
         <p:spPr/>
@@ -3235,29 +5797,6 @@
             <a:r>
               <a:rPr lang="en-US" dirty="0" smtClean="0"/>
               <a:t>UML</a:t>
-            </a:r>
-            <a:endParaRPr lang="en-US" dirty="0"/>
-          </a:p>
-        </p:txBody>
-      </p:sp>
-      <p:sp>
-        <p:nvSpPr>
-          <p:cNvPr id="3" name="Subtitle 2"/>
-          <p:cNvSpPr>
-            <a:spLocks noGrp="1"/>
-          </p:cNvSpPr>
-          <p:nvPr>
-            <p:ph type="subTitle" idx="1"/>
-          </p:nvPr>
-        </p:nvSpPr>
-        <p:spPr/>
-        <p:txBody>
-          <a:bodyPr/>
-          <a:lstStyle/>
-          <a:p>
-            <a:r>
-              <a:rPr lang="en-US" dirty="0" smtClean="0"/>
-              <a:t> Class Diagram</a:t>
             </a:r>
             <a:endParaRPr lang="en-US" dirty="0"/>
           </a:p>
@@ -3283,7 +5822,7 @@
 </p:sld>
 </file>
 
-<file path=ppt/slides/slide3.xml><?xml version="1.0" encoding="utf-8"?>
+<file path=ppt/slides/slide16.xml><?xml version="1.0" encoding="utf-8"?>
 <p:sld xmlns:a="http://schemas.openxmlformats.org/drawingml/2006/main" xmlns:r="http://schemas.openxmlformats.org/officeDocument/2006/relationships" xmlns:p="http://schemas.openxmlformats.org/presentationml/2006/main">
   <p:cSld>
     <p:spTree>
@@ -3397,7 +5936,7 @@
 </p:sld>
 </file>
 
-<file path=ppt/slides/slide4.xml><?xml version="1.0" encoding="utf-8"?>
+<file path=ppt/slides/slide17.xml><?xml version="1.0" encoding="utf-8"?>
 <p:sld xmlns:a="http://schemas.openxmlformats.org/drawingml/2006/main" xmlns:r="http://schemas.openxmlformats.org/officeDocument/2006/relationships" xmlns:p="http://schemas.openxmlformats.org/presentationml/2006/main">
   <p:cSld>
     <p:spTree>
@@ -3431,11 +5970,7 @@
           <a:p>
             <a:r>
               <a:rPr lang="en-US" dirty="0" smtClean="0"/>
-              <a:t>Generalization – </a:t>
-            </a:r>
-            <a:r>
-              <a:rPr lang="en-US" dirty="0" smtClean="0"/>
-              <a:t>extends</a:t>
+              <a:t>Generalization – extends</a:t>
             </a:r>
             <a:endParaRPr lang="en-US" dirty="0"/>
           </a:p>
@@ -3874,7 +6409,7 @@
 </p:sld>
 </file>
 
-<file path=ppt/slides/slide5.xml><?xml version="1.0" encoding="utf-8"?>
+<file path=ppt/slides/slide18.xml><?xml version="1.0" encoding="utf-8"?>
 <p:sld xmlns:a="http://schemas.openxmlformats.org/drawingml/2006/main" xmlns:r="http://schemas.openxmlformats.org/officeDocument/2006/relationships" xmlns:p="http://schemas.openxmlformats.org/presentationml/2006/main">
   <p:cSld>
     <p:spTree>
@@ -4525,7 +7060,7 @@
 </p:sld>
 </file>
 
-<file path=ppt/slides/slide6.xml><?xml version="1.0" encoding="utf-8"?>
+<file path=ppt/slides/slide19.xml><?xml version="1.0" encoding="utf-8"?>
 <p:sld xmlns:a="http://schemas.openxmlformats.org/drawingml/2006/main" xmlns:r="http://schemas.openxmlformats.org/officeDocument/2006/relationships" xmlns:p="http://schemas.openxmlformats.org/presentationml/2006/main">
   <p:cSld>
     <p:spTree>
@@ -4562,10 +7097,6 @@
             <a:r>
               <a:rPr lang="en-US" dirty="0" smtClean="0"/>
               <a:t>Association </a:t>
-            </a:r>
-            <a:r>
-              <a:rPr lang="en-US" dirty="0" smtClean="0"/>
-              <a:t/>
             </a:r>
             <a:br>
               <a:rPr lang="en-US" dirty="0" smtClean="0"/>
@@ -4911,7 +7442,7 @@
 </p:sld>
 </file>
 
-<file path=ppt/slides/slide7.xml><?xml version="1.0" encoding="utf-8"?>
+<file path=ppt/slides/slide2.xml><?xml version="1.0" encoding="utf-8"?>
 <p:sld xmlns:a="http://schemas.openxmlformats.org/drawingml/2006/main" xmlns:r="http://schemas.openxmlformats.org/officeDocument/2006/relationships" xmlns:p="http://schemas.openxmlformats.org/presentationml/2006/main">
   <p:cSld>
     <p:spTree>
@@ -4930,6 +7461,93 @@
       </p:grpSpPr>
       <p:sp>
         <p:nvSpPr>
+          <p:cNvPr id="2" name="Subtitle 1"/>
+          <p:cNvSpPr>
+            <a:spLocks noGrp="1"/>
+          </p:cNvSpPr>
+          <p:nvPr>
+            <p:ph type="subTitle" idx="1"/>
+          </p:nvPr>
+        </p:nvSpPr>
+        <p:spPr/>
+        <p:txBody>
+          <a:bodyPr/>
+          <a:lstStyle/>
+          <a:p>
+            <a:r>
+              <a:rPr lang="en-US" dirty="0" smtClean="0"/>
+              <a:t>Throwing and catching </a:t>
+            </a:r>
+            <a:r>
+              <a:rPr lang="en-US" dirty="0" err="1" smtClean="0"/>
+              <a:t>Execeptions</a:t>
+            </a:r>
+            <a:endParaRPr lang="en-US" dirty="0"/>
+          </a:p>
+        </p:txBody>
+      </p:sp>
+      <p:sp>
+        <p:nvSpPr>
+          <p:cNvPr id="3" name="Title 2"/>
+          <p:cNvSpPr>
+            <a:spLocks noGrp="1"/>
+          </p:cNvSpPr>
+          <p:nvPr>
+            <p:ph type="title"/>
+          </p:nvPr>
+        </p:nvSpPr>
+        <p:spPr/>
+        <p:txBody>
+          <a:bodyPr/>
+          <a:lstStyle/>
+          <a:p>
+            <a:r>
+              <a:rPr lang="en-US" dirty="0" smtClean="0"/>
+              <a:t>Handling Errors</a:t>
+            </a:r>
+            <a:endParaRPr lang="en-US" dirty="0"/>
+          </a:p>
+        </p:txBody>
+      </p:sp>
+    </p:spTree>
+    <p:extLst>
+      <p:ext uri="{BB962C8B-B14F-4D97-AF65-F5344CB8AC3E}">
+        <p14:creationId xmlns:p14="http://schemas.microsoft.com/office/powerpoint/2010/main" val="4008257455"/>
+      </p:ext>
+    </p:extLst>
+  </p:cSld>
+  <p:clrMapOvr>
+    <a:masterClrMapping/>
+  </p:clrMapOvr>
+  <p:timing>
+    <p:tnLst>
+      <p:par>
+        <p:cTn id="1" dur="indefinite" restart="never" nodeType="tmRoot"/>
+      </p:par>
+    </p:tnLst>
+  </p:timing>
+</p:sld>
+</file>
+
+<file path=ppt/slides/slide20.xml><?xml version="1.0" encoding="utf-8"?>
+<p:sld xmlns:a="http://schemas.openxmlformats.org/drawingml/2006/main" xmlns:r="http://schemas.openxmlformats.org/officeDocument/2006/relationships" xmlns:p="http://schemas.openxmlformats.org/presentationml/2006/main">
+  <p:cSld>
+    <p:spTree>
+      <p:nvGrpSpPr>
+        <p:cNvPr id="1" name=""/>
+        <p:cNvGrpSpPr/>
+        <p:nvPr/>
+      </p:nvGrpSpPr>
+      <p:grpSpPr>
+        <a:xfrm>
+          <a:off x="0" y="0"/>
+          <a:ext cx="0" cy="0"/>
+          <a:chOff x="0" y="0"/>
+          <a:chExt cx="0" cy="0"/>
+        </a:xfrm>
+      </p:grpSpPr>
+      <p:sp>
+        <p:nvSpPr>
           <p:cNvPr id="2" name="Title 1"/>
           <p:cNvSpPr>
             <a:spLocks noGrp="1"/>
@@ -4948,10 +7566,6 @@
             <a:r>
               <a:rPr lang="en-US" dirty="0" smtClean="0"/>
               <a:t>Association </a:t>
-            </a:r>
-            <a:r>
-              <a:rPr lang="en-US" dirty="0" smtClean="0"/>
-              <a:t/>
             </a:r>
             <a:br>
               <a:rPr lang="en-US" dirty="0" smtClean="0"/>
@@ -5679,7 +8293,7 @@
 </p:sld>
 </file>
 
-<file path=ppt/slides/slide8.xml><?xml version="1.0" encoding="utf-8"?>
+<file path=ppt/slides/slide21.xml><?xml version="1.0" encoding="utf-8"?>
 <p:sld xmlns:a="http://schemas.openxmlformats.org/drawingml/2006/main" xmlns:r="http://schemas.openxmlformats.org/officeDocument/2006/relationships" xmlns:p="http://schemas.openxmlformats.org/presentationml/2006/main">
   <p:cSld>
     <p:spTree>
@@ -5716,10 +8330,6 @@
             <a:r>
               <a:rPr lang="en-US" dirty="0" smtClean="0"/>
               <a:t>Association </a:t>
-            </a:r>
-            <a:r>
-              <a:rPr lang="en-US" dirty="0" smtClean="0"/>
-              <a:t/>
             </a:r>
             <a:br>
               <a:rPr lang="en-US" dirty="0" smtClean="0"/>
@@ -6101,7 +8711,7 @@
 </p:sld>
 </file>
 
-<file path=ppt/slides/slide9.xml><?xml version="1.0" encoding="utf-8"?>
+<file path=ppt/slides/slide22.xml><?xml version="1.0" encoding="utf-8"?>
 <p:sld xmlns:a="http://schemas.openxmlformats.org/drawingml/2006/main" xmlns:r="http://schemas.openxmlformats.org/officeDocument/2006/relationships" xmlns:p="http://schemas.openxmlformats.org/presentationml/2006/main">
   <p:cSld>
     <p:spTree>
@@ -6615,7 +9225,1144 @@
 </p:sld>
 </file>
 
+<file path=ppt/slides/slide3.xml><?xml version="1.0" encoding="utf-8"?>
+<p:sld xmlns:a="http://schemas.openxmlformats.org/drawingml/2006/main" xmlns:r="http://schemas.openxmlformats.org/officeDocument/2006/relationships" xmlns:p="http://schemas.openxmlformats.org/presentationml/2006/main">
+  <p:cSld>
+    <p:spTree>
+      <p:nvGrpSpPr>
+        <p:cNvPr id="1" name=""/>
+        <p:cNvGrpSpPr/>
+        <p:nvPr/>
+      </p:nvGrpSpPr>
+      <p:grpSpPr>
+        <a:xfrm>
+          <a:off x="0" y="0"/>
+          <a:ext cx="0" cy="0"/>
+          <a:chOff x="0" y="0"/>
+          <a:chExt cx="0" cy="0"/>
+        </a:xfrm>
+      </p:grpSpPr>
+      <p:sp>
+        <p:nvSpPr>
+          <p:cNvPr id="2" name="Title 1"/>
+          <p:cNvSpPr>
+            <a:spLocks noGrp="1"/>
+          </p:cNvSpPr>
+          <p:nvPr>
+            <p:ph type="title"/>
+          </p:nvPr>
+        </p:nvSpPr>
+        <p:spPr/>
+        <p:txBody>
+          <a:bodyPr/>
+          <a:lstStyle/>
+          <a:p>
+            <a:r>
+              <a:rPr lang="en-US" dirty="0" smtClean="0"/>
+              <a:t>Try - Catch</a:t>
+            </a:r>
+            <a:endParaRPr lang="en-US" dirty="0"/>
+          </a:p>
+        </p:txBody>
+      </p:sp>
+      <p:pic>
+        <p:nvPicPr>
+          <p:cNvPr id="1026" name="Picture 2"/>
+          <p:cNvPicPr>
+            <a:picLocks noChangeAspect="1" noChangeArrowheads="1"/>
+          </p:cNvPicPr>
+          <p:nvPr/>
+        </p:nvPicPr>
+        <p:blipFill>
+          <a:blip r:embed="rId3">
+            <a:extLst>
+              <a:ext uri="{28A0092B-C50C-407E-A947-70E740481C1C}">
+                <a14:useLocalDpi xmlns:a14="http://schemas.microsoft.com/office/drawing/2010/main" val="0"/>
+              </a:ext>
+            </a:extLst>
+          </a:blip>
+          <a:srcRect/>
+          <a:stretch>
+            <a:fillRect/>
+          </a:stretch>
+        </p:blipFill>
+        <p:spPr bwMode="auto">
+          <a:xfrm>
+            <a:off x="1066800" y="1752600"/>
+            <a:ext cx="6786563" cy="3829050"/>
+          </a:xfrm>
+          <a:prstGeom prst="rect">
+            <a:avLst/>
+          </a:prstGeom>
+          <a:noFill/>
+          <a:ln>
+            <a:noFill/>
+          </a:ln>
+          <a:extLst>
+            <a:ext uri="{909E8E84-426E-40DD-AFC4-6F175D3DCCD1}">
+              <a14:hiddenFill xmlns:a14="http://schemas.microsoft.com/office/drawing/2010/main">
+                <a:solidFill>
+                  <a:schemeClr val="accent1"/>
+                </a:solidFill>
+              </a14:hiddenFill>
+            </a:ext>
+            <a:ext uri="{91240B29-F687-4F45-9708-019B960494DF}">
+              <a14:hiddenLine xmlns:a14="http://schemas.microsoft.com/office/drawing/2010/main" w="9525">
+                <a:solidFill>
+                  <a:schemeClr val="tx1"/>
+                </a:solidFill>
+                <a:miter lim="800000"/>
+                <a:headEnd/>
+                <a:tailEnd/>
+              </a14:hiddenLine>
+            </a:ext>
+          </a:extLst>
+        </p:spPr>
+      </p:pic>
+    </p:spTree>
+    <p:extLst>
+      <p:ext uri="{BB962C8B-B14F-4D97-AF65-F5344CB8AC3E}">
+        <p14:creationId xmlns:p14="http://schemas.microsoft.com/office/powerpoint/2010/main" val="29349348"/>
+      </p:ext>
+    </p:extLst>
+  </p:cSld>
+  <p:clrMapOvr>
+    <a:masterClrMapping/>
+  </p:clrMapOvr>
+  <p:timing>
+    <p:tnLst>
+      <p:par>
+        <p:cTn id="1" dur="indefinite" restart="never" nodeType="tmRoot"/>
+      </p:par>
+    </p:tnLst>
+  </p:timing>
+</p:sld>
+</file>
+
+<file path=ppt/slides/slide4.xml><?xml version="1.0" encoding="utf-8"?>
+<p:sld xmlns:a="http://schemas.openxmlformats.org/drawingml/2006/main" xmlns:r="http://schemas.openxmlformats.org/officeDocument/2006/relationships" xmlns:p="http://schemas.openxmlformats.org/presentationml/2006/main">
+  <p:cSld>
+    <p:spTree>
+      <p:nvGrpSpPr>
+        <p:cNvPr id="1" name=""/>
+        <p:cNvGrpSpPr/>
+        <p:nvPr/>
+      </p:nvGrpSpPr>
+      <p:grpSpPr>
+        <a:xfrm>
+          <a:off x="0" y="0"/>
+          <a:ext cx="0" cy="0"/>
+          <a:chOff x="0" y="0"/>
+          <a:chExt cx="0" cy="0"/>
+        </a:xfrm>
+      </p:grpSpPr>
+      <p:sp>
+        <p:nvSpPr>
+          <p:cNvPr id="2" name="Title 1"/>
+          <p:cNvSpPr>
+            <a:spLocks noGrp="1"/>
+          </p:cNvSpPr>
+          <p:nvPr>
+            <p:ph type="title"/>
+          </p:nvPr>
+        </p:nvSpPr>
+        <p:spPr/>
+        <p:txBody>
+          <a:bodyPr/>
+          <a:lstStyle/>
+          <a:p>
+            <a:r>
+              <a:rPr lang="en-US" dirty="0" smtClean="0"/>
+              <a:t>Try - Catch </a:t>
+            </a:r>
+            <a:endParaRPr lang="en-US" dirty="0"/>
+          </a:p>
+        </p:txBody>
+      </p:sp>
+      <p:pic>
+        <p:nvPicPr>
+          <p:cNvPr id="2050" name="Picture 2"/>
+          <p:cNvPicPr>
+            <a:picLocks noChangeAspect="1" noChangeArrowheads="1"/>
+          </p:cNvPicPr>
+          <p:nvPr/>
+        </p:nvPicPr>
+        <p:blipFill>
+          <a:blip r:embed="rId3">
+            <a:extLst>
+              <a:ext uri="{28A0092B-C50C-407E-A947-70E740481C1C}">
+                <a14:useLocalDpi xmlns:a14="http://schemas.microsoft.com/office/drawing/2010/main" val="0"/>
+              </a:ext>
+            </a:extLst>
+          </a:blip>
+          <a:srcRect/>
+          <a:stretch>
+            <a:fillRect/>
+          </a:stretch>
+        </p:blipFill>
+        <p:spPr bwMode="auto">
+          <a:xfrm>
+            <a:off x="609600" y="1752600"/>
+            <a:ext cx="8101013" cy="3771900"/>
+          </a:xfrm>
+          <a:prstGeom prst="rect">
+            <a:avLst/>
+          </a:prstGeom>
+          <a:noFill/>
+          <a:ln>
+            <a:noFill/>
+          </a:ln>
+          <a:extLst>
+            <a:ext uri="{909E8E84-426E-40DD-AFC4-6F175D3DCCD1}">
+              <a14:hiddenFill xmlns:a14="http://schemas.microsoft.com/office/drawing/2010/main">
+                <a:solidFill>
+                  <a:schemeClr val="accent1"/>
+                </a:solidFill>
+              </a14:hiddenFill>
+            </a:ext>
+            <a:ext uri="{91240B29-F687-4F45-9708-019B960494DF}">
+              <a14:hiddenLine xmlns:a14="http://schemas.microsoft.com/office/drawing/2010/main" w="9525">
+                <a:solidFill>
+                  <a:schemeClr val="tx1"/>
+                </a:solidFill>
+                <a:miter lim="800000"/>
+                <a:headEnd/>
+                <a:tailEnd/>
+              </a14:hiddenLine>
+            </a:ext>
+          </a:extLst>
+        </p:spPr>
+      </p:pic>
+    </p:spTree>
+    <p:extLst>
+      <p:ext uri="{BB962C8B-B14F-4D97-AF65-F5344CB8AC3E}">
+        <p14:creationId xmlns:p14="http://schemas.microsoft.com/office/powerpoint/2010/main" val="574420957"/>
+      </p:ext>
+    </p:extLst>
+  </p:cSld>
+  <p:clrMapOvr>
+    <a:masterClrMapping/>
+  </p:clrMapOvr>
+  <p:timing>
+    <p:tnLst>
+      <p:par>
+        <p:cTn id="1" dur="indefinite" restart="never" nodeType="tmRoot"/>
+      </p:par>
+    </p:tnLst>
+  </p:timing>
+</p:sld>
+</file>
+
+<file path=ppt/slides/slide5.xml><?xml version="1.0" encoding="utf-8"?>
+<p:sld xmlns:a="http://schemas.openxmlformats.org/drawingml/2006/main" xmlns:r="http://schemas.openxmlformats.org/officeDocument/2006/relationships" xmlns:p="http://schemas.openxmlformats.org/presentationml/2006/main">
+  <p:cSld>
+    <p:spTree>
+      <p:nvGrpSpPr>
+        <p:cNvPr id="1" name=""/>
+        <p:cNvGrpSpPr/>
+        <p:nvPr/>
+      </p:nvGrpSpPr>
+      <p:grpSpPr>
+        <a:xfrm>
+          <a:off x="0" y="0"/>
+          <a:ext cx="0" cy="0"/>
+          <a:chOff x="0" y="0"/>
+          <a:chExt cx="0" cy="0"/>
+        </a:xfrm>
+      </p:grpSpPr>
+      <p:sp>
+        <p:nvSpPr>
+          <p:cNvPr id="2" name="Title 1"/>
+          <p:cNvSpPr>
+            <a:spLocks noGrp="1"/>
+          </p:cNvSpPr>
+          <p:nvPr>
+            <p:ph type="title"/>
+          </p:nvPr>
+        </p:nvSpPr>
+        <p:spPr/>
+        <p:txBody>
+          <a:bodyPr/>
+          <a:lstStyle/>
+          <a:p>
+            <a:r>
+              <a:rPr lang="en-US" dirty="0" smtClean="0"/>
+              <a:t>Try - Catch</a:t>
+            </a:r>
+            <a:endParaRPr lang="en-US" dirty="0"/>
+          </a:p>
+        </p:txBody>
+      </p:sp>
+      <p:pic>
+        <p:nvPicPr>
+          <p:cNvPr id="3074" name="Picture 2"/>
+          <p:cNvPicPr>
+            <a:picLocks noChangeAspect="1" noChangeArrowheads="1"/>
+          </p:cNvPicPr>
+          <p:nvPr/>
+        </p:nvPicPr>
+        <p:blipFill>
+          <a:blip r:embed="rId3">
+            <a:extLst>
+              <a:ext uri="{28A0092B-C50C-407E-A947-70E740481C1C}">
+                <a14:useLocalDpi xmlns:a14="http://schemas.microsoft.com/office/drawing/2010/main" val="0"/>
+              </a:ext>
+            </a:extLst>
+          </a:blip>
+          <a:srcRect/>
+          <a:stretch>
+            <a:fillRect/>
+          </a:stretch>
+        </p:blipFill>
+        <p:spPr bwMode="auto">
+          <a:xfrm>
+            <a:off x="1066800" y="1676400"/>
+            <a:ext cx="7272338" cy="3957638"/>
+          </a:xfrm>
+          <a:prstGeom prst="rect">
+            <a:avLst/>
+          </a:prstGeom>
+          <a:noFill/>
+          <a:ln>
+            <a:noFill/>
+          </a:ln>
+          <a:extLst>
+            <a:ext uri="{909E8E84-426E-40DD-AFC4-6F175D3DCCD1}">
+              <a14:hiddenFill xmlns:a14="http://schemas.microsoft.com/office/drawing/2010/main">
+                <a:solidFill>
+                  <a:schemeClr val="accent1"/>
+                </a:solidFill>
+              </a14:hiddenFill>
+            </a:ext>
+            <a:ext uri="{91240B29-F687-4F45-9708-019B960494DF}">
+              <a14:hiddenLine xmlns:a14="http://schemas.microsoft.com/office/drawing/2010/main" w="9525">
+                <a:solidFill>
+                  <a:schemeClr val="tx1"/>
+                </a:solidFill>
+                <a:miter lim="800000"/>
+                <a:headEnd/>
+                <a:tailEnd/>
+              </a14:hiddenLine>
+            </a:ext>
+          </a:extLst>
+        </p:spPr>
+      </p:pic>
+    </p:spTree>
+    <p:extLst>
+      <p:ext uri="{BB962C8B-B14F-4D97-AF65-F5344CB8AC3E}">
+        <p14:creationId xmlns:p14="http://schemas.microsoft.com/office/powerpoint/2010/main" val="1132597454"/>
+      </p:ext>
+    </p:extLst>
+  </p:cSld>
+  <p:clrMapOvr>
+    <a:masterClrMapping/>
+  </p:clrMapOvr>
+  <p:timing>
+    <p:tnLst>
+      <p:par>
+        <p:cTn id="1" dur="indefinite" restart="never" nodeType="tmRoot"/>
+      </p:par>
+    </p:tnLst>
+  </p:timing>
+</p:sld>
+</file>
+
+<file path=ppt/slides/slide6.xml><?xml version="1.0" encoding="utf-8"?>
+<p:sld xmlns:a="http://schemas.openxmlformats.org/drawingml/2006/main" xmlns:r="http://schemas.openxmlformats.org/officeDocument/2006/relationships" xmlns:p="http://schemas.openxmlformats.org/presentationml/2006/main">
+  <p:cSld>
+    <p:spTree>
+      <p:nvGrpSpPr>
+        <p:cNvPr id="1" name=""/>
+        <p:cNvGrpSpPr/>
+        <p:nvPr/>
+      </p:nvGrpSpPr>
+      <p:grpSpPr>
+        <a:xfrm>
+          <a:off x="0" y="0"/>
+          <a:ext cx="0" cy="0"/>
+          <a:chOff x="0" y="0"/>
+          <a:chExt cx="0" cy="0"/>
+        </a:xfrm>
+      </p:grpSpPr>
+      <p:sp>
+        <p:nvSpPr>
+          <p:cNvPr id="2" name="Title 1"/>
+          <p:cNvSpPr>
+            <a:spLocks noGrp="1"/>
+          </p:cNvSpPr>
+          <p:nvPr>
+            <p:ph type="title"/>
+          </p:nvPr>
+        </p:nvSpPr>
+        <p:spPr/>
+        <p:txBody>
+          <a:bodyPr/>
+          <a:lstStyle/>
+          <a:p>
+            <a:r>
+              <a:rPr lang="en-US" dirty="0" smtClean="0"/>
+              <a:t>Stack Trace</a:t>
+            </a:r>
+            <a:endParaRPr lang="en-US" dirty="0"/>
+          </a:p>
+        </p:txBody>
+      </p:sp>
+      <p:pic>
+        <p:nvPicPr>
+          <p:cNvPr id="4098" name="Picture 2"/>
+          <p:cNvPicPr>
+            <a:picLocks noChangeAspect="1" noChangeArrowheads="1"/>
+          </p:cNvPicPr>
+          <p:nvPr/>
+        </p:nvPicPr>
+        <p:blipFill>
+          <a:blip r:embed="rId3">
+            <a:extLst>
+              <a:ext uri="{28A0092B-C50C-407E-A947-70E740481C1C}">
+                <a14:useLocalDpi xmlns:a14="http://schemas.microsoft.com/office/drawing/2010/main" val="0"/>
+              </a:ext>
+            </a:extLst>
+          </a:blip>
+          <a:srcRect/>
+          <a:stretch>
+            <a:fillRect/>
+          </a:stretch>
+        </p:blipFill>
+        <p:spPr bwMode="auto">
+          <a:xfrm>
+            <a:off x="1219200" y="2209800"/>
+            <a:ext cx="6343650" cy="2114550"/>
+          </a:xfrm>
+          <a:prstGeom prst="rect">
+            <a:avLst/>
+          </a:prstGeom>
+          <a:noFill/>
+          <a:ln>
+            <a:noFill/>
+          </a:ln>
+          <a:extLst>
+            <a:ext uri="{909E8E84-426E-40DD-AFC4-6F175D3DCCD1}">
+              <a14:hiddenFill xmlns:a14="http://schemas.microsoft.com/office/drawing/2010/main">
+                <a:solidFill>
+                  <a:schemeClr val="accent1"/>
+                </a:solidFill>
+              </a14:hiddenFill>
+            </a:ext>
+            <a:ext uri="{91240B29-F687-4F45-9708-019B960494DF}">
+              <a14:hiddenLine xmlns:a14="http://schemas.microsoft.com/office/drawing/2010/main" w="9525">
+                <a:solidFill>
+                  <a:schemeClr val="tx1"/>
+                </a:solidFill>
+                <a:miter lim="800000"/>
+                <a:headEnd/>
+                <a:tailEnd/>
+              </a14:hiddenLine>
+            </a:ext>
+          </a:extLst>
+        </p:spPr>
+      </p:pic>
+    </p:spTree>
+    <p:extLst>
+      <p:ext uri="{BB962C8B-B14F-4D97-AF65-F5344CB8AC3E}">
+        <p14:creationId xmlns:p14="http://schemas.microsoft.com/office/powerpoint/2010/main" val="893637782"/>
+      </p:ext>
+    </p:extLst>
+  </p:cSld>
+  <p:clrMapOvr>
+    <a:masterClrMapping/>
+  </p:clrMapOvr>
+  <p:timing>
+    <p:tnLst>
+      <p:par>
+        <p:cTn id="1" dur="indefinite" restart="never" nodeType="tmRoot"/>
+      </p:par>
+    </p:tnLst>
+  </p:timing>
+</p:sld>
+</file>
+
+<file path=ppt/slides/slide7.xml><?xml version="1.0" encoding="utf-8"?>
+<p:sld xmlns:a="http://schemas.openxmlformats.org/drawingml/2006/main" xmlns:r="http://schemas.openxmlformats.org/officeDocument/2006/relationships" xmlns:p="http://schemas.openxmlformats.org/presentationml/2006/main">
+  <p:cSld>
+    <p:spTree>
+      <p:nvGrpSpPr>
+        <p:cNvPr id="1" name=""/>
+        <p:cNvGrpSpPr/>
+        <p:nvPr/>
+      </p:nvGrpSpPr>
+      <p:grpSpPr>
+        <a:xfrm>
+          <a:off x="0" y="0"/>
+          <a:ext cx="0" cy="0"/>
+          <a:chOff x="0" y="0"/>
+          <a:chExt cx="0" cy="0"/>
+        </a:xfrm>
+      </p:grpSpPr>
+      <p:sp>
+        <p:nvSpPr>
+          <p:cNvPr id="2" name="Title 1"/>
+          <p:cNvSpPr>
+            <a:spLocks noGrp="1"/>
+          </p:cNvSpPr>
+          <p:nvPr>
+            <p:ph type="title"/>
+          </p:nvPr>
+        </p:nvSpPr>
+        <p:spPr/>
+        <p:txBody>
+          <a:bodyPr/>
+          <a:lstStyle/>
+          <a:p>
+            <a:r>
+              <a:rPr lang="en-US" dirty="0" smtClean="0"/>
+              <a:t>Stack Trace</a:t>
+            </a:r>
+            <a:endParaRPr lang="en-US" dirty="0"/>
+          </a:p>
+        </p:txBody>
+      </p:sp>
+      <p:pic>
+        <p:nvPicPr>
+          <p:cNvPr id="5122" name="Picture 2"/>
+          <p:cNvPicPr>
+            <a:picLocks noChangeAspect="1" noChangeArrowheads="1"/>
+          </p:cNvPicPr>
+          <p:nvPr/>
+        </p:nvPicPr>
+        <p:blipFill>
+          <a:blip r:embed="rId3">
+            <a:extLst>
+              <a:ext uri="{28A0092B-C50C-407E-A947-70E740481C1C}">
+                <a14:useLocalDpi xmlns:a14="http://schemas.microsoft.com/office/drawing/2010/main" val="0"/>
+              </a:ext>
+            </a:extLst>
+          </a:blip>
+          <a:srcRect/>
+          <a:stretch>
+            <a:fillRect/>
+          </a:stretch>
+        </p:blipFill>
+        <p:spPr bwMode="auto">
+          <a:xfrm>
+            <a:off x="1371600" y="2057400"/>
+            <a:ext cx="6372225" cy="2143125"/>
+          </a:xfrm>
+          <a:prstGeom prst="rect">
+            <a:avLst/>
+          </a:prstGeom>
+          <a:noFill/>
+          <a:ln>
+            <a:noFill/>
+          </a:ln>
+          <a:extLst>
+            <a:ext uri="{909E8E84-426E-40DD-AFC4-6F175D3DCCD1}">
+              <a14:hiddenFill xmlns:a14="http://schemas.microsoft.com/office/drawing/2010/main">
+                <a:solidFill>
+                  <a:schemeClr val="accent1"/>
+                </a:solidFill>
+              </a14:hiddenFill>
+            </a:ext>
+            <a:ext uri="{91240B29-F687-4F45-9708-019B960494DF}">
+              <a14:hiddenLine xmlns:a14="http://schemas.microsoft.com/office/drawing/2010/main" w="9525">
+                <a:solidFill>
+                  <a:schemeClr val="tx1"/>
+                </a:solidFill>
+                <a:miter lim="800000"/>
+                <a:headEnd/>
+                <a:tailEnd/>
+              </a14:hiddenLine>
+            </a:ext>
+          </a:extLst>
+        </p:spPr>
+      </p:pic>
+    </p:spTree>
+    <p:extLst>
+      <p:ext uri="{BB962C8B-B14F-4D97-AF65-F5344CB8AC3E}">
+        <p14:creationId xmlns:p14="http://schemas.microsoft.com/office/powerpoint/2010/main" val="2890447384"/>
+      </p:ext>
+    </p:extLst>
+  </p:cSld>
+  <p:clrMapOvr>
+    <a:masterClrMapping/>
+  </p:clrMapOvr>
+  <p:timing>
+    <p:tnLst>
+      <p:par>
+        <p:cTn id="1" dur="indefinite" restart="never" nodeType="tmRoot"/>
+      </p:par>
+    </p:tnLst>
+  </p:timing>
+</p:sld>
+</file>
+
+<file path=ppt/slides/slide8.xml><?xml version="1.0" encoding="utf-8"?>
+<p:sld xmlns:a="http://schemas.openxmlformats.org/drawingml/2006/main" xmlns:r="http://schemas.openxmlformats.org/officeDocument/2006/relationships" xmlns:p="http://schemas.openxmlformats.org/presentationml/2006/main">
+  <p:cSld>
+    <p:spTree>
+      <p:nvGrpSpPr>
+        <p:cNvPr id="1" name=""/>
+        <p:cNvGrpSpPr/>
+        <p:nvPr/>
+      </p:nvGrpSpPr>
+      <p:grpSpPr>
+        <a:xfrm>
+          <a:off x="0" y="0"/>
+          <a:ext cx="0" cy="0"/>
+          <a:chOff x="0" y="0"/>
+          <a:chExt cx="0" cy="0"/>
+        </a:xfrm>
+      </p:grpSpPr>
+      <p:sp>
+        <p:nvSpPr>
+          <p:cNvPr id="2" name="Title 1"/>
+          <p:cNvSpPr>
+            <a:spLocks noGrp="1"/>
+          </p:cNvSpPr>
+          <p:nvPr>
+            <p:ph type="title"/>
+          </p:nvPr>
+        </p:nvSpPr>
+        <p:spPr/>
+        <p:txBody>
+          <a:bodyPr/>
+          <a:lstStyle/>
+          <a:p>
+            <a:r>
+              <a:rPr lang="en-US" dirty="0" smtClean="0"/>
+              <a:t>Runtime Exception</a:t>
+            </a:r>
+            <a:endParaRPr lang="en-US" dirty="0"/>
+          </a:p>
+        </p:txBody>
+      </p:sp>
+      <p:pic>
+        <p:nvPicPr>
+          <p:cNvPr id="6146" name="Picture 2"/>
+          <p:cNvPicPr>
+            <a:picLocks noChangeAspect="1" noChangeArrowheads="1"/>
+          </p:cNvPicPr>
+          <p:nvPr/>
+        </p:nvPicPr>
+        <p:blipFill>
+          <a:blip r:embed="rId3">
+            <a:extLst>
+              <a:ext uri="{28A0092B-C50C-407E-A947-70E740481C1C}">
+                <a14:useLocalDpi xmlns:a14="http://schemas.microsoft.com/office/drawing/2010/main" val="0"/>
+              </a:ext>
+            </a:extLst>
+          </a:blip>
+          <a:srcRect/>
+          <a:stretch>
+            <a:fillRect/>
+          </a:stretch>
+        </p:blipFill>
+        <p:spPr bwMode="auto">
+          <a:xfrm>
+            <a:off x="2209800" y="1828800"/>
+            <a:ext cx="5000625" cy="4086225"/>
+          </a:xfrm>
+          <a:prstGeom prst="rect">
+            <a:avLst/>
+          </a:prstGeom>
+          <a:noFill/>
+          <a:ln>
+            <a:noFill/>
+          </a:ln>
+          <a:extLst>
+            <a:ext uri="{909E8E84-426E-40DD-AFC4-6F175D3DCCD1}">
+              <a14:hiddenFill xmlns:a14="http://schemas.microsoft.com/office/drawing/2010/main">
+                <a:solidFill>
+                  <a:schemeClr val="accent1"/>
+                </a:solidFill>
+              </a14:hiddenFill>
+            </a:ext>
+            <a:ext uri="{91240B29-F687-4F45-9708-019B960494DF}">
+              <a14:hiddenLine xmlns:a14="http://schemas.microsoft.com/office/drawing/2010/main" w="9525">
+                <a:solidFill>
+                  <a:schemeClr val="tx1"/>
+                </a:solidFill>
+                <a:miter lim="800000"/>
+                <a:headEnd/>
+                <a:tailEnd/>
+              </a14:hiddenLine>
+            </a:ext>
+          </a:extLst>
+        </p:spPr>
+      </p:pic>
+    </p:spTree>
+    <p:extLst>
+      <p:ext uri="{BB962C8B-B14F-4D97-AF65-F5344CB8AC3E}">
+        <p14:creationId xmlns:p14="http://schemas.microsoft.com/office/powerpoint/2010/main" val="1657099407"/>
+      </p:ext>
+    </p:extLst>
+  </p:cSld>
+  <p:clrMapOvr>
+    <a:masterClrMapping/>
+  </p:clrMapOvr>
+  <p:timing>
+    <p:tnLst>
+      <p:par>
+        <p:cTn id="1" dur="indefinite" restart="never" nodeType="tmRoot"/>
+      </p:par>
+    </p:tnLst>
+  </p:timing>
+</p:sld>
+</file>
+
+<file path=ppt/slides/slide9.xml><?xml version="1.0" encoding="utf-8"?>
+<p:sld xmlns:a="http://schemas.openxmlformats.org/drawingml/2006/main" xmlns:r="http://schemas.openxmlformats.org/officeDocument/2006/relationships" xmlns:p="http://schemas.openxmlformats.org/presentationml/2006/main">
+  <p:cSld>
+    <p:spTree>
+      <p:nvGrpSpPr>
+        <p:cNvPr id="1" name=""/>
+        <p:cNvGrpSpPr/>
+        <p:nvPr/>
+      </p:nvGrpSpPr>
+      <p:grpSpPr>
+        <a:xfrm>
+          <a:off x="0" y="0"/>
+          <a:ext cx="0" cy="0"/>
+          <a:chOff x="0" y="0"/>
+          <a:chExt cx="0" cy="0"/>
+        </a:xfrm>
+      </p:grpSpPr>
+      <p:sp>
+        <p:nvSpPr>
+          <p:cNvPr id="2" name="Title 1"/>
+          <p:cNvSpPr>
+            <a:spLocks noGrp="1"/>
+          </p:cNvSpPr>
+          <p:nvPr>
+            <p:ph type="title"/>
+          </p:nvPr>
+        </p:nvSpPr>
+        <p:spPr/>
+        <p:txBody>
+          <a:bodyPr/>
+          <a:lstStyle/>
+          <a:p>
+            <a:r>
+              <a:rPr lang="en-US" dirty="0" err="1" smtClean="0"/>
+              <a:t>RuntimeException</a:t>
+            </a:r>
+            <a:endParaRPr lang="en-US" dirty="0"/>
+          </a:p>
+        </p:txBody>
+      </p:sp>
+      <p:pic>
+        <p:nvPicPr>
+          <p:cNvPr id="7170" name="Picture 2"/>
+          <p:cNvPicPr>
+            <a:picLocks noChangeAspect="1" noChangeArrowheads="1"/>
+          </p:cNvPicPr>
+          <p:nvPr/>
+        </p:nvPicPr>
+        <p:blipFill>
+          <a:blip r:embed="rId3">
+            <a:extLst>
+              <a:ext uri="{28A0092B-C50C-407E-A947-70E740481C1C}">
+                <a14:useLocalDpi xmlns:a14="http://schemas.microsoft.com/office/drawing/2010/main" val="0"/>
+              </a:ext>
+            </a:extLst>
+          </a:blip>
+          <a:srcRect/>
+          <a:stretch>
+            <a:fillRect/>
+          </a:stretch>
+        </p:blipFill>
+        <p:spPr bwMode="auto">
+          <a:xfrm>
+            <a:off x="990600" y="1981200"/>
+            <a:ext cx="4886325" cy="1666875"/>
+          </a:xfrm>
+          <a:prstGeom prst="rect">
+            <a:avLst/>
+          </a:prstGeom>
+          <a:noFill/>
+          <a:ln>
+            <a:noFill/>
+          </a:ln>
+          <a:extLst>
+            <a:ext uri="{909E8E84-426E-40DD-AFC4-6F175D3DCCD1}">
+              <a14:hiddenFill xmlns:a14="http://schemas.microsoft.com/office/drawing/2010/main">
+                <a:solidFill>
+                  <a:schemeClr val="accent1"/>
+                </a:solidFill>
+              </a14:hiddenFill>
+            </a:ext>
+            <a:ext uri="{91240B29-F687-4F45-9708-019B960494DF}">
+              <a14:hiddenLine xmlns:a14="http://schemas.microsoft.com/office/drawing/2010/main" w="9525">
+                <a:solidFill>
+                  <a:schemeClr val="tx1"/>
+                </a:solidFill>
+                <a:miter lim="800000"/>
+                <a:headEnd/>
+                <a:tailEnd/>
+              </a14:hiddenLine>
+            </a:ext>
+          </a:extLst>
+        </p:spPr>
+      </p:pic>
+      <p:pic>
+        <p:nvPicPr>
+          <p:cNvPr id="7171" name="Picture 3"/>
+          <p:cNvPicPr>
+            <a:picLocks noChangeAspect="1" noChangeArrowheads="1"/>
+          </p:cNvPicPr>
+          <p:nvPr/>
+        </p:nvPicPr>
+        <p:blipFill>
+          <a:blip r:embed="rId4">
+            <a:extLst>
+              <a:ext uri="{28A0092B-C50C-407E-A947-70E740481C1C}">
+                <a14:useLocalDpi xmlns:a14="http://schemas.microsoft.com/office/drawing/2010/main" val="0"/>
+              </a:ext>
+            </a:extLst>
+          </a:blip>
+          <a:srcRect/>
+          <a:stretch>
+            <a:fillRect/>
+          </a:stretch>
+        </p:blipFill>
+        <p:spPr bwMode="auto">
+          <a:xfrm>
+            <a:off x="4595734" y="4095750"/>
+            <a:ext cx="2409825" cy="1333500"/>
+          </a:xfrm>
+          <a:prstGeom prst="rect">
+            <a:avLst/>
+          </a:prstGeom>
+          <a:noFill/>
+          <a:ln>
+            <a:noFill/>
+          </a:ln>
+          <a:extLst>
+            <a:ext uri="{909E8E84-426E-40DD-AFC4-6F175D3DCCD1}">
+              <a14:hiddenFill xmlns:a14="http://schemas.microsoft.com/office/drawing/2010/main">
+                <a:solidFill>
+                  <a:schemeClr val="accent1"/>
+                </a:solidFill>
+              </a14:hiddenFill>
+            </a:ext>
+            <a:ext uri="{91240B29-F687-4F45-9708-019B960494DF}">
+              <a14:hiddenLine xmlns:a14="http://schemas.microsoft.com/office/drawing/2010/main" w="9525">
+                <a:solidFill>
+                  <a:schemeClr val="tx1"/>
+                </a:solidFill>
+                <a:miter lim="800000"/>
+                <a:headEnd/>
+                <a:tailEnd/>
+              </a14:hiddenLine>
+            </a:ext>
+          </a:extLst>
+        </p:spPr>
+      </p:pic>
+    </p:spTree>
+    <p:extLst>
+      <p:ext uri="{BB962C8B-B14F-4D97-AF65-F5344CB8AC3E}">
+        <p14:creationId xmlns:p14="http://schemas.microsoft.com/office/powerpoint/2010/main" val="924334316"/>
+      </p:ext>
+    </p:extLst>
+  </p:cSld>
+  <p:clrMapOvr>
+    <a:masterClrMapping/>
+  </p:clrMapOvr>
+  <p:timing>
+    <p:tnLst>
+      <p:par>
+        <p:cTn id="1" dur="indefinite" restart="never" nodeType="tmRoot"/>
+      </p:par>
+    </p:tnLst>
+  </p:timing>
+</p:sld>
+</file>
+
 <file path=ppt/theme/theme1.xml><?xml version="1.0" encoding="utf-8"?>
+<a:theme xmlns:a="http://schemas.openxmlformats.org/drawingml/2006/main" name="MSCS">
+  <a:themeElements>
+    <a:clrScheme name="Office">
+      <a:dk1>
+        <a:sysClr val="windowText" lastClr="000000"/>
+      </a:dk1>
+      <a:lt1>
+        <a:sysClr val="window" lastClr="FFFFFF"/>
+      </a:lt1>
+      <a:dk2>
+        <a:srgbClr val="1F497D"/>
+      </a:dk2>
+      <a:lt2>
+        <a:srgbClr val="EEECE1"/>
+      </a:lt2>
+      <a:accent1>
+        <a:srgbClr val="4F81BD"/>
+      </a:accent1>
+      <a:accent2>
+        <a:srgbClr val="C0504D"/>
+      </a:accent2>
+      <a:accent3>
+        <a:srgbClr val="9BBB59"/>
+      </a:accent3>
+      <a:accent4>
+        <a:srgbClr val="8064A2"/>
+      </a:accent4>
+      <a:accent5>
+        <a:srgbClr val="4BACC6"/>
+      </a:accent5>
+      <a:accent6>
+        <a:srgbClr val="F79646"/>
+      </a:accent6>
+      <a:hlink>
+        <a:srgbClr val="0000FF"/>
+      </a:hlink>
+      <a:folHlink>
+        <a:srgbClr val="800080"/>
+      </a:folHlink>
+    </a:clrScheme>
+    <a:fontScheme name="Office">
+      <a:majorFont>
+        <a:latin typeface="Calibri"/>
+        <a:ea typeface=""/>
+        <a:cs typeface=""/>
+        <a:font script="Jpan" typeface="ＭＳ Ｐゴシック"/>
+        <a:font script="Hang" typeface="맑은 고딕"/>
+        <a:font script="Hans" typeface="宋体"/>
+        <a:font script="Hant" typeface="新細明體"/>
+        <a:font script="Arab" typeface="Times New Roman"/>
+        <a:font script="Hebr" typeface="Times New Roman"/>
+        <a:font script="Thai" typeface="Angsana New"/>
+        <a:font script="Ethi" typeface="Nyala"/>
+        <a:font script="Beng" typeface="Vrinda"/>
+        <a:font script="Gujr" typeface="Shruti"/>
+        <a:font script="Khmr" typeface="MoolBoran"/>
+        <a:font script="Knda" typeface="Tunga"/>
+        <a:font script="Guru" typeface="Raavi"/>
+        <a:font script="Cans" typeface="Euphemia"/>
+        <a:font script="Cher" typeface="Plantagenet Cherokee"/>
+        <a:font script="Yiii" typeface="Microsoft Yi Baiti"/>
+        <a:font script="Tibt" typeface="Microsoft Himalaya"/>
+        <a:font script="Thaa" typeface="MV Boli"/>
+        <a:font script="Deva" typeface="Mangal"/>
+        <a:font script="Telu" typeface="Gautami"/>
+        <a:font script="Taml" typeface="Latha"/>
+        <a:font script="Syrc" typeface="Estrangelo Edessa"/>
+        <a:font script="Orya" typeface="Kalinga"/>
+        <a:font script="Mlym" typeface="Kartika"/>
+        <a:font script="Laoo" typeface="DokChampa"/>
+        <a:font script="Sinh" typeface="Iskoola Pota"/>
+        <a:font script="Mong" typeface="Mongolian Baiti"/>
+        <a:font script="Viet" typeface="Times New Roman"/>
+        <a:font script="Uigh" typeface="Microsoft Uighur"/>
+        <a:font script="Geor" typeface="Sylfaen"/>
+      </a:majorFont>
+      <a:minorFont>
+        <a:latin typeface="Calibri"/>
+        <a:ea typeface=""/>
+        <a:cs typeface=""/>
+        <a:font script="Jpan" typeface="ＭＳ Ｐゴシック"/>
+        <a:font script="Hang" typeface="맑은 고딕"/>
+        <a:font script="Hans" typeface="宋体"/>
+        <a:font script="Hant" typeface="新細明體"/>
+        <a:font script="Arab" typeface="Arial"/>
+        <a:font script="Hebr" typeface="Arial"/>
+        <a:font script="Thai" typeface="Cordia New"/>
+        <a:font script="Ethi" typeface="Nyala"/>
+        <a:font script="Beng" typeface="Vrinda"/>
+        <a:font script="Gujr" typeface="Shruti"/>
+        <a:font script="Khmr" typeface="DaunPenh"/>
+        <a:font script="Knda" typeface="Tunga"/>
+        <a:font script="Guru" typeface="Raavi"/>
+        <a:font script="Cans" typeface="Euphemia"/>
+        <a:font script="Cher" typeface="Plantagenet Cherokee"/>
+        <a:font script="Yiii" typeface="Microsoft Yi Baiti"/>
+        <a:font script="Tibt" typeface="Microsoft Himalaya"/>
+        <a:font script="Thaa" typeface="MV Boli"/>
+        <a:font script="Deva" typeface="Mangal"/>
+        <a:font script="Telu" typeface="Gautami"/>
+        <a:font script="Taml" typeface="Latha"/>
+        <a:font script="Syrc" typeface="Estrangelo Edessa"/>
+        <a:font script="Orya" typeface="Kalinga"/>
+        <a:font script="Mlym" typeface="Kartika"/>
+        <a:font script="Laoo" typeface="DokChampa"/>
+        <a:font script="Sinh" typeface="Iskoola Pota"/>
+        <a:font script="Mong" typeface="Mongolian Baiti"/>
+        <a:font script="Viet" typeface="Arial"/>
+        <a:font script="Uigh" typeface="Microsoft Uighur"/>
+        <a:font script="Geor" typeface="Sylfaen"/>
+      </a:minorFont>
+    </a:fontScheme>
+    <a:fmtScheme name="Office">
+      <a:fillStyleLst>
+        <a:solidFill>
+          <a:schemeClr val="phClr"/>
+        </a:solidFill>
+        <a:gradFill rotWithShape="1">
+          <a:gsLst>
+            <a:gs pos="0">
+              <a:schemeClr val="phClr">
+                <a:tint val="50000"/>
+                <a:satMod val="300000"/>
+              </a:schemeClr>
+            </a:gs>
+            <a:gs pos="35000">
+              <a:schemeClr val="phClr">
+                <a:tint val="37000"/>
+                <a:satMod val="300000"/>
+              </a:schemeClr>
+            </a:gs>
+            <a:gs pos="100000">
+              <a:schemeClr val="phClr">
+                <a:tint val="15000"/>
+                <a:satMod val="350000"/>
+              </a:schemeClr>
+            </a:gs>
+          </a:gsLst>
+          <a:lin ang="16200000" scaled="1"/>
+        </a:gradFill>
+        <a:gradFill rotWithShape="1">
+          <a:gsLst>
+            <a:gs pos="0">
+              <a:schemeClr val="phClr">
+                <a:shade val="51000"/>
+                <a:satMod val="130000"/>
+              </a:schemeClr>
+            </a:gs>
+            <a:gs pos="80000">
+              <a:schemeClr val="phClr">
+                <a:shade val="93000"/>
+                <a:satMod val="130000"/>
+              </a:schemeClr>
+            </a:gs>
+            <a:gs pos="100000">
+              <a:schemeClr val="phClr">
+                <a:shade val="94000"/>
+                <a:satMod val="135000"/>
+              </a:schemeClr>
+            </a:gs>
+          </a:gsLst>
+          <a:lin ang="16200000" scaled="0"/>
+        </a:gradFill>
+      </a:fillStyleLst>
+      <a:lnStyleLst>
+        <a:ln w="9525" cap="flat" cmpd="sng" algn="ctr">
+          <a:solidFill>
+            <a:schemeClr val="phClr">
+              <a:shade val="95000"/>
+              <a:satMod val="105000"/>
+            </a:schemeClr>
+          </a:solidFill>
+          <a:prstDash val="solid"/>
+        </a:ln>
+        <a:ln w="25400" cap="flat" cmpd="sng" algn="ctr">
+          <a:solidFill>
+            <a:schemeClr val="phClr"/>
+          </a:solidFill>
+          <a:prstDash val="solid"/>
+        </a:ln>
+        <a:ln w="38100" cap="flat" cmpd="sng" algn="ctr">
+          <a:solidFill>
+            <a:schemeClr val="phClr"/>
+          </a:solidFill>
+          <a:prstDash val="solid"/>
+        </a:ln>
+      </a:lnStyleLst>
+      <a:effectStyleLst>
+        <a:effectStyle>
+          <a:effectLst>
+            <a:outerShdw blurRad="40000" dist="20000" dir="5400000" rotWithShape="0">
+              <a:srgbClr val="000000">
+                <a:alpha val="38000"/>
+              </a:srgbClr>
+            </a:outerShdw>
+          </a:effectLst>
+        </a:effectStyle>
+        <a:effectStyle>
+          <a:effectLst>
+            <a:outerShdw blurRad="40000" dist="23000" dir="5400000" rotWithShape="0">
+              <a:srgbClr val="000000">
+                <a:alpha val="35000"/>
+              </a:srgbClr>
+            </a:outerShdw>
+          </a:effectLst>
+        </a:effectStyle>
+        <a:effectStyle>
+          <a:effectLst>
+            <a:outerShdw blurRad="40000" dist="23000" dir="5400000" rotWithShape="0">
+              <a:srgbClr val="000000">
+                <a:alpha val="35000"/>
+              </a:srgbClr>
+            </a:outerShdw>
+          </a:effectLst>
+          <a:scene3d>
+            <a:camera prst="orthographicFront">
+              <a:rot lat="0" lon="0" rev="0"/>
+            </a:camera>
+            <a:lightRig rig="threePt" dir="t">
+              <a:rot lat="0" lon="0" rev="1200000"/>
+            </a:lightRig>
+          </a:scene3d>
+          <a:sp3d>
+            <a:bevelT w="63500" h="25400"/>
+          </a:sp3d>
+        </a:effectStyle>
+      </a:effectStyleLst>
+      <a:bgFillStyleLst>
+        <a:solidFill>
+          <a:schemeClr val="phClr"/>
+        </a:solidFill>
+        <a:gradFill rotWithShape="1">
+          <a:gsLst>
+            <a:gs pos="0">
+              <a:schemeClr val="phClr">
+                <a:tint val="40000"/>
+                <a:satMod val="350000"/>
+              </a:schemeClr>
+            </a:gs>
+            <a:gs pos="40000">
+              <a:schemeClr val="phClr">
+                <a:tint val="45000"/>
+                <a:shade val="99000"/>
+                <a:satMod val="350000"/>
+              </a:schemeClr>
+            </a:gs>
+            <a:gs pos="100000">
+              <a:schemeClr val="phClr">
+                <a:shade val="20000"/>
+                <a:satMod val="255000"/>
+              </a:schemeClr>
+            </a:gs>
+          </a:gsLst>
+          <a:path path="circle">
+            <a:fillToRect l="50000" t="-80000" r="50000" b="180000"/>
+          </a:path>
+        </a:gradFill>
+        <a:gradFill rotWithShape="1">
+          <a:gsLst>
+            <a:gs pos="0">
+              <a:schemeClr val="phClr">
+                <a:tint val="80000"/>
+                <a:satMod val="300000"/>
+              </a:schemeClr>
+            </a:gs>
+            <a:gs pos="100000">
+              <a:schemeClr val="phClr">
+                <a:shade val="30000"/>
+                <a:satMod val="200000"/>
+              </a:schemeClr>
+            </a:gs>
+          </a:gsLst>
+          <a:path path="circle">
+            <a:fillToRect l="50000" t="50000" r="50000" b="50000"/>
+          </a:path>
+        </a:gradFill>
+      </a:bgFillStyleLst>
+    </a:fmtScheme>
+  </a:themeElements>
+  <a:objectDefaults/>
+  <a:extraClrSchemeLst/>
+</a:theme>
+</file>
+
+<file path=ppt/theme/theme2.xml><?xml version="1.0" encoding="utf-8"?>
 <a:theme xmlns:a="http://schemas.openxmlformats.org/drawingml/2006/main" name="Office Theme">
   <a:themeElements>
     <a:clrScheme name="Office">

</xml_diff>

<commit_message>
Book errata and quiz for lesson 4
</commit_message>
<xml_diff>
--- a/Lesson 4.pptx
+++ b/Lesson 4.pptx
@@ -5,7 +5,7 @@
     <p:sldMasterId id="2147483660" r:id="rId1"/>
   </p:sldMasterIdLst>
   <p:notesMasterIdLst>
-    <p:notesMasterId r:id="rId31"/>
+    <p:notesMasterId r:id="rId33"/>
   </p:notesMasterIdLst>
   <p:sldIdLst>
     <p:sldId id="264" r:id="rId2"/>
@@ -24,19 +24,21 @@
     <p:sldId id="270" r:id="rId15"/>
     <p:sldId id="271" r:id="rId16"/>
     <p:sldId id="272" r:id="rId17"/>
-    <p:sldId id="273" r:id="rId18"/>
-    <p:sldId id="274" r:id="rId19"/>
-    <p:sldId id="275" r:id="rId20"/>
-    <p:sldId id="276" r:id="rId21"/>
-    <p:sldId id="277" r:id="rId22"/>
-    <p:sldId id="256" r:id="rId23"/>
-    <p:sldId id="257" r:id="rId24"/>
-    <p:sldId id="258" r:id="rId25"/>
-    <p:sldId id="259" r:id="rId26"/>
-    <p:sldId id="262" r:id="rId27"/>
-    <p:sldId id="261" r:id="rId28"/>
-    <p:sldId id="263" r:id="rId29"/>
-    <p:sldId id="260" r:id="rId30"/>
+    <p:sldId id="285" r:id="rId18"/>
+    <p:sldId id="286" r:id="rId19"/>
+    <p:sldId id="273" r:id="rId20"/>
+    <p:sldId id="274" r:id="rId21"/>
+    <p:sldId id="275" r:id="rId22"/>
+    <p:sldId id="276" r:id="rId23"/>
+    <p:sldId id="277" r:id="rId24"/>
+    <p:sldId id="256" r:id="rId25"/>
+    <p:sldId id="257" r:id="rId26"/>
+    <p:sldId id="258" r:id="rId27"/>
+    <p:sldId id="259" r:id="rId28"/>
+    <p:sldId id="262" r:id="rId29"/>
+    <p:sldId id="261" r:id="rId30"/>
+    <p:sldId id="263" r:id="rId31"/>
+    <p:sldId id="260" r:id="rId32"/>
   </p:sldIdLst>
   <p:sldSz cx="9144000" cy="6858000" type="screen4x3"/>
   <p:notesSz cx="6858000" cy="9144000"/>
@@ -220,7 +222,7 @@
           <a:p>
             <a:fld id="{4CDA876A-5EA8-4039-8140-156374533FEF}" type="datetimeFigureOut">
               <a:rPr lang="en-US" smtClean="0"/>
-              <a:t>5/13/2014</a:t>
+              <a:t>5/15/2014</a:t>
             </a:fld>
             <a:endParaRPr lang="en-US"/>
           </a:p>
@@ -673,7 +675,7 @@
           <a:p>
             <a:fld id="{5EEA4EF7-1170-4BDC-97FA-BEEDBF3971E5}" type="slidenum">
               <a:rPr lang="en-US" smtClean="0"/>
-              <a:t>18</a:t>
+              <a:t>20</a:t>
             </a:fld>
             <a:endParaRPr lang="en-US"/>
           </a:p>
@@ -785,7 +787,7 @@
           <a:p>
             <a:fld id="{5EEA4EF7-1170-4BDC-97FA-BEEDBF3971E5}" type="slidenum">
               <a:rPr lang="en-US" smtClean="0"/>
-              <a:t>19</a:t>
+              <a:t>21</a:t>
             </a:fld>
             <a:endParaRPr lang="en-US"/>
           </a:p>
@@ -883,7 +885,7 @@
           <a:p>
             <a:fld id="{5EEA4EF7-1170-4BDC-97FA-BEEDBF3971E5}" type="slidenum">
               <a:rPr lang="en-US" smtClean="0"/>
-              <a:t>20</a:t>
+              <a:t>22</a:t>
             </a:fld>
             <a:endParaRPr lang="en-US"/>
           </a:p>
@@ -985,7 +987,7 @@
           <a:p>
             <a:fld id="{5EEA4EF7-1170-4BDC-97FA-BEEDBF3971E5}" type="slidenum">
               <a:rPr lang="en-US" smtClean="0"/>
-              <a:t>21</a:t>
+              <a:t>23</a:t>
             </a:fld>
             <a:endParaRPr lang="en-US"/>
           </a:p>
@@ -1815,7 +1817,7 @@
           <a:p>
             <a:fld id="{5EEA4EF7-1170-4BDC-97FA-BEEDBF3971E5}" type="slidenum">
               <a:rPr lang="en-US" smtClean="0"/>
-              <a:t>17</a:t>
+              <a:t>19</a:t>
             </a:fld>
             <a:endParaRPr lang="en-US"/>
           </a:p>
@@ -2010,7 +2012,7 @@
           <a:p>
             <a:fld id="{6F69DFD9-279D-4F8A-9CB8-FA17EBD510E8}" type="datetimeFigureOut">
               <a:rPr lang="en-US" smtClean="0"/>
-              <a:t>5/13/2014</a:t>
+              <a:t>5/15/2014</a:t>
             </a:fld>
             <a:endParaRPr lang="en-US"/>
           </a:p>
@@ -2187,7 +2189,7 @@
           <a:p>
             <a:fld id="{6F69DFD9-279D-4F8A-9CB8-FA17EBD510E8}" type="datetimeFigureOut">
               <a:rPr lang="en-US" smtClean="0"/>
-              <a:t>5/13/2014</a:t>
+              <a:t>5/15/2014</a:t>
             </a:fld>
             <a:endParaRPr lang="en-US"/>
           </a:p>
@@ -2367,7 +2369,7 @@
           <a:p>
             <a:fld id="{6F69DFD9-279D-4F8A-9CB8-FA17EBD510E8}" type="datetimeFigureOut">
               <a:rPr lang="en-US" smtClean="0"/>
-              <a:t>5/13/2014</a:t>
+              <a:t>5/15/2014</a:t>
             </a:fld>
             <a:endParaRPr lang="en-US"/>
           </a:p>
@@ -2537,7 +2539,7 @@
           <a:p>
             <a:fld id="{6F69DFD9-279D-4F8A-9CB8-FA17EBD510E8}" type="datetimeFigureOut">
               <a:rPr lang="en-US" smtClean="0"/>
-              <a:t>5/13/2014</a:t>
+              <a:t>5/15/2014</a:t>
             </a:fld>
             <a:endParaRPr lang="en-US"/>
           </a:p>
@@ -2790,7 +2792,7 @@
           <a:p>
             <a:fld id="{6F69DFD9-279D-4F8A-9CB8-FA17EBD510E8}" type="datetimeFigureOut">
               <a:rPr lang="en-US" smtClean="0"/>
-              <a:t>5/13/2014</a:t>
+              <a:t>5/15/2014</a:t>
             </a:fld>
             <a:endParaRPr lang="en-US"/>
           </a:p>
@@ -3085,7 +3087,7 @@
           <a:p>
             <a:fld id="{6F69DFD9-279D-4F8A-9CB8-FA17EBD510E8}" type="datetimeFigureOut">
               <a:rPr lang="en-US" smtClean="0"/>
-              <a:t>5/13/2014</a:t>
+              <a:t>5/15/2014</a:t>
             </a:fld>
             <a:endParaRPr lang="en-US"/>
           </a:p>
@@ -3507,7 +3509,7 @@
           <a:p>
             <a:fld id="{6F69DFD9-279D-4F8A-9CB8-FA17EBD510E8}" type="datetimeFigureOut">
               <a:rPr lang="en-US" smtClean="0"/>
-              <a:t>5/13/2014</a:t>
+              <a:t>5/15/2014</a:t>
             </a:fld>
             <a:endParaRPr lang="en-US"/>
           </a:p>
@@ -3625,7 +3627,7 @@
           <a:p>
             <a:fld id="{6F69DFD9-279D-4F8A-9CB8-FA17EBD510E8}" type="datetimeFigureOut">
               <a:rPr lang="en-US" smtClean="0"/>
-              <a:t>5/13/2014</a:t>
+              <a:t>5/15/2014</a:t>
             </a:fld>
             <a:endParaRPr lang="en-US"/>
           </a:p>
@@ -3720,7 +3722,7 @@
           <a:p>
             <a:fld id="{6F69DFD9-279D-4F8A-9CB8-FA17EBD510E8}" type="datetimeFigureOut">
               <a:rPr lang="en-US" smtClean="0"/>
-              <a:t>5/13/2014</a:t>
+              <a:t>5/15/2014</a:t>
             </a:fld>
             <a:endParaRPr lang="en-US"/>
           </a:p>
@@ -3997,7 +3999,7 @@
           <a:p>
             <a:fld id="{6F69DFD9-279D-4F8A-9CB8-FA17EBD510E8}" type="datetimeFigureOut">
               <a:rPr lang="en-US" smtClean="0"/>
-              <a:t>5/13/2014</a:t>
+              <a:t>5/15/2014</a:t>
             </a:fld>
             <a:endParaRPr lang="en-US"/>
           </a:p>
@@ -4254,7 +4256,7 @@
           <a:p>
             <a:fld id="{6F69DFD9-279D-4F8A-9CB8-FA17EBD510E8}" type="datetimeFigureOut">
               <a:rPr lang="en-US" smtClean="0"/>
-              <a:t>5/13/2014</a:t>
+              <a:t>5/15/2014</a:t>
             </a:fld>
             <a:endParaRPr lang="en-US"/>
           </a:p>
@@ -4477,7 +4479,7 @@
           <a:p>
             <a:fld id="{6F69DFD9-279D-4F8A-9CB8-FA17EBD510E8}" type="datetimeFigureOut">
               <a:rPr lang="en-US" smtClean="0"/>
-              <a:t>5/13/2014</a:t>
+              <a:t>5/15/2014</a:t>
             </a:fld>
             <a:endParaRPr lang="en-US"/>
           </a:p>
@@ -5950,6 +5952,472 @@
           <a:p>
             <a:r>
               <a:rPr lang="en-US" dirty="0" smtClean="0"/>
+              <a:t>Book Errata</a:t>
+            </a:r>
+            <a:endParaRPr lang="en-US" dirty="0"/>
+          </a:p>
+        </p:txBody>
+      </p:sp>
+      <p:pic>
+        <p:nvPicPr>
+          <p:cNvPr id="1026" name="Picture 2"/>
+          <p:cNvPicPr>
+            <a:picLocks noChangeAspect="1" noChangeArrowheads="1"/>
+          </p:cNvPicPr>
+          <p:nvPr/>
+        </p:nvPicPr>
+        <p:blipFill>
+          <a:blip r:embed="rId2">
+            <a:extLst>
+              <a:ext uri="{28A0092B-C50C-407E-A947-70E740481C1C}">
+                <a14:useLocalDpi xmlns:a14="http://schemas.microsoft.com/office/drawing/2010/main" val="0"/>
+              </a:ext>
+            </a:extLst>
+          </a:blip>
+          <a:srcRect/>
+          <a:stretch>
+            <a:fillRect/>
+          </a:stretch>
+        </p:blipFill>
+        <p:spPr bwMode="auto">
+          <a:xfrm>
+            <a:off x="2057400" y="1524000"/>
+            <a:ext cx="4781550" cy="4743959"/>
+          </a:xfrm>
+          <a:prstGeom prst="rect">
+            <a:avLst/>
+          </a:prstGeom>
+          <a:noFill/>
+          <a:ln>
+            <a:noFill/>
+          </a:ln>
+          <a:extLst>
+            <a:ext uri="{909E8E84-426E-40DD-AFC4-6F175D3DCCD1}">
+              <a14:hiddenFill xmlns:a14="http://schemas.microsoft.com/office/drawing/2010/main">
+                <a:solidFill>
+                  <a:schemeClr val="accent1"/>
+                </a:solidFill>
+              </a14:hiddenFill>
+            </a:ext>
+            <a:ext uri="{91240B29-F687-4F45-9708-019B960494DF}">
+              <a14:hiddenLine xmlns:a14="http://schemas.microsoft.com/office/drawing/2010/main" w="9525">
+                <a:solidFill>
+                  <a:schemeClr val="tx1"/>
+                </a:solidFill>
+                <a:miter lim="800000"/>
+                <a:headEnd/>
+                <a:tailEnd/>
+              </a14:hiddenLine>
+            </a:ext>
+          </a:extLst>
+        </p:spPr>
+      </p:pic>
+      <p:sp>
+        <p:nvSpPr>
+          <p:cNvPr id="4" name="TextBox 3"/>
+          <p:cNvSpPr txBox="1"/>
+          <p:nvPr/>
+        </p:nvSpPr>
+        <p:spPr>
+          <a:xfrm>
+            <a:off x="1872669" y="6444734"/>
+            <a:ext cx="3555140" cy="369332"/>
+          </a:xfrm>
+          <a:prstGeom prst="rect">
+            <a:avLst/>
+          </a:prstGeom>
+          <a:noFill/>
+        </p:spPr>
+        <p:txBody>
+          <a:bodyPr wrap="none" rtlCol="0">
+            <a:spAutoFit/>
+          </a:bodyPr>
+          <a:lstStyle/>
+          <a:p>
+            <a:r>
+              <a:rPr lang="en-US" dirty="0" smtClean="0"/>
+              <a:t>Chapter 8, page 114 (126 in the file)</a:t>
+            </a:r>
+            <a:endParaRPr lang="en-US" dirty="0"/>
+          </a:p>
+        </p:txBody>
+      </p:sp>
+      <p:sp>
+        <p:nvSpPr>
+          <p:cNvPr id="5" name="&quot;No&quot; Symbol 4"/>
+          <p:cNvSpPr/>
+          <p:nvPr/>
+        </p:nvSpPr>
+        <p:spPr>
+          <a:xfrm>
+            <a:off x="2286000" y="1524000"/>
+            <a:ext cx="4800600" cy="4800600"/>
+          </a:xfrm>
+          <a:prstGeom prst="noSmoking">
+            <a:avLst/>
+          </a:prstGeom>
+          <a:solidFill>
+            <a:srgbClr val="FF0000"/>
+          </a:solidFill>
+          <a:ln>
+            <a:solidFill>
+              <a:schemeClr val="tx1"/>
+            </a:solidFill>
+          </a:ln>
+        </p:spPr>
+        <p:style>
+          <a:lnRef idx="2">
+            <a:schemeClr val="accent1">
+              <a:shade val="50000"/>
+            </a:schemeClr>
+          </a:lnRef>
+          <a:fillRef idx="1">
+            <a:schemeClr val="accent1"/>
+          </a:fillRef>
+          <a:effectRef idx="0">
+            <a:schemeClr val="accent1"/>
+          </a:effectRef>
+          <a:fontRef idx="minor">
+            <a:schemeClr val="lt1"/>
+          </a:fontRef>
+        </p:style>
+        <p:txBody>
+          <a:bodyPr rtlCol="0" anchor="ctr"/>
+          <a:lstStyle/>
+          <a:p>
+            <a:pPr algn="ctr"/>
+            <a:endParaRPr lang="en-US">
+              <a:solidFill>
+                <a:schemeClr val="tx1"/>
+              </a:solidFill>
+            </a:endParaRPr>
+          </a:p>
+        </p:txBody>
+      </p:sp>
+    </p:spTree>
+    <p:extLst>
+      <p:ext uri="{BB962C8B-B14F-4D97-AF65-F5344CB8AC3E}">
+        <p14:creationId xmlns:p14="http://schemas.microsoft.com/office/powerpoint/2010/main" val="1661918988"/>
+      </p:ext>
+    </p:extLst>
+  </p:cSld>
+  <p:clrMapOvr>
+    <a:masterClrMapping/>
+  </p:clrMapOvr>
+  <p:timing>
+    <p:tnLst>
+      <p:par>
+        <p:cTn id="1" dur="indefinite" restart="never" nodeType="tmRoot">
+          <p:childTnLst>
+            <p:seq concurrent="1" nextAc="seek">
+              <p:cTn id="2" dur="indefinite" nodeType="mainSeq">
+                <p:childTnLst>
+                  <p:par>
+                    <p:cTn id="3" fill="hold">
+                      <p:stCondLst>
+                        <p:cond delay="indefinite"/>
+                      </p:stCondLst>
+                      <p:childTnLst>
+                        <p:par>
+                          <p:cTn id="4" fill="hold">
+                            <p:stCondLst>
+                              <p:cond delay="0"/>
+                            </p:stCondLst>
+                            <p:childTnLst>
+                              <p:par>
+                                <p:cTn id="5" presetID="53" presetClass="entr" presetSubtype="16" fill="hold" grpId="0" nodeType="clickEffect">
+                                  <p:stCondLst>
+                                    <p:cond delay="0"/>
+                                  </p:stCondLst>
+                                  <p:childTnLst>
+                                    <p:set>
+                                      <p:cBhvr>
+                                        <p:cTn id="6" dur="1" fill="hold">
+                                          <p:stCondLst>
+                                            <p:cond delay="0"/>
+                                          </p:stCondLst>
+                                        </p:cTn>
+                                        <p:tgtEl>
+                                          <p:spTgt spid="5"/>
+                                        </p:tgtEl>
+                                        <p:attrNameLst>
+                                          <p:attrName>style.visibility</p:attrName>
+                                        </p:attrNameLst>
+                                      </p:cBhvr>
+                                      <p:to>
+                                        <p:strVal val="visible"/>
+                                      </p:to>
+                                    </p:set>
+                                    <p:anim calcmode="lin" valueType="num">
+                                      <p:cBhvr>
+                                        <p:cTn id="7" dur="500" fill="hold"/>
+                                        <p:tgtEl>
+                                          <p:spTgt spid="5"/>
+                                        </p:tgtEl>
+                                        <p:attrNameLst>
+                                          <p:attrName>ppt_w</p:attrName>
+                                        </p:attrNameLst>
+                                      </p:cBhvr>
+                                      <p:tavLst>
+                                        <p:tav tm="0">
+                                          <p:val>
+                                            <p:fltVal val="0"/>
+                                          </p:val>
+                                        </p:tav>
+                                        <p:tav tm="100000">
+                                          <p:val>
+                                            <p:strVal val="#ppt_w"/>
+                                          </p:val>
+                                        </p:tav>
+                                      </p:tavLst>
+                                    </p:anim>
+                                    <p:anim calcmode="lin" valueType="num">
+                                      <p:cBhvr>
+                                        <p:cTn id="8" dur="500" fill="hold"/>
+                                        <p:tgtEl>
+                                          <p:spTgt spid="5"/>
+                                        </p:tgtEl>
+                                        <p:attrNameLst>
+                                          <p:attrName>ppt_h</p:attrName>
+                                        </p:attrNameLst>
+                                      </p:cBhvr>
+                                      <p:tavLst>
+                                        <p:tav tm="0">
+                                          <p:val>
+                                            <p:fltVal val="0"/>
+                                          </p:val>
+                                        </p:tav>
+                                        <p:tav tm="100000">
+                                          <p:val>
+                                            <p:strVal val="#ppt_h"/>
+                                          </p:val>
+                                        </p:tav>
+                                      </p:tavLst>
+                                    </p:anim>
+                                    <p:animEffect transition="in" filter="fade">
+                                      <p:cBhvr>
+                                        <p:cTn id="9" dur="500"/>
+                                        <p:tgtEl>
+                                          <p:spTgt spid="5"/>
+                                        </p:tgtEl>
+                                      </p:cBhvr>
+                                    </p:animEffect>
+                                  </p:childTnLst>
+                                </p:cTn>
+                              </p:par>
+                            </p:childTnLst>
+                          </p:cTn>
+                        </p:par>
+                      </p:childTnLst>
+                    </p:cTn>
+                  </p:par>
+                </p:childTnLst>
+              </p:cTn>
+              <p:prevCondLst>
+                <p:cond evt="onPrev" delay="0">
+                  <p:tgtEl>
+                    <p:sldTgt/>
+                  </p:tgtEl>
+                </p:cond>
+              </p:prevCondLst>
+              <p:nextCondLst>
+                <p:cond evt="onNext" delay="0">
+                  <p:tgtEl>
+                    <p:sldTgt/>
+                  </p:tgtEl>
+                </p:cond>
+              </p:nextCondLst>
+            </p:seq>
+          </p:childTnLst>
+        </p:cTn>
+      </p:par>
+    </p:tnLst>
+    <p:bldLst>
+      <p:bldP spid="5" grpId="0" animBg="1"/>
+    </p:bldLst>
+  </p:timing>
+</p:sld>
+</file>
+
+<file path=ppt/slides/slide18.xml><?xml version="1.0" encoding="utf-8"?>
+<p:sld xmlns:a="http://schemas.openxmlformats.org/drawingml/2006/main" xmlns:r="http://schemas.openxmlformats.org/officeDocument/2006/relationships" xmlns:p="http://schemas.openxmlformats.org/presentationml/2006/main">
+  <p:cSld>
+    <p:spTree>
+      <p:nvGrpSpPr>
+        <p:cNvPr id="1" name=""/>
+        <p:cNvGrpSpPr/>
+        <p:nvPr/>
+      </p:nvGrpSpPr>
+      <p:grpSpPr>
+        <a:xfrm>
+          <a:off x="0" y="0"/>
+          <a:ext cx="0" cy="0"/>
+          <a:chOff x="0" y="0"/>
+          <a:chExt cx="0" cy="0"/>
+        </a:xfrm>
+      </p:grpSpPr>
+      <p:sp>
+        <p:nvSpPr>
+          <p:cNvPr id="2" name="Title 1"/>
+          <p:cNvSpPr>
+            <a:spLocks noGrp="1"/>
+          </p:cNvSpPr>
+          <p:nvPr>
+            <p:ph type="title"/>
+          </p:nvPr>
+        </p:nvSpPr>
+        <p:spPr/>
+        <p:txBody>
+          <a:bodyPr/>
+          <a:lstStyle/>
+          <a:p>
+            <a:r>
+              <a:rPr lang="en-US" dirty="0" smtClean="0"/>
+              <a:t>Book Errata</a:t>
+            </a:r>
+            <a:endParaRPr lang="en-US" dirty="0"/>
+          </a:p>
+        </p:txBody>
+      </p:sp>
+      <p:pic>
+        <p:nvPicPr>
+          <p:cNvPr id="2050" name="Picture 2"/>
+          <p:cNvPicPr>
+            <a:picLocks noChangeAspect="1" noChangeArrowheads="1"/>
+          </p:cNvPicPr>
+          <p:nvPr/>
+        </p:nvPicPr>
+        <p:blipFill>
+          <a:blip r:embed="rId2">
+            <a:extLst>
+              <a:ext uri="{28A0092B-C50C-407E-A947-70E740481C1C}">
+                <a14:useLocalDpi xmlns:a14="http://schemas.microsoft.com/office/drawing/2010/main" val="0"/>
+              </a:ext>
+            </a:extLst>
+          </a:blip>
+          <a:srcRect/>
+          <a:stretch>
+            <a:fillRect/>
+          </a:stretch>
+        </p:blipFill>
+        <p:spPr bwMode="auto">
+          <a:xfrm>
+            <a:off x="1447800" y="1119228"/>
+            <a:ext cx="7443788" cy="5369440"/>
+          </a:xfrm>
+          <a:prstGeom prst="rect">
+            <a:avLst/>
+          </a:prstGeom>
+          <a:noFill/>
+          <a:ln>
+            <a:noFill/>
+          </a:ln>
+          <a:extLst>
+            <a:ext uri="{909E8E84-426E-40DD-AFC4-6F175D3DCCD1}">
+              <a14:hiddenFill xmlns:a14="http://schemas.microsoft.com/office/drawing/2010/main">
+                <a:solidFill>
+                  <a:schemeClr val="accent1"/>
+                </a:solidFill>
+              </a14:hiddenFill>
+            </a:ext>
+            <a:ext uri="{91240B29-F687-4F45-9708-019B960494DF}">
+              <a14:hiddenLine xmlns:a14="http://schemas.microsoft.com/office/drawing/2010/main" w="9525">
+                <a:solidFill>
+                  <a:schemeClr val="tx1"/>
+                </a:solidFill>
+                <a:miter lim="800000"/>
+                <a:headEnd/>
+                <a:tailEnd/>
+              </a14:hiddenLine>
+            </a:ext>
+          </a:extLst>
+        </p:spPr>
+      </p:pic>
+      <p:sp>
+        <p:nvSpPr>
+          <p:cNvPr id="3" name="Rectangle 2"/>
+          <p:cNvSpPr/>
+          <p:nvPr/>
+        </p:nvSpPr>
+        <p:spPr>
+          <a:xfrm>
+            <a:off x="1447800" y="6471605"/>
+            <a:ext cx="5791200" cy="369332"/>
+          </a:xfrm>
+          <a:prstGeom prst="rect">
+            <a:avLst/>
+          </a:prstGeom>
+        </p:spPr>
+        <p:txBody>
+          <a:bodyPr wrap="square">
+            <a:spAutoFit/>
+          </a:bodyPr>
+          <a:lstStyle/>
+          <a:p>
+            <a:r>
+              <a:rPr lang="en-US" dirty="0">
+                <a:hlinkClick r:id="rId3"/>
+              </a:rPr>
+              <a:t>https://github.com/yfain/Java4Kids_NoStarchPress/issues/1</a:t>
+            </a:r>
+            <a:endParaRPr lang="en-US" dirty="0"/>
+          </a:p>
+        </p:txBody>
+      </p:sp>
+    </p:spTree>
+    <p:extLst>
+      <p:ext uri="{BB962C8B-B14F-4D97-AF65-F5344CB8AC3E}">
+        <p14:creationId xmlns:p14="http://schemas.microsoft.com/office/powerpoint/2010/main" val="2342199694"/>
+      </p:ext>
+    </p:extLst>
+  </p:cSld>
+  <p:clrMapOvr>
+    <a:masterClrMapping/>
+  </p:clrMapOvr>
+  <p:timing>
+    <p:tnLst>
+      <p:par>
+        <p:cTn id="1" dur="indefinite" restart="never" nodeType="tmRoot"/>
+      </p:par>
+    </p:tnLst>
+  </p:timing>
+</p:sld>
+</file>
+
+<file path=ppt/slides/slide19.xml><?xml version="1.0" encoding="utf-8"?>
+<p:sld xmlns:a="http://schemas.openxmlformats.org/drawingml/2006/main" xmlns:r="http://schemas.openxmlformats.org/officeDocument/2006/relationships" xmlns:p="http://schemas.openxmlformats.org/presentationml/2006/main">
+  <p:cSld>
+    <p:spTree>
+      <p:nvGrpSpPr>
+        <p:cNvPr id="1" name=""/>
+        <p:cNvGrpSpPr/>
+        <p:nvPr/>
+      </p:nvGrpSpPr>
+      <p:grpSpPr>
+        <a:xfrm>
+          <a:off x="0" y="0"/>
+          <a:ext cx="0" cy="0"/>
+          <a:chOff x="0" y="0"/>
+          <a:chExt cx="0" cy="0"/>
+        </a:xfrm>
+      </p:grpSpPr>
+      <p:sp>
+        <p:nvSpPr>
+          <p:cNvPr id="2" name="Title 1"/>
+          <p:cNvSpPr>
+            <a:spLocks noGrp="1"/>
+          </p:cNvSpPr>
+          <p:nvPr>
+            <p:ph type="title"/>
+          </p:nvPr>
+        </p:nvSpPr>
+        <p:spPr/>
+        <p:txBody>
+          <a:bodyPr/>
+          <a:lstStyle/>
+          <a:p>
+            <a:r>
+              <a:rPr lang="en-US" dirty="0" smtClean="0"/>
               <a:t>Catch order</a:t>
             </a:r>
             <a:endParaRPr lang="en-US" dirty="0"/>
@@ -6030,7 +6498,137 @@
 </p:sld>
 </file>
 
-<file path=ppt/slides/slide18.xml><?xml version="1.0" encoding="utf-8"?>
+<file path=ppt/slides/slide2.xml><?xml version="1.0" encoding="utf-8"?>
+<p:sld xmlns:a="http://schemas.openxmlformats.org/drawingml/2006/main" xmlns:r="http://schemas.openxmlformats.org/officeDocument/2006/relationships" xmlns:p="http://schemas.openxmlformats.org/presentationml/2006/main">
+  <p:cSld>
+    <p:spTree>
+      <p:nvGrpSpPr>
+        <p:cNvPr id="1" name=""/>
+        <p:cNvGrpSpPr/>
+        <p:nvPr/>
+      </p:nvGrpSpPr>
+      <p:grpSpPr>
+        <a:xfrm>
+          <a:off x="0" y="0"/>
+          <a:ext cx="0" cy="0"/>
+          <a:chOff x="0" y="0"/>
+          <a:chExt cx="0" cy="0"/>
+        </a:xfrm>
+      </p:grpSpPr>
+      <p:sp>
+        <p:nvSpPr>
+          <p:cNvPr id="2" name="Title 1"/>
+          <p:cNvSpPr>
+            <a:spLocks noGrp="1"/>
+          </p:cNvSpPr>
+          <p:nvPr>
+            <p:ph type="title"/>
+          </p:nvPr>
+        </p:nvSpPr>
+        <p:spPr/>
+        <p:txBody>
+          <a:bodyPr/>
+          <a:lstStyle/>
+          <a:p>
+            <a:r>
+              <a:rPr lang="en-US" dirty="0" smtClean="0"/>
+              <a:t>HTML-elements</a:t>
+            </a:r>
+            <a:endParaRPr lang="en-US" dirty="0"/>
+          </a:p>
+        </p:txBody>
+      </p:sp>
+      <p:sp>
+        <p:nvSpPr>
+          <p:cNvPr id="3" name="Content Placeholder 2"/>
+          <p:cNvSpPr>
+            <a:spLocks noGrp="1"/>
+          </p:cNvSpPr>
+          <p:nvPr>
+            <p:ph idx="1"/>
+          </p:nvPr>
+        </p:nvSpPr>
+        <p:spPr/>
+        <p:txBody>
+          <a:bodyPr/>
+          <a:lstStyle/>
+          <a:p>
+            <a:pPr marL="0" indent="0">
+              <a:buNone/>
+            </a:pPr>
+            <a:r>
+              <a:rPr lang="en-US" dirty="0" smtClean="0"/>
+              <a:t>An element starts with ‘&lt;‘ and ends with ‘&gt;’.</a:t>
+            </a:r>
+          </a:p>
+          <a:p>
+            <a:pPr marL="0" indent="0">
+              <a:buNone/>
+            </a:pPr>
+            <a:r>
+              <a:rPr lang="en-US" dirty="0" smtClean="0"/>
+              <a:t>A start element ‘&lt;tag&gt;’ must always be followed somewhere with an end element ‘&lt;/tag&gt;’.</a:t>
+            </a:r>
+          </a:p>
+          <a:p>
+            <a:pPr marL="0" indent="0">
+              <a:buNone/>
+            </a:pPr>
+            <a:r>
+              <a:rPr lang="en-US" dirty="0" smtClean="0"/>
+              <a:t>In between there can be other tags nested.</a:t>
+            </a:r>
+          </a:p>
+          <a:p>
+            <a:pPr marL="0" indent="0">
+              <a:buNone/>
+            </a:pPr>
+            <a:r>
+              <a:rPr lang="en-US" dirty="0" smtClean="0"/>
+              <a:t>An element with nothing inside is called an empty element ‘&lt;tag /&gt;’.</a:t>
+            </a:r>
+          </a:p>
+          <a:p>
+            <a:pPr marL="0" indent="0">
+              <a:buNone/>
+            </a:pPr>
+            <a:endParaRPr lang="en-US" dirty="0" smtClean="0"/>
+          </a:p>
+          <a:p>
+            <a:pPr marL="0" indent="0">
+              <a:buNone/>
+            </a:pPr>
+            <a:endParaRPr lang="en-US" dirty="0" smtClean="0"/>
+          </a:p>
+          <a:p>
+            <a:pPr marL="0" indent="0">
+              <a:buNone/>
+            </a:pPr>
+            <a:endParaRPr lang="en-US" dirty="0"/>
+          </a:p>
+        </p:txBody>
+      </p:sp>
+    </p:spTree>
+    <p:extLst>
+      <p:ext uri="{BB962C8B-B14F-4D97-AF65-F5344CB8AC3E}">
+        <p14:creationId xmlns:p14="http://schemas.microsoft.com/office/powerpoint/2010/main" val="853688516"/>
+      </p:ext>
+    </p:extLst>
+  </p:cSld>
+  <p:clrMapOvr>
+    <a:masterClrMapping/>
+  </p:clrMapOvr>
+  <p:timing>
+    <p:tnLst>
+      <p:par>
+        <p:cTn id="1" dur="indefinite" restart="never" nodeType="tmRoot"/>
+      </p:par>
+    </p:tnLst>
+  </p:timing>
+</p:sld>
+</file>
+
+<file path=ppt/slides/slide20.xml><?xml version="1.0" encoding="utf-8"?>
 <p:sld xmlns:a="http://schemas.openxmlformats.org/drawingml/2006/main" xmlns:r="http://schemas.openxmlformats.org/officeDocument/2006/relationships" xmlns:p="http://schemas.openxmlformats.org/presentationml/2006/main">
   <p:cSld>
     <p:spTree>
@@ -6144,7 +6742,7 @@
 </p:sld>
 </file>
 
-<file path=ppt/slides/slide19.xml><?xml version="1.0" encoding="utf-8"?>
+<file path=ppt/slides/slide21.xml><?xml version="1.0" encoding="utf-8"?>
 <p:sld xmlns:a="http://schemas.openxmlformats.org/drawingml/2006/main" xmlns:r="http://schemas.openxmlformats.org/officeDocument/2006/relationships" xmlns:p="http://schemas.openxmlformats.org/presentationml/2006/main">
   <p:cSld>
     <p:spTree>
@@ -6312,137 +6910,7 @@
 </p:sld>
 </file>
 
-<file path=ppt/slides/slide2.xml><?xml version="1.0" encoding="utf-8"?>
-<p:sld xmlns:a="http://schemas.openxmlformats.org/drawingml/2006/main" xmlns:r="http://schemas.openxmlformats.org/officeDocument/2006/relationships" xmlns:p="http://schemas.openxmlformats.org/presentationml/2006/main">
-  <p:cSld>
-    <p:spTree>
-      <p:nvGrpSpPr>
-        <p:cNvPr id="1" name=""/>
-        <p:cNvGrpSpPr/>
-        <p:nvPr/>
-      </p:nvGrpSpPr>
-      <p:grpSpPr>
-        <a:xfrm>
-          <a:off x="0" y="0"/>
-          <a:ext cx="0" cy="0"/>
-          <a:chOff x="0" y="0"/>
-          <a:chExt cx="0" cy="0"/>
-        </a:xfrm>
-      </p:grpSpPr>
-      <p:sp>
-        <p:nvSpPr>
-          <p:cNvPr id="2" name="Title 1"/>
-          <p:cNvSpPr>
-            <a:spLocks noGrp="1"/>
-          </p:cNvSpPr>
-          <p:nvPr>
-            <p:ph type="title"/>
-          </p:nvPr>
-        </p:nvSpPr>
-        <p:spPr/>
-        <p:txBody>
-          <a:bodyPr/>
-          <a:lstStyle/>
-          <a:p>
-            <a:r>
-              <a:rPr lang="en-US" dirty="0" smtClean="0"/>
-              <a:t>HTML-elements</a:t>
-            </a:r>
-            <a:endParaRPr lang="en-US" dirty="0"/>
-          </a:p>
-        </p:txBody>
-      </p:sp>
-      <p:sp>
-        <p:nvSpPr>
-          <p:cNvPr id="3" name="Content Placeholder 2"/>
-          <p:cNvSpPr>
-            <a:spLocks noGrp="1"/>
-          </p:cNvSpPr>
-          <p:nvPr>
-            <p:ph idx="1"/>
-          </p:nvPr>
-        </p:nvSpPr>
-        <p:spPr/>
-        <p:txBody>
-          <a:bodyPr/>
-          <a:lstStyle/>
-          <a:p>
-            <a:pPr marL="0" indent="0">
-              <a:buNone/>
-            </a:pPr>
-            <a:r>
-              <a:rPr lang="en-US" dirty="0" smtClean="0"/>
-              <a:t>An element starts with ‘&lt;‘ and ends with ‘&gt;’.</a:t>
-            </a:r>
-          </a:p>
-          <a:p>
-            <a:pPr marL="0" indent="0">
-              <a:buNone/>
-            </a:pPr>
-            <a:r>
-              <a:rPr lang="en-US" dirty="0" smtClean="0"/>
-              <a:t>A start element ‘&lt;tag&gt;’ must always be followed somewhere with an end element ‘&lt;/tag&gt;’.</a:t>
-            </a:r>
-          </a:p>
-          <a:p>
-            <a:pPr marL="0" indent="0">
-              <a:buNone/>
-            </a:pPr>
-            <a:r>
-              <a:rPr lang="en-US" dirty="0" smtClean="0"/>
-              <a:t>In between there can be other tags nested.</a:t>
-            </a:r>
-          </a:p>
-          <a:p>
-            <a:pPr marL="0" indent="0">
-              <a:buNone/>
-            </a:pPr>
-            <a:r>
-              <a:rPr lang="en-US" dirty="0" smtClean="0"/>
-              <a:t>An element with nothing inside is called an empty element ‘&lt;tag /&gt;’.</a:t>
-            </a:r>
-          </a:p>
-          <a:p>
-            <a:pPr marL="0" indent="0">
-              <a:buNone/>
-            </a:pPr>
-            <a:endParaRPr lang="en-US" dirty="0" smtClean="0"/>
-          </a:p>
-          <a:p>
-            <a:pPr marL="0" indent="0">
-              <a:buNone/>
-            </a:pPr>
-            <a:endParaRPr lang="en-US" dirty="0" smtClean="0"/>
-          </a:p>
-          <a:p>
-            <a:pPr marL="0" indent="0">
-              <a:buNone/>
-            </a:pPr>
-            <a:endParaRPr lang="en-US" dirty="0"/>
-          </a:p>
-        </p:txBody>
-      </p:sp>
-    </p:spTree>
-    <p:extLst>
-      <p:ext uri="{BB962C8B-B14F-4D97-AF65-F5344CB8AC3E}">
-        <p14:creationId xmlns:p14="http://schemas.microsoft.com/office/powerpoint/2010/main" val="853688516"/>
-      </p:ext>
-    </p:extLst>
-  </p:cSld>
-  <p:clrMapOvr>
-    <a:masterClrMapping/>
-  </p:clrMapOvr>
-  <p:timing>
-    <p:tnLst>
-      <p:par>
-        <p:cTn id="1" dur="indefinite" restart="never" nodeType="tmRoot"/>
-      </p:par>
-    </p:tnLst>
-  </p:timing>
-</p:sld>
-</file>
-
-<file path=ppt/slides/slide20.xml><?xml version="1.0" encoding="utf-8"?>
+<file path=ppt/slides/slide22.xml><?xml version="1.0" encoding="utf-8"?>
 <p:sld xmlns:a="http://schemas.openxmlformats.org/drawingml/2006/main" xmlns:r="http://schemas.openxmlformats.org/officeDocument/2006/relationships" xmlns:p="http://schemas.openxmlformats.org/presentationml/2006/main">
   <p:cSld>
     <p:spTree>
@@ -6610,7 +7078,7 @@
 </p:sld>
 </file>
 
-<file path=ppt/slides/slide21.xml><?xml version="1.0" encoding="utf-8"?>
+<file path=ppt/slides/slide23.xml><?xml version="1.0" encoding="utf-8"?>
 <p:sld xmlns:a="http://schemas.openxmlformats.org/drawingml/2006/main" xmlns:r="http://schemas.openxmlformats.org/officeDocument/2006/relationships" xmlns:p="http://schemas.openxmlformats.org/presentationml/2006/main">
   <p:cSld>
     <p:spTree>
@@ -6832,7 +7300,7 @@
 </p:sld>
 </file>
 
-<file path=ppt/slides/slide22.xml><?xml version="1.0" encoding="utf-8"?>
+<file path=ppt/slides/slide24.xml><?xml version="1.0" encoding="utf-8"?>
 <p:sld xmlns:a="http://schemas.openxmlformats.org/drawingml/2006/main" xmlns:r="http://schemas.openxmlformats.org/officeDocument/2006/relationships" xmlns:p="http://schemas.openxmlformats.org/presentationml/2006/main">
   <p:cSld>
     <p:spTree>
@@ -6915,7 +7383,7 @@
 </p:sld>
 </file>
 
-<file path=ppt/slides/slide23.xml><?xml version="1.0" encoding="utf-8"?>
+<file path=ppt/slides/slide25.xml><?xml version="1.0" encoding="utf-8"?>
 <p:sld xmlns:a="http://schemas.openxmlformats.org/drawingml/2006/main" xmlns:r="http://schemas.openxmlformats.org/officeDocument/2006/relationships" xmlns:p="http://schemas.openxmlformats.org/presentationml/2006/main">
   <p:cSld>
     <p:spTree>
@@ -7029,7 +7497,7 @@
 </p:sld>
 </file>
 
-<file path=ppt/slides/slide24.xml><?xml version="1.0" encoding="utf-8"?>
+<file path=ppt/slides/slide26.xml><?xml version="1.0" encoding="utf-8"?>
 <p:sld xmlns:a="http://schemas.openxmlformats.org/drawingml/2006/main" xmlns:r="http://schemas.openxmlformats.org/officeDocument/2006/relationships" xmlns:p="http://schemas.openxmlformats.org/presentationml/2006/main">
   <p:cSld>
     <p:spTree>
@@ -7502,7 +7970,7 @@
 </p:sld>
 </file>
 
-<file path=ppt/slides/slide25.xml><?xml version="1.0" encoding="utf-8"?>
+<file path=ppt/slides/slide27.xml><?xml version="1.0" encoding="utf-8"?>
 <p:sld xmlns:a="http://schemas.openxmlformats.org/drawingml/2006/main" xmlns:r="http://schemas.openxmlformats.org/officeDocument/2006/relationships" xmlns:p="http://schemas.openxmlformats.org/presentationml/2006/main">
   <p:cSld>
     <p:spTree>
@@ -7550,7 +8018,7 @@
         </p:nvSpPr>
         <p:spPr>
           <a:xfrm>
-            <a:off x="3886200" y="2924502"/>
+            <a:off x="3386538" y="3225653"/>
             <a:ext cx="530352" cy="325096"/>
           </a:xfrm>
           <a:prstGeom prst="triangle">
@@ -7593,8 +8061,8 @@
         </p:nvCxnSpPr>
         <p:spPr>
           <a:xfrm>
-            <a:off x="4151376" y="3249598"/>
-            <a:ext cx="0" cy="1246202"/>
+            <a:off x="3651714" y="3550749"/>
+            <a:ext cx="0" cy="921105"/>
           </a:xfrm>
           <a:prstGeom prst="straightConnector1">
             <a:avLst/>
@@ -7626,10 +8094,598 @@
         </p:nvSpPr>
         <p:spPr>
           <a:xfrm>
-            <a:off x="3471842" y="4495800"/>
+            <a:off x="2470615" y="4471855"/>
             <a:ext cx="2362200" cy="838200"/>
           </a:xfrm>
+          <a:custGeom>
+            <a:avLst/>
+            <a:gdLst>
+              <a:gd name="connsiteX0" fmla="*/ 0 w 2362200"/>
+              <a:gd name="connsiteY0" fmla="*/ 0 h 838200"/>
+              <a:gd name="connsiteX1" fmla="*/ 2362200 w 2362200"/>
+              <a:gd name="connsiteY1" fmla="*/ 0 h 838200"/>
+              <a:gd name="connsiteX2" fmla="*/ 2362200 w 2362200"/>
+              <a:gd name="connsiteY2" fmla="*/ 838200 h 838200"/>
+              <a:gd name="connsiteX3" fmla="*/ 0 w 2362200"/>
+              <a:gd name="connsiteY3" fmla="*/ 838200 h 838200"/>
+              <a:gd name="connsiteX4" fmla="*/ 0 w 2362200"/>
+              <a:gd name="connsiteY4" fmla="*/ 0 h 838200"/>
+              <a:gd name="connsiteX0" fmla="*/ 0 w 2362200"/>
+              <a:gd name="connsiteY0" fmla="*/ 2249 h 840449"/>
+              <a:gd name="connsiteX1" fmla="*/ 1506073 w 2362200"/>
+              <a:gd name="connsiteY1" fmla="*/ 0 h 840449"/>
+              <a:gd name="connsiteX2" fmla="*/ 2362200 w 2362200"/>
+              <a:gd name="connsiteY2" fmla="*/ 2249 h 840449"/>
+              <a:gd name="connsiteX3" fmla="*/ 2362200 w 2362200"/>
+              <a:gd name="connsiteY3" fmla="*/ 840449 h 840449"/>
+              <a:gd name="connsiteX4" fmla="*/ 0 w 2362200"/>
+              <a:gd name="connsiteY4" fmla="*/ 840449 h 840449"/>
+              <a:gd name="connsiteX5" fmla="*/ 0 w 2362200"/>
+              <a:gd name="connsiteY5" fmla="*/ 2249 h 840449"/>
+              <a:gd name="connsiteX0" fmla="*/ 0 w 2362200"/>
+              <a:gd name="connsiteY0" fmla="*/ 0 h 838200"/>
+              <a:gd name="connsiteX1" fmla="*/ 2362200 w 2362200"/>
+              <a:gd name="connsiteY1" fmla="*/ 0 h 838200"/>
+              <a:gd name="connsiteX2" fmla="*/ 2362200 w 2362200"/>
+              <a:gd name="connsiteY2" fmla="*/ 838200 h 838200"/>
+              <a:gd name="connsiteX3" fmla="*/ 0 w 2362200"/>
+              <a:gd name="connsiteY3" fmla="*/ 838200 h 838200"/>
+              <a:gd name="connsiteX4" fmla="*/ 0 w 2362200"/>
+              <a:gd name="connsiteY4" fmla="*/ 0 h 838200"/>
+            </a:gdLst>
+            <a:ahLst/>
+            <a:cxnLst>
+              <a:cxn ang="0">
+                <a:pos x="connsiteX0" y="connsiteY0"/>
+              </a:cxn>
+              <a:cxn ang="0">
+                <a:pos x="connsiteX1" y="connsiteY1"/>
+              </a:cxn>
+              <a:cxn ang="0">
+                <a:pos x="connsiteX2" y="connsiteY2"/>
+              </a:cxn>
+              <a:cxn ang="0">
+                <a:pos x="connsiteX3" y="connsiteY3"/>
+              </a:cxn>
+              <a:cxn ang="0">
+                <a:pos x="connsiteX4" y="connsiteY4"/>
+              </a:cxn>
+            </a:cxnLst>
+            <a:rect l="l" t="t" r="r" b="b"/>
+            <a:pathLst>
+              <a:path w="2362200" h="838200">
+                <a:moveTo>
+                  <a:pt x="0" y="0"/>
+                </a:moveTo>
+                <a:lnTo>
+                  <a:pt x="2362200" y="0"/>
+                </a:lnTo>
+                <a:lnTo>
+                  <a:pt x="2362200" y="838200"/>
+                </a:lnTo>
+                <a:lnTo>
+                  <a:pt x="0" y="838200"/>
+                </a:lnTo>
+                <a:lnTo>
+                  <a:pt x="0" y="0"/>
+                </a:lnTo>
+                <a:close/>
+              </a:path>
+            </a:pathLst>
+          </a:custGeom>
+          <a:noFill/>
+        </p:spPr>
+        <p:style>
+          <a:lnRef idx="2">
+            <a:schemeClr val="accent1">
+              <a:shade val="50000"/>
+            </a:schemeClr>
+          </a:lnRef>
+          <a:fillRef idx="1">
+            <a:schemeClr val="accent1"/>
+          </a:fillRef>
+          <a:effectRef idx="0">
+            <a:schemeClr val="accent1"/>
+          </a:effectRef>
+          <a:fontRef idx="minor">
+            <a:schemeClr val="lt1"/>
+          </a:fontRef>
+        </p:style>
+        <p:txBody>
+          <a:bodyPr rtlCol="0" anchor="t"/>
+          <a:lstStyle/>
+          <a:p>
+            <a:pPr algn="ctr"/>
+            <a:r>
+              <a:rPr lang="en-US" dirty="0" smtClean="0">
+                <a:solidFill>
+                  <a:schemeClr val="tx1"/>
+                </a:solidFill>
+              </a:rPr>
+              <a:t>Student</a:t>
+            </a:r>
+            <a:endParaRPr lang="en-US" dirty="0">
+              <a:solidFill>
+                <a:schemeClr val="tx1"/>
+              </a:solidFill>
+            </a:endParaRPr>
+          </a:p>
+        </p:txBody>
+      </p:sp>
+      <p:sp>
+        <p:nvSpPr>
+          <p:cNvPr id="4" name="TextBox 3"/>
+          <p:cNvSpPr txBox="1"/>
+          <p:nvPr/>
+        </p:nvSpPr>
+        <p:spPr>
+          <a:xfrm>
+            <a:off x="36225" y="3262915"/>
+            <a:ext cx="3006079" cy="1200329"/>
+          </a:xfrm>
           <a:prstGeom prst="rect">
+            <a:avLst/>
+          </a:prstGeom>
+          <a:noFill/>
+        </p:spPr>
+        <p:txBody>
+          <a:bodyPr wrap="none" rtlCol="0">
+            <a:spAutoFit/>
+          </a:bodyPr>
+          <a:lstStyle/>
+          <a:p>
+            <a:r>
+              <a:rPr lang="en-US" dirty="0" smtClean="0"/>
+              <a:t>The line is dashed indicating</a:t>
+            </a:r>
+          </a:p>
+          <a:p>
+            <a:r>
+              <a:rPr lang="en-US" dirty="0" smtClean="0"/>
+              <a:t>a weaker relationship.</a:t>
+            </a:r>
+          </a:p>
+          <a:p>
+            <a:r>
+              <a:rPr lang="en-US" dirty="0" smtClean="0"/>
+              <a:t>A student is not only a learner</a:t>
+            </a:r>
+          </a:p>
+          <a:p>
+            <a:r>
+              <a:rPr lang="en-US" dirty="0" smtClean="0"/>
+              <a:t>She is just </a:t>
+            </a:r>
+            <a:r>
+              <a:rPr lang="en-US" u="sng" dirty="0" smtClean="0"/>
+              <a:t>able</a:t>
+            </a:r>
+            <a:r>
+              <a:rPr lang="en-US" dirty="0" smtClean="0"/>
+              <a:t> to learn</a:t>
+            </a:r>
+            <a:endParaRPr lang="en-US" dirty="0"/>
+          </a:p>
+        </p:txBody>
+      </p:sp>
+      <p:sp>
+        <p:nvSpPr>
+          <p:cNvPr id="22" name="TextBox 21"/>
+          <p:cNvSpPr txBox="1"/>
+          <p:nvPr/>
+        </p:nvSpPr>
+        <p:spPr>
+          <a:xfrm>
+            <a:off x="2590800" y="5835134"/>
+            <a:ext cx="4858894" cy="369332"/>
+          </a:xfrm>
+          <a:prstGeom prst="rect">
+            <a:avLst/>
+          </a:prstGeom>
+          <a:noFill/>
+        </p:spPr>
+        <p:txBody>
+          <a:bodyPr wrap="none" rtlCol="0">
+            <a:spAutoFit/>
+          </a:bodyPr>
+          <a:lstStyle/>
+          <a:p>
+            <a:r>
+              <a:rPr lang="en-US" dirty="0" smtClean="0"/>
+              <a:t>One class can implement more than one interface</a:t>
+            </a:r>
+            <a:endParaRPr lang="en-US" dirty="0"/>
+          </a:p>
+        </p:txBody>
+      </p:sp>
+      <p:grpSp>
+        <p:nvGrpSpPr>
+          <p:cNvPr id="10" name="Group 9"/>
+          <p:cNvGrpSpPr/>
+          <p:nvPr/>
+        </p:nvGrpSpPr>
+        <p:grpSpPr>
+          <a:xfrm>
+            <a:off x="2199172" y="1748950"/>
+            <a:ext cx="2905085" cy="1476703"/>
+            <a:chOff x="1747857" y="1447799"/>
+            <a:chExt cx="2905085" cy="1476703"/>
+          </a:xfrm>
+        </p:grpSpPr>
+        <p:grpSp>
+          <p:nvGrpSpPr>
+            <p:cNvPr id="14" name="Group 13"/>
+            <p:cNvGrpSpPr/>
+            <p:nvPr/>
+          </p:nvGrpSpPr>
+          <p:grpSpPr>
+            <a:xfrm>
+              <a:off x="1747857" y="1447799"/>
+              <a:ext cx="2905085" cy="1476703"/>
+              <a:chOff x="2971800" y="1447800"/>
+              <a:chExt cx="2362200" cy="838200"/>
+            </a:xfrm>
+          </p:grpSpPr>
+          <p:sp>
+            <p:nvSpPr>
+              <p:cNvPr id="8" name="Rectangle 7"/>
+              <p:cNvSpPr/>
+              <p:nvPr/>
+            </p:nvSpPr>
+            <p:spPr>
+              <a:xfrm>
+                <a:off x="2971800" y="1447800"/>
+                <a:ext cx="2362200" cy="838200"/>
+              </a:xfrm>
+              <a:prstGeom prst="rect">
+                <a:avLst/>
+              </a:prstGeom>
+              <a:noFill/>
+            </p:spPr>
+            <p:style>
+              <a:lnRef idx="2">
+                <a:schemeClr val="accent1">
+                  <a:shade val="50000"/>
+                </a:schemeClr>
+              </a:lnRef>
+              <a:fillRef idx="1">
+                <a:schemeClr val="accent1"/>
+              </a:fillRef>
+              <a:effectRef idx="0">
+                <a:schemeClr val="accent1"/>
+              </a:effectRef>
+              <a:fontRef idx="minor">
+                <a:schemeClr val="lt1"/>
+              </a:fontRef>
+            </p:style>
+            <p:txBody>
+              <a:bodyPr rtlCol="0" anchor="t"/>
+              <a:lstStyle/>
+              <a:p>
+                <a:pPr algn="ctr"/>
+                <a:r>
+                  <a:rPr lang="en-US" dirty="0" smtClean="0">
+                    <a:solidFill>
+                      <a:schemeClr val="tx1"/>
+                    </a:solidFill>
+                  </a:rPr>
+                  <a:t>&lt;&lt;Interface&gt;&gt;</a:t>
+                </a:r>
+              </a:p>
+              <a:p>
+                <a:pPr algn="ctr"/>
+                <a:r>
+                  <a:rPr lang="en-US" dirty="0" smtClean="0">
+                    <a:solidFill>
+                      <a:schemeClr val="tx1"/>
+                    </a:solidFill>
+                  </a:rPr>
+                  <a:t>Learner</a:t>
+                </a:r>
+                <a:endParaRPr lang="en-US" dirty="0">
+                  <a:solidFill>
+                    <a:schemeClr val="tx1"/>
+                  </a:solidFill>
+                </a:endParaRPr>
+              </a:p>
+            </p:txBody>
+          </p:sp>
+          <p:cxnSp>
+            <p:nvCxnSpPr>
+              <p:cNvPr id="11" name="Straight Connector 10"/>
+              <p:cNvCxnSpPr/>
+              <p:nvPr/>
+            </p:nvCxnSpPr>
+            <p:spPr>
+              <a:xfrm>
+                <a:off x="2971800" y="1876781"/>
+                <a:ext cx="2362200" cy="0"/>
+              </a:xfrm>
+              <a:prstGeom prst="line">
+                <a:avLst/>
+              </a:prstGeom>
+            </p:spPr>
+            <p:style>
+              <a:lnRef idx="1">
+                <a:schemeClr val="accent1"/>
+              </a:lnRef>
+              <a:fillRef idx="0">
+                <a:schemeClr val="accent1"/>
+              </a:fillRef>
+              <a:effectRef idx="0">
+                <a:schemeClr val="accent1"/>
+              </a:effectRef>
+              <a:fontRef idx="minor">
+                <a:schemeClr val="tx1"/>
+              </a:fontRef>
+            </p:style>
+          </p:cxnSp>
+          <p:cxnSp>
+            <p:nvCxnSpPr>
+              <p:cNvPr id="26" name="Straight Connector 25"/>
+              <p:cNvCxnSpPr/>
+              <p:nvPr/>
+            </p:nvCxnSpPr>
+            <p:spPr>
+              <a:xfrm>
+                <a:off x="2971800" y="2076450"/>
+                <a:ext cx="2362200" cy="0"/>
+              </a:xfrm>
+              <a:prstGeom prst="line">
+                <a:avLst/>
+              </a:prstGeom>
+            </p:spPr>
+            <p:style>
+              <a:lnRef idx="1">
+                <a:schemeClr val="accent1"/>
+              </a:lnRef>
+              <a:fillRef idx="0">
+                <a:schemeClr val="accent1"/>
+              </a:fillRef>
+              <a:effectRef idx="0">
+                <a:schemeClr val="accent1"/>
+              </a:effectRef>
+              <a:fontRef idx="minor">
+                <a:schemeClr val="tx1"/>
+              </a:fontRef>
+            </p:style>
+          </p:cxnSp>
+        </p:grpSp>
+        <p:sp>
+          <p:nvSpPr>
+            <p:cNvPr id="27" name="TextBox 26"/>
+            <p:cNvSpPr txBox="1"/>
+            <p:nvPr/>
+          </p:nvSpPr>
+          <p:spPr>
+            <a:xfrm>
+              <a:off x="1905948" y="2531225"/>
+              <a:ext cx="2661691" cy="369332"/>
+            </a:xfrm>
+            <a:prstGeom prst="rect">
+              <a:avLst/>
+            </a:prstGeom>
+            <a:noFill/>
+          </p:spPr>
+          <p:txBody>
+            <a:bodyPr wrap="none" rtlCol="0">
+              <a:spAutoFit/>
+            </a:bodyPr>
+            <a:lstStyle/>
+            <a:p>
+              <a:r>
+                <a:rPr lang="en-US" dirty="0" smtClean="0"/>
+                <a:t>+ learn(material: Material)</a:t>
+              </a:r>
+              <a:endParaRPr lang="en-US" dirty="0"/>
+            </a:p>
+          </p:txBody>
+        </p:sp>
+      </p:grpSp>
+      <p:grpSp>
+        <p:nvGrpSpPr>
+          <p:cNvPr id="25" name="Group 24"/>
+          <p:cNvGrpSpPr/>
+          <p:nvPr/>
+        </p:nvGrpSpPr>
+        <p:grpSpPr>
+          <a:xfrm>
+            <a:off x="5562600" y="1748950"/>
+            <a:ext cx="2905085" cy="1476703"/>
+            <a:chOff x="1747857" y="1447799"/>
+            <a:chExt cx="2905085" cy="1476703"/>
+          </a:xfrm>
+        </p:grpSpPr>
+        <p:grpSp>
+          <p:nvGrpSpPr>
+            <p:cNvPr id="28" name="Group 27"/>
+            <p:cNvGrpSpPr/>
+            <p:nvPr/>
+          </p:nvGrpSpPr>
+          <p:grpSpPr>
+            <a:xfrm>
+              <a:off x="1747857" y="1447799"/>
+              <a:ext cx="2905085" cy="1476703"/>
+              <a:chOff x="2971800" y="1447800"/>
+              <a:chExt cx="2362200" cy="838200"/>
+            </a:xfrm>
+          </p:grpSpPr>
+          <p:sp>
+            <p:nvSpPr>
+              <p:cNvPr id="35" name="Rectangle 34"/>
+              <p:cNvSpPr/>
+              <p:nvPr/>
+            </p:nvSpPr>
+            <p:spPr>
+              <a:xfrm>
+                <a:off x="2971800" y="1447800"/>
+                <a:ext cx="2362200" cy="838200"/>
+              </a:xfrm>
+              <a:prstGeom prst="rect">
+                <a:avLst/>
+              </a:prstGeom>
+              <a:noFill/>
+            </p:spPr>
+            <p:style>
+              <a:lnRef idx="2">
+                <a:schemeClr val="accent1">
+                  <a:shade val="50000"/>
+                </a:schemeClr>
+              </a:lnRef>
+              <a:fillRef idx="1">
+                <a:schemeClr val="accent1"/>
+              </a:fillRef>
+              <a:effectRef idx="0">
+                <a:schemeClr val="accent1"/>
+              </a:effectRef>
+              <a:fontRef idx="minor">
+                <a:schemeClr val="lt1"/>
+              </a:fontRef>
+            </p:style>
+            <p:txBody>
+              <a:bodyPr rtlCol="0" anchor="t"/>
+              <a:lstStyle/>
+              <a:p>
+                <a:pPr algn="ctr"/>
+                <a:r>
+                  <a:rPr lang="en-US" dirty="0" smtClean="0">
+                    <a:solidFill>
+                      <a:schemeClr val="tx1"/>
+                    </a:solidFill>
+                  </a:rPr>
+                  <a:t>&lt;&lt;Interface&gt;&gt;</a:t>
+                </a:r>
+              </a:p>
+              <a:p>
+                <a:pPr algn="ctr"/>
+                <a:r>
+                  <a:rPr lang="en-US" dirty="0" smtClean="0">
+                    <a:solidFill>
+                      <a:schemeClr val="tx1"/>
+                    </a:solidFill>
+                  </a:rPr>
+                  <a:t>Runner</a:t>
+                </a:r>
+                <a:endParaRPr lang="en-US" dirty="0">
+                  <a:solidFill>
+                    <a:schemeClr val="tx1"/>
+                  </a:solidFill>
+                </a:endParaRPr>
+              </a:p>
+            </p:txBody>
+          </p:sp>
+          <p:cxnSp>
+            <p:nvCxnSpPr>
+              <p:cNvPr id="36" name="Straight Connector 35"/>
+              <p:cNvCxnSpPr/>
+              <p:nvPr/>
+            </p:nvCxnSpPr>
+            <p:spPr>
+              <a:xfrm>
+                <a:off x="2971800" y="1876781"/>
+                <a:ext cx="2362200" cy="0"/>
+              </a:xfrm>
+              <a:prstGeom prst="line">
+                <a:avLst/>
+              </a:prstGeom>
+            </p:spPr>
+            <p:style>
+              <a:lnRef idx="1">
+                <a:schemeClr val="accent1"/>
+              </a:lnRef>
+              <a:fillRef idx="0">
+                <a:schemeClr val="accent1"/>
+              </a:fillRef>
+              <a:effectRef idx="0">
+                <a:schemeClr val="accent1"/>
+              </a:effectRef>
+              <a:fontRef idx="minor">
+                <a:schemeClr val="tx1"/>
+              </a:fontRef>
+            </p:style>
+          </p:cxnSp>
+          <p:cxnSp>
+            <p:nvCxnSpPr>
+              <p:cNvPr id="37" name="Straight Connector 36"/>
+              <p:cNvCxnSpPr/>
+              <p:nvPr/>
+            </p:nvCxnSpPr>
+            <p:spPr>
+              <a:xfrm>
+                <a:off x="2971800" y="2076450"/>
+                <a:ext cx="2362200" cy="0"/>
+              </a:xfrm>
+              <a:prstGeom prst="line">
+                <a:avLst/>
+              </a:prstGeom>
+            </p:spPr>
+            <p:style>
+              <a:lnRef idx="1">
+                <a:schemeClr val="accent1"/>
+              </a:lnRef>
+              <a:fillRef idx="0">
+                <a:schemeClr val="accent1"/>
+              </a:fillRef>
+              <a:effectRef idx="0">
+                <a:schemeClr val="accent1"/>
+              </a:effectRef>
+              <a:fontRef idx="minor">
+                <a:schemeClr val="tx1"/>
+              </a:fontRef>
+            </p:style>
+          </p:cxnSp>
+        </p:grpSp>
+        <p:sp>
+          <p:nvSpPr>
+            <p:cNvPr id="29" name="TextBox 28"/>
+            <p:cNvSpPr txBox="1"/>
+            <p:nvPr/>
+          </p:nvSpPr>
+          <p:spPr>
+            <a:xfrm>
+              <a:off x="1905948" y="2531225"/>
+              <a:ext cx="2517484" cy="369332"/>
+            </a:xfrm>
+            <a:prstGeom prst="rect">
+              <a:avLst/>
+            </a:prstGeom>
+            <a:noFill/>
+          </p:spPr>
+          <p:txBody>
+            <a:bodyPr wrap="none" rtlCol="0">
+              <a:spAutoFit/>
+            </a:bodyPr>
+            <a:lstStyle/>
+            <a:p>
+              <a:r>
+                <a:rPr lang="en-US" dirty="0" smtClean="0"/>
+                <a:t>+ </a:t>
+              </a:r>
+              <a:r>
+                <a:rPr lang="en-US" dirty="0" smtClean="0"/>
+                <a:t>run</a:t>
+              </a:r>
+              <a:r>
+                <a:rPr lang="en-US" dirty="0" smtClean="0"/>
+                <a:t>(distance: Distance)</a:t>
+              </a:r>
+              <a:endParaRPr lang="en-US" dirty="0"/>
+            </a:p>
+          </p:txBody>
+        </p:sp>
+      </p:grpSp>
+      <p:sp>
+        <p:nvSpPr>
+          <p:cNvPr id="38" name="Isosceles Triangle 37"/>
+          <p:cNvSpPr/>
+          <p:nvPr/>
+        </p:nvSpPr>
+        <p:spPr>
+          <a:xfrm>
+            <a:off x="6714257" y="3225653"/>
+            <a:ext cx="530352" cy="325096"/>
+          </a:xfrm>
+          <a:prstGeom prst="triangle">
             <a:avLst/>
           </a:prstGeom>
           <a:noFill/>
@@ -7651,182 +8707,31 @@
           </a:fontRef>
         </p:style>
         <p:txBody>
-          <a:bodyPr rtlCol="0" anchor="t"/>
+          <a:bodyPr rtlCol="0" anchor="ctr"/>
           <a:lstStyle/>
           <a:p>
             <a:pPr algn="ctr"/>
-            <a:r>
-              <a:rPr lang="en-US" dirty="0" smtClean="0">
-                <a:solidFill>
-                  <a:schemeClr val="tx1"/>
-                </a:solidFill>
-              </a:rPr>
-              <a:t>Student</a:t>
-            </a:r>
-            <a:endParaRPr lang="en-US" dirty="0">
-              <a:solidFill>
-                <a:schemeClr val="tx1"/>
-              </a:solidFill>
-            </a:endParaRPr>
-          </a:p>
-        </p:txBody>
-      </p:sp>
-      <p:grpSp>
-        <p:nvGrpSpPr>
-          <p:cNvPr id="14" name="Group 13"/>
-          <p:cNvGrpSpPr/>
-          <p:nvPr/>
-        </p:nvGrpSpPr>
-        <p:grpSpPr>
-          <a:xfrm>
-            <a:off x="1747857" y="1447799"/>
-            <a:ext cx="2905085" cy="1476703"/>
-            <a:chOff x="2971800" y="1447800"/>
-            <a:chExt cx="2362200" cy="838200"/>
-          </a:xfrm>
-        </p:grpSpPr>
-        <p:sp>
-          <p:nvSpPr>
-            <p:cNvPr id="8" name="Rectangle 7"/>
-            <p:cNvSpPr/>
-            <p:nvPr/>
-          </p:nvSpPr>
-          <p:spPr>
-            <a:xfrm>
-              <a:off x="2971800" y="1447800"/>
-              <a:ext cx="2362200" cy="838200"/>
-            </a:xfrm>
-            <a:prstGeom prst="rect">
-              <a:avLst/>
-            </a:prstGeom>
-            <a:noFill/>
-          </p:spPr>
-          <p:style>
-            <a:lnRef idx="2">
-              <a:schemeClr val="accent1">
-                <a:shade val="50000"/>
-              </a:schemeClr>
-            </a:lnRef>
-            <a:fillRef idx="1">
-              <a:schemeClr val="accent1"/>
-            </a:fillRef>
-            <a:effectRef idx="0">
-              <a:schemeClr val="accent1"/>
-            </a:effectRef>
-            <a:fontRef idx="minor">
-              <a:schemeClr val="lt1"/>
-            </a:fontRef>
-          </p:style>
-          <p:txBody>
-            <a:bodyPr rtlCol="0" anchor="t"/>
-            <a:lstStyle/>
-            <a:p>
-              <a:pPr algn="ctr"/>
-              <a:r>
-                <a:rPr lang="en-US" dirty="0" smtClean="0">
-                  <a:solidFill>
-                    <a:schemeClr val="tx1"/>
-                  </a:solidFill>
-                </a:rPr>
-                <a:t>&lt;&lt;Interface&gt;&gt;</a:t>
-              </a:r>
-            </a:p>
-            <a:p>
-              <a:pPr algn="ctr"/>
-              <a:r>
-                <a:rPr lang="en-US" dirty="0" smtClean="0">
-                  <a:solidFill>
-                    <a:schemeClr val="tx1"/>
-                  </a:solidFill>
-                </a:rPr>
-                <a:t>Learner</a:t>
-              </a:r>
-              <a:endParaRPr lang="en-US" dirty="0">
-                <a:solidFill>
-                  <a:schemeClr val="tx1"/>
-                </a:solidFill>
-              </a:endParaRPr>
-            </a:p>
-          </p:txBody>
-        </p:sp>
-        <p:cxnSp>
-          <p:nvCxnSpPr>
-            <p:cNvPr id="11" name="Straight Connector 10"/>
-            <p:cNvCxnSpPr/>
-            <p:nvPr/>
-          </p:nvCxnSpPr>
-          <p:spPr>
-            <a:xfrm>
-              <a:off x="2971800" y="1876781"/>
-              <a:ext cx="2362200" cy="0"/>
-            </a:xfrm>
-            <a:prstGeom prst="line">
-              <a:avLst/>
-            </a:prstGeom>
-          </p:spPr>
-          <p:style>
-            <a:lnRef idx="1">
-              <a:schemeClr val="accent1"/>
-            </a:lnRef>
-            <a:fillRef idx="0">
-              <a:schemeClr val="accent1"/>
-            </a:fillRef>
-            <a:effectRef idx="0">
-              <a:schemeClr val="accent1"/>
-            </a:effectRef>
-            <a:fontRef idx="minor">
-              <a:schemeClr val="tx1"/>
-            </a:fontRef>
-          </p:style>
-        </p:cxnSp>
-        <p:cxnSp>
-          <p:nvCxnSpPr>
-            <p:cNvPr id="26" name="Straight Connector 25"/>
-            <p:cNvCxnSpPr/>
-            <p:nvPr/>
-          </p:nvCxnSpPr>
-          <p:spPr>
-            <a:xfrm>
-              <a:off x="2971800" y="2076450"/>
-              <a:ext cx="2362200" cy="0"/>
-            </a:xfrm>
-            <a:prstGeom prst="line">
-              <a:avLst/>
-            </a:prstGeom>
-          </p:spPr>
-          <p:style>
-            <a:lnRef idx="1">
-              <a:schemeClr val="accent1"/>
-            </a:lnRef>
-            <a:fillRef idx="0">
-              <a:schemeClr val="accent1"/>
-            </a:fillRef>
-            <a:effectRef idx="0">
-              <a:schemeClr val="accent1"/>
-            </a:effectRef>
-            <a:fontRef idx="minor">
-              <a:schemeClr val="tx1"/>
-            </a:fontRef>
-          </p:style>
-        </p:cxnSp>
-      </p:grpSp>
+            <a:endParaRPr lang="en-US"/>
+          </a:p>
+        </p:txBody>
+      </p:sp>
       <p:cxnSp>
         <p:nvCxnSpPr>
-          <p:cNvPr id="13" name="Straight Connector 12"/>
-          <p:cNvCxnSpPr>
-            <a:stCxn id="9" idx="1"/>
-            <a:endCxn id="9" idx="3"/>
-          </p:cNvCxnSpPr>
+          <p:cNvPr id="66" name="Straight Connector 65"/>
+          <p:cNvCxnSpPr/>
           <p:nvPr/>
         </p:nvCxnSpPr>
         <p:spPr>
-          <a:xfrm>
-            <a:off x="3471842" y="4914900"/>
-            <a:ext cx="2362200" cy="0"/>
+          <a:xfrm flipV="1">
+            <a:off x="4267200" y="4011301"/>
+            <a:ext cx="0" cy="460554"/>
           </a:xfrm>
           <a:prstGeom prst="line">
             <a:avLst/>
           </a:prstGeom>
+          <a:ln w="25400">
+            <a:prstDash val="dash"/>
+          </a:ln>
         </p:spPr>
         <p:style>
           <a:lnRef idx="1">
@@ -7843,189 +8748,23 @@
           </a:fontRef>
         </p:style>
       </p:cxnSp>
-      <p:sp>
-        <p:nvSpPr>
-          <p:cNvPr id="4" name="TextBox 3"/>
-          <p:cNvSpPr txBox="1"/>
-          <p:nvPr/>
-        </p:nvSpPr>
-        <p:spPr>
-          <a:xfrm>
-            <a:off x="5715000" y="2531850"/>
-            <a:ext cx="3006079" cy="1200329"/>
-          </a:xfrm>
-          <a:prstGeom prst="rect">
-            <a:avLst/>
-          </a:prstGeom>
-          <a:noFill/>
-        </p:spPr>
-        <p:txBody>
-          <a:bodyPr wrap="none" rtlCol="0">
-            <a:spAutoFit/>
-          </a:bodyPr>
-          <a:lstStyle/>
-          <a:p>
-            <a:r>
-              <a:rPr lang="en-US" dirty="0" smtClean="0"/>
-              <a:t>The line is dashed indicating</a:t>
-            </a:r>
-          </a:p>
-          <a:p>
-            <a:r>
-              <a:rPr lang="en-US" dirty="0" smtClean="0"/>
-              <a:t>a weaker relationship.</a:t>
-            </a:r>
-          </a:p>
-          <a:p>
-            <a:r>
-              <a:rPr lang="en-US" dirty="0" smtClean="0"/>
-              <a:t>A student is not only a learner</a:t>
-            </a:r>
-          </a:p>
-          <a:p>
-            <a:r>
-              <a:rPr lang="en-US" dirty="0" smtClean="0"/>
-              <a:t>She is just </a:t>
-            </a:r>
-            <a:r>
-              <a:rPr lang="en-US" u="sng" dirty="0" smtClean="0"/>
-              <a:t>able</a:t>
-            </a:r>
-            <a:r>
-              <a:rPr lang="en-US" dirty="0" smtClean="0"/>
-              <a:t> to learn</a:t>
-            </a:r>
-            <a:endParaRPr lang="en-US" dirty="0"/>
-          </a:p>
-        </p:txBody>
-      </p:sp>
-      <p:sp>
-        <p:nvSpPr>
-          <p:cNvPr id="22" name="TextBox 21"/>
-          <p:cNvSpPr txBox="1"/>
-          <p:nvPr/>
-        </p:nvSpPr>
-        <p:spPr>
-          <a:xfrm>
-            <a:off x="2590800" y="5835134"/>
-            <a:ext cx="4858894" cy="369332"/>
-          </a:xfrm>
-          <a:prstGeom prst="rect">
-            <a:avLst/>
-          </a:prstGeom>
-          <a:noFill/>
-        </p:spPr>
-        <p:txBody>
-          <a:bodyPr wrap="none" rtlCol="0">
-            <a:spAutoFit/>
-          </a:bodyPr>
-          <a:lstStyle/>
-          <a:p>
-            <a:r>
-              <a:rPr lang="en-US" dirty="0" smtClean="0"/>
-              <a:t>One class can implement more than one interface</a:t>
-            </a:r>
-            <a:endParaRPr lang="en-US" dirty="0"/>
-          </a:p>
-        </p:txBody>
-      </p:sp>
-      <p:sp>
-        <p:nvSpPr>
-          <p:cNvPr id="27" name="TextBox 26"/>
-          <p:cNvSpPr txBox="1"/>
-          <p:nvPr/>
-        </p:nvSpPr>
-        <p:spPr>
-          <a:xfrm>
-            <a:off x="1905948" y="2531225"/>
-            <a:ext cx="2661691" cy="369332"/>
-          </a:xfrm>
-          <a:prstGeom prst="rect">
-            <a:avLst/>
-          </a:prstGeom>
-          <a:noFill/>
-        </p:spPr>
-        <p:txBody>
-          <a:bodyPr wrap="none" rtlCol="0">
-            <a:spAutoFit/>
-          </a:bodyPr>
-          <a:lstStyle/>
-          <a:p>
-            <a:r>
-              <a:rPr lang="en-US" dirty="0" smtClean="0"/>
-              <a:t>+ learn(material: Material)</a:t>
-            </a:r>
-            <a:endParaRPr lang="en-US" dirty="0"/>
-          </a:p>
-        </p:txBody>
-      </p:sp>
-      <p:sp>
-        <p:nvSpPr>
-          <p:cNvPr id="30" name="Rectangle 29"/>
-          <p:cNvSpPr/>
-          <p:nvPr/>
-        </p:nvSpPr>
-        <p:spPr>
-          <a:xfrm>
-            <a:off x="381000" y="4495800"/>
-            <a:ext cx="2362200" cy="838200"/>
-          </a:xfrm>
-          <a:prstGeom prst="rect">
-            <a:avLst/>
-          </a:prstGeom>
-          <a:noFill/>
-        </p:spPr>
-        <p:style>
-          <a:lnRef idx="2">
-            <a:schemeClr val="accent1">
-              <a:shade val="50000"/>
-            </a:schemeClr>
-          </a:lnRef>
-          <a:fillRef idx="1">
-            <a:schemeClr val="accent1"/>
-          </a:fillRef>
-          <a:effectRef idx="0">
-            <a:schemeClr val="accent1"/>
-          </a:effectRef>
-          <a:fontRef idx="minor">
-            <a:schemeClr val="lt1"/>
-          </a:fontRef>
-        </p:style>
-        <p:txBody>
-          <a:bodyPr rtlCol="0" anchor="t"/>
-          <a:lstStyle/>
-          <a:p>
-            <a:pPr algn="ctr"/>
-            <a:r>
-              <a:rPr lang="en-US" dirty="0" smtClean="0">
-                <a:solidFill>
-                  <a:schemeClr val="tx1"/>
-                </a:solidFill>
-              </a:rPr>
-              <a:t>Intern</a:t>
-            </a:r>
-            <a:endParaRPr lang="en-US" dirty="0">
-              <a:solidFill>
-                <a:schemeClr val="tx1"/>
-              </a:solidFill>
-            </a:endParaRPr>
-          </a:p>
-        </p:txBody>
-      </p:sp>
       <p:cxnSp>
         <p:nvCxnSpPr>
-          <p:cNvPr id="31" name="Straight Connector 30"/>
+          <p:cNvPr id="68" name="Straight Connector 67"/>
           <p:cNvCxnSpPr/>
           <p:nvPr/>
         </p:nvCxnSpPr>
         <p:spPr>
           <a:xfrm>
-            <a:off x="381000" y="4914900"/>
-            <a:ext cx="2362200" cy="0"/>
+            <a:off x="4267200" y="4011301"/>
+            <a:ext cx="2712233" cy="0"/>
           </a:xfrm>
           <a:prstGeom prst="line">
             <a:avLst/>
           </a:prstGeom>
+          <a:ln w="25400">
+            <a:prstDash val="dash"/>
+          </a:ln>
         </p:spPr>
         <p:style>
           <a:lnRef idx="1">
@@ -8042,97 +8781,41 @@
           </a:fontRef>
         </p:style>
       </p:cxnSp>
-      <p:grpSp>
-        <p:nvGrpSpPr>
-          <p:cNvPr id="32" name="Group 31"/>
-          <p:cNvGrpSpPr/>
+      <p:cxnSp>
+        <p:nvCxnSpPr>
+          <p:cNvPr id="70" name="Straight Connector 69"/>
+          <p:cNvCxnSpPr>
+            <a:endCxn id="38" idx="3"/>
+          </p:cNvCxnSpPr>
           <p:nvPr/>
-        </p:nvGrpSpPr>
-        <p:grpSpPr>
-          <a:xfrm>
-            <a:off x="1905948" y="2924502"/>
-            <a:ext cx="530352" cy="1547352"/>
-            <a:chOff x="3886200" y="2286000"/>
-            <a:chExt cx="530352" cy="2209800"/>
+        </p:nvCxnSpPr>
+        <p:spPr>
+          <a:xfrm flipV="1">
+            <a:off x="6979433" y="3550749"/>
+            <a:ext cx="0" cy="460552"/>
           </a:xfrm>
-        </p:grpSpPr>
-        <p:sp>
-          <p:nvSpPr>
-            <p:cNvPr id="33" name="Isosceles Triangle 32"/>
-            <p:cNvSpPr/>
-            <p:nvPr/>
-          </p:nvSpPr>
-          <p:spPr>
-            <a:xfrm>
-              <a:off x="3886200" y="2286000"/>
-              <a:ext cx="530352" cy="457200"/>
-            </a:xfrm>
-            <a:prstGeom prst="triangle">
-              <a:avLst/>
-            </a:prstGeom>
-            <a:noFill/>
-          </p:spPr>
-          <p:style>
-            <a:lnRef idx="2">
-              <a:schemeClr val="accent1">
-                <a:shade val="50000"/>
-              </a:schemeClr>
-            </a:lnRef>
-            <a:fillRef idx="1">
-              <a:schemeClr val="accent1"/>
-            </a:fillRef>
-            <a:effectRef idx="0">
-              <a:schemeClr val="accent1"/>
-            </a:effectRef>
-            <a:fontRef idx="minor">
-              <a:schemeClr val="lt1"/>
-            </a:fontRef>
-          </p:style>
-          <p:txBody>
-            <a:bodyPr rtlCol="0" anchor="ctr"/>
-            <a:lstStyle/>
-            <a:p>
-              <a:pPr algn="ctr"/>
-              <a:endParaRPr lang="en-US"/>
-            </a:p>
-          </p:txBody>
-        </p:sp>
-        <p:cxnSp>
-          <p:nvCxnSpPr>
-            <p:cNvPr id="34" name="Straight Connector 4"/>
-            <p:cNvCxnSpPr>
-              <a:stCxn id="33" idx="3"/>
-            </p:cNvCxnSpPr>
-            <p:nvPr/>
-          </p:nvCxnSpPr>
-          <p:spPr>
-            <a:xfrm flipH="1">
-              <a:off x="4143415" y="2743200"/>
-              <a:ext cx="7961" cy="1752600"/>
-            </a:xfrm>
-            <a:prstGeom prst="straightConnector1">
-              <a:avLst/>
-            </a:prstGeom>
-            <a:ln w="25400">
-              <a:prstDash val="dash"/>
-            </a:ln>
-          </p:spPr>
-          <p:style>
-            <a:lnRef idx="1">
-              <a:schemeClr val="accent1"/>
-            </a:lnRef>
-            <a:fillRef idx="0">
-              <a:schemeClr val="accent1"/>
-            </a:fillRef>
-            <a:effectRef idx="0">
-              <a:schemeClr val="accent1"/>
-            </a:effectRef>
-            <a:fontRef idx="minor">
-              <a:schemeClr val="tx1"/>
-            </a:fontRef>
-          </p:style>
-        </p:cxnSp>
-      </p:grpSp>
+          <a:prstGeom prst="line">
+            <a:avLst/>
+          </a:prstGeom>
+          <a:ln w="25400">
+            <a:prstDash val="dash"/>
+          </a:ln>
+        </p:spPr>
+        <p:style>
+          <a:lnRef idx="1">
+            <a:schemeClr val="accent1"/>
+          </a:lnRef>
+          <a:fillRef idx="0">
+            <a:schemeClr val="accent1"/>
+          </a:fillRef>
+          <a:effectRef idx="0">
+            <a:schemeClr val="accent1"/>
+          </a:effectRef>
+          <a:fontRef idx="minor">
+            <a:schemeClr val="tx1"/>
+          </a:fontRef>
+        </p:style>
+      </p:cxnSp>
     </p:spTree>
     <p:extLst>
       <p:ext uri="{BB962C8B-B14F-4D97-AF65-F5344CB8AC3E}">
@@ -8153,7 +8836,7 @@
 </p:sld>
 </file>
 
-<file path=ppt/slides/slide26.xml><?xml version="1.0" encoding="utf-8"?>
+<file path=ppt/slides/slide28.xml><?xml version="1.0" encoding="utf-8"?>
 <p:sld xmlns:a="http://schemas.openxmlformats.org/drawingml/2006/main" xmlns:r="http://schemas.openxmlformats.org/officeDocument/2006/relationships" xmlns:p="http://schemas.openxmlformats.org/presentationml/2006/main">
   <p:cSld>
     <p:spTree>
@@ -8535,7 +9218,7 @@
 </p:sld>
 </file>
 
-<file path=ppt/slides/slide27.xml><?xml version="1.0" encoding="utf-8"?>
+<file path=ppt/slides/slide29.xml><?xml version="1.0" encoding="utf-8"?>
 <p:sld xmlns:a="http://schemas.openxmlformats.org/drawingml/2006/main" xmlns:r="http://schemas.openxmlformats.org/officeDocument/2006/relationships" xmlns:p="http://schemas.openxmlformats.org/presentationml/2006/main">
   <p:cSld>
     <p:spTree>
@@ -9299,7 +9982,137 @@
 </p:sld>
 </file>
 
-<file path=ppt/slides/slide28.xml><?xml version="1.0" encoding="utf-8"?>
+<file path=ppt/slides/slide3.xml><?xml version="1.0" encoding="utf-8"?>
+<p:sld xmlns:a="http://schemas.openxmlformats.org/drawingml/2006/main" xmlns:r="http://schemas.openxmlformats.org/officeDocument/2006/relationships" xmlns:p="http://schemas.openxmlformats.org/presentationml/2006/main">
+  <p:cSld>
+    <p:spTree>
+      <p:nvGrpSpPr>
+        <p:cNvPr id="1" name=""/>
+        <p:cNvGrpSpPr/>
+        <p:nvPr/>
+      </p:nvGrpSpPr>
+      <p:grpSpPr>
+        <a:xfrm>
+          <a:off x="0" y="0"/>
+          <a:ext cx="0" cy="0"/>
+          <a:chOff x="0" y="0"/>
+          <a:chExt cx="0" cy="0"/>
+        </a:xfrm>
+      </p:grpSpPr>
+      <p:sp>
+        <p:nvSpPr>
+          <p:cNvPr id="2" name="Title 1"/>
+          <p:cNvSpPr>
+            <a:spLocks noGrp="1"/>
+          </p:cNvSpPr>
+          <p:nvPr>
+            <p:ph type="title"/>
+          </p:nvPr>
+        </p:nvSpPr>
+        <p:spPr/>
+        <p:txBody>
+          <a:bodyPr/>
+          <a:lstStyle/>
+          <a:p>
+            <a:r>
+              <a:rPr lang="en-US" dirty="0" smtClean="0"/>
+              <a:t>HTML-attributes</a:t>
+            </a:r>
+            <a:endParaRPr lang="en-US" dirty="0"/>
+          </a:p>
+        </p:txBody>
+      </p:sp>
+      <p:sp>
+        <p:nvSpPr>
+          <p:cNvPr id="3" name="Content Placeholder 2"/>
+          <p:cNvSpPr>
+            <a:spLocks noGrp="1"/>
+          </p:cNvSpPr>
+          <p:nvPr>
+            <p:ph idx="1"/>
+          </p:nvPr>
+        </p:nvSpPr>
+        <p:spPr/>
+        <p:txBody>
+          <a:bodyPr/>
+          <a:lstStyle/>
+          <a:p>
+            <a:pPr marL="0" indent="0">
+              <a:buNone/>
+            </a:pPr>
+            <a:r>
+              <a:rPr lang="en-US" dirty="0" smtClean="0"/>
+              <a:t>Each element can have attributes.</a:t>
+            </a:r>
+          </a:p>
+          <a:p>
+            <a:pPr marL="0" indent="0">
+              <a:buNone/>
+            </a:pPr>
+            <a:r>
+              <a:rPr lang="en-US" dirty="0" smtClean="0"/>
+              <a:t>An attribute has a name, and a value separates by an equals sign.</a:t>
+            </a:r>
+          </a:p>
+          <a:p>
+            <a:pPr marL="0" indent="0">
+              <a:buNone/>
+            </a:pPr>
+            <a:r>
+              <a:rPr lang="en-US" dirty="0" smtClean="0"/>
+              <a:t>The value must be in double-quotes.</a:t>
+            </a:r>
+          </a:p>
+          <a:p>
+            <a:pPr marL="0" indent="0">
+              <a:buNone/>
+            </a:pPr>
+            <a:r>
+              <a:rPr lang="en-US" dirty="0" smtClean="0"/>
+              <a:t>Example:</a:t>
+            </a:r>
+          </a:p>
+          <a:p>
+            <a:pPr marL="0" indent="0">
+              <a:buNone/>
+            </a:pPr>
+            <a:r>
+              <a:rPr lang="en-US" dirty="0" smtClean="0"/>
+              <a:t>&lt;td </a:t>
+            </a:r>
+            <a:r>
+              <a:rPr lang="en-US" dirty="0" err="1" smtClean="0"/>
+              <a:t>colspan</a:t>
+            </a:r>
+            <a:r>
+              <a:rPr lang="en-US" dirty="0" smtClean="0"/>
+              <a:t>="5"&gt;</a:t>
+            </a:r>
+            <a:endParaRPr lang="en-US" dirty="0"/>
+          </a:p>
+        </p:txBody>
+      </p:sp>
+    </p:spTree>
+    <p:extLst>
+      <p:ext uri="{BB962C8B-B14F-4D97-AF65-F5344CB8AC3E}">
+        <p14:creationId xmlns:p14="http://schemas.microsoft.com/office/powerpoint/2010/main" val="1835246695"/>
+      </p:ext>
+    </p:extLst>
+  </p:cSld>
+  <p:clrMapOvr>
+    <a:masterClrMapping/>
+  </p:clrMapOvr>
+  <p:timing>
+    <p:tnLst>
+      <p:par>
+        <p:cTn id="1" dur="indefinite" restart="never" nodeType="tmRoot"/>
+      </p:par>
+    </p:tnLst>
+  </p:timing>
+</p:sld>
+</file>
+
+<file path=ppt/slides/slide30.xml><?xml version="1.0" encoding="utf-8"?>
 <p:sld xmlns:a="http://schemas.openxmlformats.org/drawingml/2006/main" xmlns:r="http://schemas.openxmlformats.org/officeDocument/2006/relationships" xmlns:p="http://schemas.openxmlformats.org/presentationml/2006/main">
   <p:cSld>
     <p:spTree>
@@ -9717,7 +10530,7 @@
 </p:sld>
 </file>
 
-<file path=ppt/slides/slide29.xml><?xml version="1.0" encoding="utf-8"?>
+<file path=ppt/slides/slide31.xml><?xml version="1.0" encoding="utf-8"?>
 <p:sld xmlns:a="http://schemas.openxmlformats.org/drawingml/2006/main" xmlns:r="http://schemas.openxmlformats.org/officeDocument/2006/relationships" xmlns:p="http://schemas.openxmlformats.org/presentationml/2006/main">
   <p:cSld>
     <p:spTree>
@@ -10231,136 +11044,6 @@
 </p:sld>
 </file>
 
-<file path=ppt/slides/slide3.xml><?xml version="1.0" encoding="utf-8"?>
-<p:sld xmlns:a="http://schemas.openxmlformats.org/drawingml/2006/main" xmlns:r="http://schemas.openxmlformats.org/officeDocument/2006/relationships" xmlns:p="http://schemas.openxmlformats.org/presentationml/2006/main">
-  <p:cSld>
-    <p:spTree>
-      <p:nvGrpSpPr>
-        <p:cNvPr id="1" name=""/>
-        <p:cNvGrpSpPr/>
-        <p:nvPr/>
-      </p:nvGrpSpPr>
-      <p:grpSpPr>
-        <a:xfrm>
-          <a:off x="0" y="0"/>
-          <a:ext cx="0" cy="0"/>
-          <a:chOff x="0" y="0"/>
-          <a:chExt cx="0" cy="0"/>
-        </a:xfrm>
-      </p:grpSpPr>
-      <p:sp>
-        <p:nvSpPr>
-          <p:cNvPr id="2" name="Title 1"/>
-          <p:cNvSpPr>
-            <a:spLocks noGrp="1"/>
-          </p:cNvSpPr>
-          <p:nvPr>
-            <p:ph type="title"/>
-          </p:nvPr>
-        </p:nvSpPr>
-        <p:spPr/>
-        <p:txBody>
-          <a:bodyPr/>
-          <a:lstStyle/>
-          <a:p>
-            <a:r>
-              <a:rPr lang="en-US" dirty="0" smtClean="0"/>
-              <a:t>HTML-attributes</a:t>
-            </a:r>
-            <a:endParaRPr lang="en-US" dirty="0"/>
-          </a:p>
-        </p:txBody>
-      </p:sp>
-      <p:sp>
-        <p:nvSpPr>
-          <p:cNvPr id="3" name="Content Placeholder 2"/>
-          <p:cNvSpPr>
-            <a:spLocks noGrp="1"/>
-          </p:cNvSpPr>
-          <p:nvPr>
-            <p:ph idx="1"/>
-          </p:nvPr>
-        </p:nvSpPr>
-        <p:spPr/>
-        <p:txBody>
-          <a:bodyPr/>
-          <a:lstStyle/>
-          <a:p>
-            <a:pPr marL="0" indent="0">
-              <a:buNone/>
-            </a:pPr>
-            <a:r>
-              <a:rPr lang="en-US" dirty="0" smtClean="0"/>
-              <a:t>Each element can have attributes.</a:t>
-            </a:r>
-          </a:p>
-          <a:p>
-            <a:pPr marL="0" indent="0">
-              <a:buNone/>
-            </a:pPr>
-            <a:r>
-              <a:rPr lang="en-US" dirty="0" smtClean="0"/>
-              <a:t>An attribute has a name, and a value separates by an equals sign.</a:t>
-            </a:r>
-          </a:p>
-          <a:p>
-            <a:pPr marL="0" indent="0">
-              <a:buNone/>
-            </a:pPr>
-            <a:r>
-              <a:rPr lang="en-US" dirty="0" smtClean="0"/>
-              <a:t>The value must be in double-quotes.</a:t>
-            </a:r>
-          </a:p>
-          <a:p>
-            <a:pPr marL="0" indent="0">
-              <a:buNone/>
-            </a:pPr>
-            <a:r>
-              <a:rPr lang="en-US" dirty="0" smtClean="0"/>
-              <a:t>Example:</a:t>
-            </a:r>
-          </a:p>
-          <a:p>
-            <a:pPr marL="0" indent="0">
-              <a:buNone/>
-            </a:pPr>
-            <a:r>
-              <a:rPr lang="en-US" dirty="0" smtClean="0"/>
-              <a:t>&lt;td </a:t>
-            </a:r>
-            <a:r>
-              <a:rPr lang="en-US" dirty="0" err="1" smtClean="0"/>
-              <a:t>colspan</a:t>
-            </a:r>
-            <a:r>
-              <a:rPr lang="en-US" dirty="0" smtClean="0"/>
-              <a:t>="5"&gt;</a:t>
-            </a:r>
-            <a:endParaRPr lang="en-US" dirty="0"/>
-          </a:p>
-        </p:txBody>
-      </p:sp>
-    </p:spTree>
-    <p:extLst>
-      <p:ext uri="{BB962C8B-B14F-4D97-AF65-F5344CB8AC3E}">
-        <p14:creationId xmlns:p14="http://schemas.microsoft.com/office/powerpoint/2010/main" val="1835246695"/>
-      </p:ext>
-    </p:extLst>
-  </p:cSld>
-  <p:clrMapOvr>
-    <a:masterClrMapping/>
-  </p:clrMapOvr>
-  <p:timing>
-    <p:tnLst>
-      <p:par>
-        <p:cTn id="1" dur="indefinite" restart="never" nodeType="tmRoot"/>
-      </p:par>
-    </p:tnLst>
-  </p:timing>
-</p:sld>
-</file>
-
 <file path=ppt/slides/slide4.xml><?xml version="1.0" encoding="utf-8"?>
 <p:sld xmlns:a="http://schemas.openxmlformats.org/drawingml/2006/main" xmlns:r="http://schemas.openxmlformats.org/officeDocument/2006/relationships" xmlns:p="http://schemas.openxmlformats.org/presentationml/2006/main">
   <p:cSld>
@@ -10911,11 +11594,7 @@
           <a:p>
             <a:r>
               <a:rPr lang="en-US" dirty="0" smtClean="0"/>
-              <a:t>Throwing and catching </a:t>
-            </a:r>
-            <a:r>
-              <a:rPr lang="en-US" dirty="0" smtClean="0"/>
-              <a:t>Exceptions</a:t>
+              <a:t>Throwing and catching Exceptions</a:t>
             </a:r>
             <a:endParaRPr lang="en-US" dirty="0"/>
           </a:p>

</xml_diff>

<commit_message>
Updated lesson 4 with a couple screenshots
... about applet security
</commit_message>
<xml_diff>
--- a/Lesson 4.pptx
+++ b/Lesson 4.pptx
@@ -5,7 +5,7 @@
     <p:sldMasterId id="2147483660" r:id="rId1"/>
   </p:sldMasterIdLst>
   <p:notesMasterIdLst>
-    <p:notesMasterId r:id="rId33"/>
+    <p:notesMasterId r:id="rId36"/>
   </p:notesMasterIdLst>
   <p:sldIdLst>
     <p:sldId id="264" r:id="rId2"/>
@@ -16,29 +16,32 @@
     <p:sldId id="282" r:id="rId7"/>
     <p:sldId id="283" r:id="rId8"/>
     <p:sldId id="284" r:id="rId9"/>
-    <p:sldId id="265" r:id="rId10"/>
-    <p:sldId id="266" r:id="rId11"/>
-    <p:sldId id="267" r:id="rId12"/>
-    <p:sldId id="268" r:id="rId13"/>
-    <p:sldId id="269" r:id="rId14"/>
-    <p:sldId id="270" r:id="rId15"/>
-    <p:sldId id="271" r:id="rId16"/>
-    <p:sldId id="272" r:id="rId17"/>
-    <p:sldId id="285" r:id="rId18"/>
-    <p:sldId id="286" r:id="rId19"/>
-    <p:sldId id="273" r:id="rId20"/>
-    <p:sldId id="274" r:id="rId21"/>
-    <p:sldId id="275" r:id="rId22"/>
-    <p:sldId id="276" r:id="rId23"/>
-    <p:sldId id="277" r:id="rId24"/>
-    <p:sldId id="256" r:id="rId25"/>
-    <p:sldId id="257" r:id="rId26"/>
-    <p:sldId id="258" r:id="rId27"/>
-    <p:sldId id="259" r:id="rId28"/>
-    <p:sldId id="262" r:id="rId29"/>
-    <p:sldId id="261" r:id="rId30"/>
-    <p:sldId id="263" r:id="rId31"/>
-    <p:sldId id="260" r:id="rId32"/>
+    <p:sldId id="288" r:id="rId10"/>
+    <p:sldId id="289" r:id="rId11"/>
+    <p:sldId id="287" r:id="rId12"/>
+    <p:sldId id="265" r:id="rId13"/>
+    <p:sldId id="266" r:id="rId14"/>
+    <p:sldId id="267" r:id="rId15"/>
+    <p:sldId id="268" r:id="rId16"/>
+    <p:sldId id="269" r:id="rId17"/>
+    <p:sldId id="270" r:id="rId18"/>
+    <p:sldId id="271" r:id="rId19"/>
+    <p:sldId id="272" r:id="rId20"/>
+    <p:sldId id="285" r:id="rId21"/>
+    <p:sldId id="286" r:id="rId22"/>
+    <p:sldId id="273" r:id="rId23"/>
+    <p:sldId id="274" r:id="rId24"/>
+    <p:sldId id="275" r:id="rId25"/>
+    <p:sldId id="276" r:id="rId26"/>
+    <p:sldId id="277" r:id="rId27"/>
+    <p:sldId id="256" r:id="rId28"/>
+    <p:sldId id="257" r:id="rId29"/>
+    <p:sldId id="258" r:id="rId30"/>
+    <p:sldId id="259" r:id="rId31"/>
+    <p:sldId id="262" r:id="rId32"/>
+    <p:sldId id="261" r:id="rId33"/>
+    <p:sldId id="263" r:id="rId34"/>
+    <p:sldId id="260" r:id="rId35"/>
   </p:sldIdLst>
   <p:sldSz cx="9144000" cy="6858000" type="screen4x3"/>
   <p:notesSz cx="6858000" cy="9144000"/>
@@ -222,7 +225,7 @@
           <a:p>
             <a:fld id="{4CDA876A-5EA8-4039-8140-156374533FEF}" type="datetimeFigureOut">
               <a:rPr lang="en-US" smtClean="0"/>
-              <a:t>5/15/2014</a:t>
+              <a:t>5/23/2014</a:t>
             </a:fld>
             <a:endParaRPr lang="en-US"/>
           </a:p>
@@ -640,19 +643,33 @@
           <a:p>
             <a:r>
               <a:rPr lang="en-US" dirty="0" smtClean="0"/>
-              <a:t>We can choose to declare that our method throws </a:t>
-            </a:r>
-            <a:r>
-              <a:rPr lang="en-US" dirty="0" err="1" smtClean="0"/>
-              <a:t>IOException</a:t>
-            </a:r>
-            <a:r>
-              <a:rPr lang="en-US" dirty="0" smtClean="0"/>
-              <a:t>. In that case</a:t>
+              <a:t>This exception</a:t>
             </a:r>
             <a:r>
               <a:rPr lang="en-US" baseline="0" dirty="0" smtClean="0"/>
-              <a:t> the problem is moved to the code that calls the method. We can see that now the compiler complains that the main method should catch the exception.</a:t>
+              <a:t> is a </a:t>
+            </a:r>
+            <a:r>
+              <a:rPr lang="en-US" baseline="0" dirty="0" err="1" smtClean="0"/>
+              <a:t>RuntimeException</a:t>
+            </a:r>
+            <a:r>
+              <a:rPr lang="en-US" baseline="0" dirty="0" smtClean="0"/>
+              <a:t>, and these do not need to be declared.</a:t>
+            </a:r>
+          </a:p>
+          <a:p>
+            <a:r>
+              <a:rPr lang="en-US" baseline="0" dirty="0" smtClean="0"/>
+              <a:t>It still extends from </a:t>
+            </a:r>
+            <a:r>
+              <a:rPr lang="en-US" baseline="0" dirty="0" err="1" smtClean="0"/>
+              <a:t>Throwable</a:t>
+            </a:r>
+            <a:r>
+              <a:rPr lang="en-US" baseline="0" dirty="0" smtClean="0"/>
+              <a:t>, which means that we can catch it. Let’s “try”.</a:t>
             </a:r>
             <a:endParaRPr lang="en-US" dirty="0"/>
           </a:p>
@@ -675,7 +692,7 @@
           <a:p>
             <a:fld id="{5EEA4EF7-1170-4BDC-97FA-BEEDBF3971E5}" type="slidenum">
               <a:rPr lang="en-US" smtClean="0"/>
-              <a:t>20</a:t>
+              <a:t>18</a:t>
             </a:fld>
             <a:endParaRPr lang="en-US"/>
           </a:p>
@@ -684,7 +701,7 @@
     </p:spTree>
     <p:extLst>
       <p:ext uri="{BB962C8B-B14F-4D97-AF65-F5344CB8AC3E}">
-        <p14:creationId xmlns:p14="http://schemas.microsoft.com/office/powerpoint/2010/main" val="2900431038"/>
+        <p14:creationId xmlns:p14="http://schemas.microsoft.com/office/powerpoint/2010/main" val="3365400722"/>
       </p:ext>
     </p:extLst>
   </p:cSld>
@@ -740,31 +757,11 @@
           <a:p>
             <a:r>
               <a:rPr lang="en-US" dirty="0" smtClean="0"/>
-              <a:t>Notice how we now throw a new exception in the catch clause.</a:t>
-            </a:r>
-          </a:p>
-          <a:p>
-            <a:r>
-              <a:rPr lang="en-US" dirty="0" smtClean="0"/>
-              <a:t>We now see in the stack</a:t>
+              <a:t>When an</a:t>
             </a:r>
             <a:r>
               <a:rPr lang="en-US" baseline="0" dirty="0" smtClean="0"/>
-              <a:t> </a:t>
-            </a:r>
-            <a:r>
-              <a:rPr lang="en-US" dirty="0" smtClean="0"/>
-              <a:t>trace that there is a “Caused by:” statement.</a:t>
-            </a:r>
-            <a:r>
-              <a:rPr lang="en-US" baseline="0" dirty="0" smtClean="0"/>
-              <a:t> So we can see that we can add some more information to the stack trace that way.</a:t>
-            </a:r>
-          </a:p>
-          <a:p>
-            <a:r>
-              <a:rPr lang="en-US" baseline="0" dirty="0" smtClean="0"/>
-              <a:t>That is the recommended practice if you declare throws, that you also catch the exception that caused it, and then re-throw it.</a:t>
+              <a:t> exception is thrown, the JVM goes through the catch clauses in order, so if one exception extends from another, that has to come first, otherwise the more general exception clause is always caught. Let’s try it.</a:t>
             </a:r>
             <a:endParaRPr lang="en-US" dirty="0"/>
           </a:p>
@@ -787,7 +784,7 @@
           <a:p>
             <a:fld id="{5EEA4EF7-1170-4BDC-97FA-BEEDBF3971E5}" type="slidenum">
               <a:rPr lang="en-US" smtClean="0"/>
-              <a:t>21</a:t>
+              <a:t>19</a:t>
             </a:fld>
             <a:endParaRPr lang="en-US"/>
           </a:p>
@@ -796,7 +793,7 @@
     </p:spTree>
     <p:extLst>
       <p:ext uri="{BB962C8B-B14F-4D97-AF65-F5344CB8AC3E}">
-        <p14:creationId xmlns:p14="http://schemas.microsoft.com/office/powerpoint/2010/main" val="1302118101"/>
+        <p14:creationId xmlns:p14="http://schemas.microsoft.com/office/powerpoint/2010/main" val="911455276"/>
       </p:ext>
     </p:extLst>
   </p:cSld>
@@ -852,17 +849,7 @@
           <a:p>
             <a:r>
               <a:rPr lang="en-US" dirty="0" smtClean="0"/>
-              <a:t>Finally,</a:t>
-            </a:r>
-            <a:r>
-              <a:rPr lang="en-US" baseline="0" dirty="0" smtClean="0"/>
-              <a:t> you might want to always do something whether or not an exception was thrown. You put that in the finally clause. Beware that what you do here can also thrown an exception, maybe.</a:t>
-            </a:r>
-          </a:p>
-          <a:p>
-            <a:r>
-              <a:rPr lang="en-US" baseline="0" dirty="0" smtClean="0"/>
-              <a:t>Notice how we got the finally clause executed.</a:t>
+              <a:t>The compiler complains that we tried to catch the more general Exception first.</a:t>
             </a:r>
             <a:endParaRPr lang="en-US" dirty="0"/>
           </a:p>
@@ -894,7 +881,7 @@
     </p:spTree>
     <p:extLst>
       <p:ext uri="{BB962C8B-B14F-4D97-AF65-F5344CB8AC3E}">
-        <p14:creationId xmlns:p14="http://schemas.microsoft.com/office/powerpoint/2010/main" val="3393215399"/>
+        <p14:creationId xmlns:p14="http://schemas.microsoft.com/office/powerpoint/2010/main" val="2988615943"/>
       </p:ext>
     </p:extLst>
   </p:cSld>
@@ -950,21 +937,19 @@
           <a:p>
             <a:r>
               <a:rPr lang="en-US" dirty="0" smtClean="0"/>
-              <a:t>We created a new class </a:t>
+              <a:t>We can choose to declare that our method throws </a:t>
             </a:r>
             <a:r>
               <a:rPr lang="en-US" dirty="0" err="1" smtClean="0"/>
-              <a:t>ReadLineException</a:t>
+              <a:t>IOException</a:t>
+            </a:r>
+            <a:r>
+              <a:rPr lang="en-US" dirty="0" smtClean="0"/>
+              <a:t>. In that case</a:t>
             </a:r>
             <a:r>
               <a:rPr lang="en-US" baseline="0" dirty="0" smtClean="0"/>
-              <a:t> that extends Exception.</a:t>
-            </a:r>
-          </a:p>
-          <a:p>
-            <a:r>
-              <a:rPr lang="en-US" baseline="0" dirty="0" smtClean="0"/>
-              <a:t>We see in the stack trace that we get our own exception.</a:t>
+              <a:t> the problem is moved to the code that calls the method. We can see that now the compiler complains that the main method should catch the exception.</a:t>
             </a:r>
             <a:endParaRPr lang="en-US" dirty="0"/>
           </a:p>
@@ -988,6 +973,318 @@
             <a:fld id="{5EEA4EF7-1170-4BDC-97FA-BEEDBF3971E5}" type="slidenum">
               <a:rPr lang="en-US" smtClean="0"/>
               <a:t>23</a:t>
+            </a:fld>
+            <a:endParaRPr lang="en-US"/>
+          </a:p>
+        </p:txBody>
+      </p:sp>
+    </p:spTree>
+    <p:extLst>
+      <p:ext uri="{BB962C8B-B14F-4D97-AF65-F5344CB8AC3E}">
+        <p14:creationId xmlns:p14="http://schemas.microsoft.com/office/powerpoint/2010/main" val="2900431038"/>
+      </p:ext>
+    </p:extLst>
+  </p:cSld>
+  <p:clrMapOvr>
+    <a:masterClrMapping/>
+  </p:clrMapOvr>
+</p:notes>
+</file>
+
+<file path=ppt/notesSlides/notesSlide14.xml><?xml version="1.0" encoding="utf-8"?>
+<p:notes xmlns:a="http://schemas.openxmlformats.org/drawingml/2006/main" xmlns:r="http://schemas.openxmlformats.org/officeDocument/2006/relationships" xmlns:p="http://schemas.openxmlformats.org/presentationml/2006/main">
+  <p:cSld>
+    <p:spTree>
+      <p:nvGrpSpPr>
+        <p:cNvPr id="1" name=""/>
+        <p:cNvGrpSpPr/>
+        <p:nvPr/>
+      </p:nvGrpSpPr>
+      <p:grpSpPr>
+        <a:xfrm>
+          <a:off x="0" y="0"/>
+          <a:ext cx="0" cy="0"/>
+          <a:chOff x="0" y="0"/>
+          <a:chExt cx="0" cy="0"/>
+        </a:xfrm>
+      </p:grpSpPr>
+      <p:sp>
+        <p:nvSpPr>
+          <p:cNvPr id="2" name="Slide Image Placeholder 1"/>
+          <p:cNvSpPr>
+            <a:spLocks noGrp="1" noRot="1" noChangeAspect="1"/>
+          </p:cNvSpPr>
+          <p:nvPr>
+            <p:ph type="sldImg"/>
+          </p:nvPr>
+        </p:nvSpPr>
+        <p:spPr/>
+      </p:sp>
+      <p:sp>
+        <p:nvSpPr>
+          <p:cNvPr id="3" name="Notes Placeholder 2"/>
+          <p:cNvSpPr>
+            <a:spLocks noGrp="1"/>
+          </p:cNvSpPr>
+          <p:nvPr>
+            <p:ph type="body" idx="1"/>
+          </p:nvPr>
+        </p:nvSpPr>
+        <p:spPr/>
+        <p:txBody>
+          <a:bodyPr/>
+          <a:lstStyle/>
+          <a:p>
+            <a:r>
+              <a:rPr lang="en-US" dirty="0" smtClean="0"/>
+              <a:t>Notice how we now throw a new exception in the catch clause.</a:t>
+            </a:r>
+          </a:p>
+          <a:p>
+            <a:r>
+              <a:rPr lang="en-US" dirty="0" smtClean="0"/>
+              <a:t>We now see in the stack</a:t>
+            </a:r>
+            <a:r>
+              <a:rPr lang="en-US" baseline="0" dirty="0" smtClean="0"/>
+              <a:t> </a:t>
+            </a:r>
+            <a:r>
+              <a:rPr lang="en-US" dirty="0" smtClean="0"/>
+              <a:t>trace that there is a “Caused by:” statement.</a:t>
+            </a:r>
+            <a:r>
+              <a:rPr lang="en-US" baseline="0" dirty="0" smtClean="0"/>
+              <a:t> So we can see that we can add some more information to the stack trace that way.</a:t>
+            </a:r>
+          </a:p>
+          <a:p>
+            <a:r>
+              <a:rPr lang="en-US" baseline="0" dirty="0" smtClean="0"/>
+              <a:t>That is the recommended practice if you declare throws, that you also catch the exception that caused it, and then re-throw it.</a:t>
+            </a:r>
+            <a:endParaRPr lang="en-US" dirty="0"/>
+          </a:p>
+        </p:txBody>
+      </p:sp>
+      <p:sp>
+        <p:nvSpPr>
+          <p:cNvPr id="4" name="Slide Number Placeholder 3"/>
+          <p:cNvSpPr>
+            <a:spLocks noGrp="1"/>
+          </p:cNvSpPr>
+          <p:nvPr>
+            <p:ph type="sldNum" sz="quarter" idx="10"/>
+          </p:nvPr>
+        </p:nvSpPr>
+        <p:spPr/>
+        <p:txBody>
+          <a:bodyPr/>
+          <a:lstStyle/>
+          <a:p>
+            <a:fld id="{5EEA4EF7-1170-4BDC-97FA-BEEDBF3971E5}" type="slidenum">
+              <a:rPr lang="en-US" smtClean="0"/>
+              <a:t>24</a:t>
+            </a:fld>
+            <a:endParaRPr lang="en-US"/>
+          </a:p>
+        </p:txBody>
+      </p:sp>
+    </p:spTree>
+    <p:extLst>
+      <p:ext uri="{BB962C8B-B14F-4D97-AF65-F5344CB8AC3E}">
+        <p14:creationId xmlns:p14="http://schemas.microsoft.com/office/powerpoint/2010/main" val="1302118101"/>
+      </p:ext>
+    </p:extLst>
+  </p:cSld>
+  <p:clrMapOvr>
+    <a:masterClrMapping/>
+  </p:clrMapOvr>
+</p:notes>
+</file>
+
+<file path=ppt/notesSlides/notesSlide15.xml><?xml version="1.0" encoding="utf-8"?>
+<p:notes xmlns:a="http://schemas.openxmlformats.org/drawingml/2006/main" xmlns:r="http://schemas.openxmlformats.org/officeDocument/2006/relationships" xmlns:p="http://schemas.openxmlformats.org/presentationml/2006/main">
+  <p:cSld>
+    <p:spTree>
+      <p:nvGrpSpPr>
+        <p:cNvPr id="1" name=""/>
+        <p:cNvGrpSpPr/>
+        <p:nvPr/>
+      </p:nvGrpSpPr>
+      <p:grpSpPr>
+        <a:xfrm>
+          <a:off x="0" y="0"/>
+          <a:ext cx="0" cy="0"/>
+          <a:chOff x="0" y="0"/>
+          <a:chExt cx="0" cy="0"/>
+        </a:xfrm>
+      </p:grpSpPr>
+      <p:sp>
+        <p:nvSpPr>
+          <p:cNvPr id="2" name="Slide Image Placeholder 1"/>
+          <p:cNvSpPr>
+            <a:spLocks noGrp="1" noRot="1" noChangeAspect="1"/>
+          </p:cNvSpPr>
+          <p:nvPr>
+            <p:ph type="sldImg"/>
+          </p:nvPr>
+        </p:nvSpPr>
+        <p:spPr/>
+      </p:sp>
+      <p:sp>
+        <p:nvSpPr>
+          <p:cNvPr id="3" name="Notes Placeholder 2"/>
+          <p:cNvSpPr>
+            <a:spLocks noGrp="1"/>
+          </p:cNvSpPr>
+          <p:nvPr>
+            <p:ph type="body" idx="1"/>
+          </p:nvPr>
+        </p:nvSpPr>
+        <p:spPr/>
+        <p:txBody>
+          <a:bodyPr/>
+          <a:lstStyle/>
+          <a:p>
+            <a:r>
+              <a:rPr lang="en-US" dirty="0" smtClean="0"/>
+              <a:t>Finally,</a:t>
+            </a:r>
+            <a:r>
+              <a:rPr lang="en-US" baseline="0" dirty="0" smtClean="0"/>
+              <a:t> you might want to always do something whether or not an exception was thrown. You put that in the finally clause. Beware that what you do here can also thrown an exception, maybe.</a:t>
+            </a:r>
+          </a:p>
+          <a:p>
+            <a:r>
+              <a:rPr lang="en-US" baseline="0" dirty="0" smtClean="0"/>
+              <a:t>Notice how we got the finally clause executed.</a:t>
+            </a:r>
+            <a:endParaRPr lang="en-US" dirty="0"/>
+          </a:p>
+        </p:txBody>
+      </p:sp>
+      <p:sp>
+        <p:nvSpPr>
+          <p:cNvPr id="4" name="Slide Number Placeholder 3"/>
+          <p:cNvSpPr>
+            <a:spLocks noGrp="1"/>
+          </p:cNvSpPr>
+          <p:nvPr>
+            <p:ph type="sldNum" sz="quarter" idx="10"/>
+          </p:nvPr>
+        </p:nvSpPr>
+        <p:spPr/>
+        <p:txBody>
+          <a:bodyPr/>
+          <a:lstStyle/>
+          <a:p>
+            <a:fld id="{5EEA4EF7-1170-4BDC-97FA-BEEDBF3971E5}" type="slidenum">
+              <a:rPr lang="en-US" smtClean="0"/>
+              <a:t>25</a:t>
+            </a:fld>
+            <a:endParaRPr lang="en-US"/>
+          </a:p>
+        </p:txBody>
+      </p:sp>
+    </p:spTree>
+    <p:extLst>
+      <p:ext uri="{BB962C8B-B14F-4D97-AF65-F5344CB8AC3E}">
+        <p14:creationId xmlns:p14="http://schemas.microsoft.com/office/powerpoint/2010/main" val="3393215399"/>
+      </p:ext>
+    </p:extLst>
+  </p:cSld>
+  <p:clrMapOvr>
+    <a:masterClrMapping/>
+  </p:clrMapOvr>
+</p:notes>
+</file>
+
+<file path=ppt/notesSlides/notesSlide16.xml><?xml version="1.0" encoding="utf-8"?>
+<p:notes xmlns:a="http://schemas.openxmlformats.org/drawingml/2006/main" xmlns:r="http://schemas.openxmlformats.org/officeDocument/2006/relationships" xmlns:p="http://schemas.openxmlformats.org/presentationml/2006/main">
+  <p:cSld>
+    <p:spTree>
+      <p:nvGrpSpPr>
+        <p:cNvPr id="1" name=""/>
+        <p:cNvGrpSpPr/>
+        <p:nvPr/>
+      </p:nvGrpSpPr>
+      <p:grpSpPr>
+        <a:xfrm>
+          <a:off x="0" y="0"/>
+          <a:ext cx="0" cy="0"/>
+          <a:chOff x="0" y="0"/>
+          <a:chExt cx="0" cy="0"/>
+        </a:xfrm>
+      </p:grpSpPr>
+      <p:sp>
+        <p:nvSpPr>
+          <p:cNvPr id="2" name="Slide Image Placeholder 1"/>
+          <p:cNvSpPr>
+            <a:spLocks noGrp="1" noRot="1" noChangeAspect="1"/>
+          </p:cNvSpPr>
+          <p:nvPr>
+            <p:ph type="sldImg"/>
+          </p:nvPr>
+        </p:nvSpPr>
+        <p:spPr/>
+      </p:sp>
+      <p:sp>
+        <p:nvSpPr>
+          <p:cNvPr id="3" name="Notes Placeholder 2"/>
+          <p:cNvSpPr>
+            <a:spLocks noGrp="1"/>
+          </p:cNvSpPr>
+          <p:nvPr>
+            <p:ph type="body" idx="1"/>
+          </p:nvPr>
+        </p:nvSpPr>
+        <p:spPr/>
+        <p:txBody>
+          <a:bodyPr/>
+          <a:lstStyle/>
+          <a:p>
+            <a:r>
+              <a:rPr lang="en-US" dirty="0" smtClean="0"/>
+              <a:t>We created a new class </a:t>
+            </a:r>
+            <a:r>
+              <a:rPr lang="en-US" dirty="0" err="1" smtClean="0"/>
+              <a:t>ReadLineException</a:t>
+            </a:r>
+            <a:r>
+              <a:rPr lang="en-US" baseline="0" dirty="0" smtClean="0"/>
+              <a:t> that extends Exception.</a:t>
+            </a:r>
+          </a:p>
+          <a:p>
+            <a:r>
+              <a:rPr lang="en-US" baseline="0" dirty="0" smtClean="0"/>
+              <a:t>We see in the stack trace that we get our own exception.</a:t>
+            </a:r>
+            <a:endParaRPr lang="en-US" dirty="0"/>
+          </a:p>
+        </p:txBody>
+      </p:sp>
+      <p:sp>
+        <p:nvSpPr>
+          <p:cNvPr id="4" name="Slide Number Placeholder 3"/>
+          <p:cNvSpPr>
+            <a:spLocks noGrp="1"/>
+          </p:cNvSpPr>
+          <p:nvPr>
+            <p:ph type="sldNum" sz="quarter" idx="10"/>
+          </p:nvPr>
+        </p:nvSpPr>
+        <p:spPr/>
+        <p:txBody>
+          <a:bodyPr/>
+          <a:lstStyle/>
+          <a:p>
+            <a:fld id="{5EEA4EF7-1170-4BDC-97FA-BEEDBF3971E5}" type="slidenum">
+              <a:rPr lang="en-US" smtClean="0"/>
+              <a:t>26</a:t>
             </a:fld>
             <a:endParaRPr lang="en-US"/>
           </a:p>
@@ -1052,17 +1349,11 @@
           <a:p>
             <a:r>
               <a:rPr lang="en-US" dirty="0" smtClean="0"/>
-              <a:t>If you</a:t>
+              <a:t>Open</a:t>
             </a:r>
             <a:r>
               <a:rPr lang="en-US" baseline="0" dirty="0" smtClean="0"/>
-              <a:t> add a method call in your code to a method that throws an exception, the compiler will complain saying that there in an unhandled exception.</a:t>
-            </a:r>
-          </a:p>
-          <a:p>
-            <a:r>
-              <a:rPr lang="en-US" baseline="0" dirty="0" smtClean="0"/>
-              <a:t>You can then decide to declare that your method throws the exception, or try to catch it.</a:t>
+              <a:t> Control Panel and click ‘Java’</a:t>
             </a:r>
             <a:endParaRPr lang="en-US" dirty="0"/>
           </a:p>
@@ -1085,7 +1376,7 @@
           <a:p>
             <a:fld id="{5EEA4EF7-1170-4BDC-97FA-BEEDBF3971E5}" type="slidenum">
               <a:rPr lang="en-US" smtClean="0"/>
-              <a:t>10</a:t>
+              <a:t>9</a:t>
             </a:fld>
             <a:endParaRPr lang="en-US"/>
           </a:p>
@@ -1094,7 +1385,7 @@
     </p:spTree>
     <p:extLst>
       <p:ext uri="{BB962C8B-B14F-4D97-AF65-F5344CB8AC3E}">
-        <p14:creationId xmlns:p14="http://schemas.microsoft.com/office/powerpoint/2010/main" val="2403355962"/>
+        <p14:creationId xmlns:p14="http://schemas.microsoft.com/office/powerpoint/2010/main" val="968278868"/>
       </p:ext>
     </p:extLst>
   </p:cSld>
@@ -1150,21 +1441,13 @@
           <a:p>
             <a:r>
               <a:rPr lang="en-US" dirty="0" smtClean="0"/>
-              <a:t>I chose to catch the exception, bu</a:t>
-            </a:r>
-            <a:r>
-              <a:rPr lang="en-US" baseline="0" dirty="0" smtClean="0"/>
-              <a:t>t the compiler is still not happy.</a:t>
+              <a:t>Slide the ‘Security Level’ down to ‘Medium’</a:t>
             </a:r>
           </a:p>
           <a:p>
             <a:r>
               <a:rPr lang="en-US" dirty="0" smtClean="0"/>
-              <a:t>Now because I caught the exception, the</a:t>
-            </a:r>
-            <a:r>
-              <a:rPr lang="en-US" baseline="0" dirty="0" smtClean="0"/>
-              <a:t> method is no longer guaranteed to return a value.</a:t>
+              <a:t>Click ‘Apply’</a:t>
             </a:r>
             <a:endParaRPr lang="en-US" dirty="0"/>
           </a:p>
@@ -1187,7 +1470,7 @@
           <a:p>
             <a:fld id="{5EEA4EF7-1170-4BDC-97FA-BEEDBF3971E5}" type="slidenum">
               <a:rPr lang="en-US" smtClean="0"/>
-              <a:t>11</a:t>
+              <a:t>10</a:t>
             </a:fld>
             <a:endParaRPr lang="en-US"/>
           </a:p>
@@ -1196,7 +1479,7 @@
     </p:spTree>
     <p:extLst>
       <p:ext uri="{BB962C8B-B14F-4D97-AF65-F5344CB8AC3E}">
-        <p14:creationId xmlns:p14="http://schemas.microsoft.com/office/powerpoint/2010/main" val="4286263845"/>
+        <p14:creationId xmlns:p14="http://schemas.microsoft.com/office/powerpoint/2010/main" val="3103144659"/>
       </p:ext>
     </p:extLst>
   </p:cSld>
@@ -1252,25 +1535,17 @@
           <a:p>
             <a:r>
               <a:rPr lang="en-US" dirty="0" smtClean="0"/>
-              <a:t>Now if there was an exception thrown, we will</a:t>
+              <a:t>Open</a:t>
             </a:r>
             <a:r>
               <a:rPr lang="en-US" baseline="0" dirty="0" smtClean="0"/>
-              <a:t> return null.</a:t>
+              <a:t> the ‘applet.html’ file in a browser.</a:t>
             </a:r>
           </a:p>
           <a:p>
             <a:r>
               <a:rPr lang="en-US" baseline="0" dirty="0" smtClean="0"/>
-              <a:t>Notice the </a:t>
-            </a:r>
-            <a:r>
-              <a:rPr lang="en-US" baseline="0" dirty="0" err="1" smtClean="0"/>
-              <a:t>printStackTrace</a:t>
-            </a:r>
-            <a:r>
-              <a:rPr lang="en-US" baseline="0" dirty="0" smtClean="0"/>
-              <a:t> method. It will print out a stack of the previous method calls, so you can track where the error occurred.</a:t>
+              <a:t>Make sure that the browser process has been completely restarted first.</a:t>
             </a:r>
             <a:endParaRPr lang="en-US" dirty="0"/>
           </a:p>
@@ -1293,7 +1568,7 @@
           <a:p>
             <a:fld id="{5EEA4EF7-1170-4BDC-97FA-BEEDBF3971E5}" type="slidenum">
               <a:rPr lang="en-US" smtClean="0"/>
-              <a:t>12</a:t>
+              <a:t>11</a:t>
             </a:fld>
             <a:endParaRPr lang="en-US"/>
           </a:p>
@@ -1302,7 +1577,7 @@
     </p:spTree>
     <p:extLst>
       <p:ext uri="{BB962C8B-B14F-4D97-AF65-F5344CB8AC3E}">
-        <p14:creationId xmlns:p14="http://schemas.microsoft.com/office/powerpoint/2010/main" val="2070858978"/>
+        <p14:creationId xmlns:p14="http://schemas.microsoft.com/office/powerpoint/2010/main" val="991609606"/>
       </p:ext>
     </p:extLst>
   </p:cSld>
@@ -1358,36 +1633,18 @@
           <a:p>
             <a:r>
               <a:rPr lang="en-US" dirty="0" smtClean="0"/>
-              <a:t>Read from the bottom. Click on any of the links to go to the line.</a:t>
-            </a:r>
-          </a:p>
-          <a:p>
-            <a:r>
-              <a:rPr lang="en-US" dirty="0" smtClean="0"/>
-              <a:t>Notice that the </a:t>
-            </a:r>
-            <a:r>
-              <a:rPr lang="en-US" dirty="0" err="1" smtClean="0"/>
-              <a:t>NullPointerException</a:t>
-            </a:r>
-            <a:r>
-              <a:rPr lang="en-US" dirty="0" smtClean="0"/>
-              <a:t> is</a:t>
+              <a:t>If you</a:t>
             </a:r>
             <a:r>
               <a:rPr lang="en-US" baseline="0" dirty="0" smtClean="0"/>
-              <a:t> not an </a:t>
-            </a:r>
-            <a:r>
-              <a:rPr lang="en-US" baseline="0" dirty="0" err="1" smtClean="0"/>
-              <a:t>IOException</a:t>
-            </a:r>
+              <a:t> add a method call in your code to a method that throws an exception, the compiler will complain saying that there in an unhandled exception.</a:t>
+            </a:r>
+          </a:p>
+          <a:p>
             <a:r>
               <a:rPr lang="en-US" baseline="0" dirty="0" smtClean="0"/>
-              <a:t>.</a:t>
-            </a:r>
-          </a:p>
-          <a:p>
+              <a:t>You can then decide to declare that your method throws the exception, or try to catch it.</a:t>
+            </a:r>
             <a:endParaRPr lang="en-US" dirty="0"/>
           </a:p>
         </p:txBody>
@@ -1418,7 +1675,7 @@
     </p:spTree>
     <p:extLst>
       <p:ext uri="{BB962C8B-B14F-4D97-AF65-F5344CB8AC3E}">
-        <p14:creationId xmlns:p14="http://schemas.microsoft.com/office/powerpoint/2010/main" val="613990795"/>
+        <p14:creationId xmlns:p14="http://schemas.microsoft.com/office/powerpoint/2010/main" val="2403355962"/>
       </p:ext>
     </p:extLst>
   </p:cSld>
@@ -1474,33 +1731,21 @@
           <a:p>
             <a:r>
               <a:rPr lang="en-US" dirty="0" smtClean="0"/>
-              <a:t>We can see that if</a:t>
+              <a:t>I chose to catch the exception, bu</a:t>
             </a:r>
             <a:r>
               <a:rPr lang="en-US" baseline="0" dirty="0" smtClean="0"/>
-              <a:t> we add the following line to our code, we don’t see that in the output. So we didn’t actually catch the exception.</a:t>
-            </a:r>
-          </a:p>
-          <a:p>
+              <a:t>t the compiler is still not happy.</a:t>
+            </a:r>
+          </a:p>
+          <a:p>
+            <a:r>
+              <a:rPr lang="en-US" dirty="0" smtClean="0"/>
+              <a:t>Now because I caught the exception, the</a:t>
+            </a:r>
             <a:r>
               <a:rPr lang="en-US" baseline="0" dirty="0" smtClean="0"/>
-              <a:t>That is because </a:t>
-            </a:r>
-            <a:r>
-              <a:rPr lang="en-US" baseline="0" dirty="0" err="1" smtClean="0"/>
-              <a:t>NullPointerException</a:t>
-            </a:r>
-            <a:r>
-              <a:rPr lang="en-US" baseline="0" dirty="0" smtClean="0"/>
-              <a:t> is not an </a:t>
-            </a:r>
-            <a:r>
-              <a:rPr lang="en-US" baseline="0" dirty="0" err="1" smtClean="0"/>
-              <a:t>IOException</a:t>
-            </a:r>
-            <a:r>
-              <a:rPr lang="en-US" baseline="0" dirty="0" smtClean="0"/>
-              <a:t>.</a:t>
+              <a:t> method is no longer guaranteed to return a value.</a:t>
             </a:r>
             <a:endParaRPr lang="en-US" dirty="0"/>
           </a:p>
@@ -1532,7 +1777,7 @@
     </p:spTree>
     <p:extLst>
       <p:ext uri="{BB962C8B-B14F-4D97-AF65-F5344CB8AC3E}">
-        <p14:creationId xmlns:p14="http://schemas.microsoft.com/office/powerpoint/2010/main" val="1350153984"/>
+        <p14:creationId xmlns:p14="http://schemas.microsoft.com/office/powerpoint/2010/main" val="4286263845"/>
       </p:ext>
     </p:extLst>
   </p:cSld>
@@ -1588,33 +1833,25 @@
           <a:p>
             <a:r>
               <a:rPr lang="en-US" dirty="0" smtClean="0"/>
-              <a:t>This exception</a:t>
+              <a:t>Now if there was an exception thrown, we will</a:t>
             </a:r>
             <a:r>
               <a:rPr lang="en-US" baseline="0" dirty="0" smtClean="0"/>
-              <a:t> is a </a:t>
+              <a:t> return null.</a:t>
+            </a:r>
+          </a:p>
+          <a:p>
+            <a:r>
+              <a:rPr lang="en-US" baseline="0" dirty="0" smtClean="0"/>
+              <a:t>Notice the </a:t>
             </a:r>
             <a:r>
               <a:rPr lang="en-US" baseline="0" dirty="0" err="1" smtClean="0"/>
-              <a:t>RuntimeException</a:t>
+              <a:t>printStackTrace</a:t>
             </a:r>
             <a:r>
               <a:rPr lang="en-US" baseline="0" dirty="0" smtClean="0"/>
-              <a:t>, and these do not need to be declared.</a:t>
-            </a:r>
-          </a:p>
-          <a:p>
-            <a:r>
-              <a:rPr lang="en-US" baseline="0" dirty="0" smtClean="0"/>
-              <a:t>It still extends from </a:t>
-            </a:r>
-            <a:r>
-              <a:rPr lang="en-US" baseline="0" dirty="0" err="1" smtClean="0"/>
-              <a:t>Throwable</a:t>
-            </a:r>
-            <a:r>
-              <a:rPr lang="en-US" baseline="0" dirty="0" smtClean="0"/>
-              <a:t>, which means that we can catch it. Let’s “try”.</a:t>
+              <a:t> method. It will print out a stack of the previous method calls, so you can track where the error occurred.</a:t>
             </a:r>
             <a:endParaRPr lang="en-US" dirty="0"/>
           </a:p>
@@ -1646,7 +1883,7 @@
     </p:spTree>
     <p:extLst>
       <p:ext uri="{BB962C8B-B14F-4D97-AF65-F5344CB8AC3E}">
-        <p14:creationId xmlns:p14="http://schemas.microsoft.com/office/powerpoint/2010/main" val="3365400722"/>
+        <p14:creationId xmlns:p14="http://schemas.microsoft.com/office/powerpoint/2010/main" val="2070858978"/>
       </p:ext>
     </p:extLst>
   </p:cSld>
@@ -1702,12 +1939,36 @@
           <a:p>
             <a:r>
               <a:rPr lang="en-US" dirty="0" smtClean="0"/>
-              <a:t>When an</a:t>
+              <a:t>Read from the bottom. Click on any of the links to go to the line.</a:t>
+            </a:r>
+          </a:p>
+          <a:p>
+            <a:r>
+              <a:rPr lang="en-US" dirty="0" smtClean="0"/>
+              <a:t>Notice that the </a:t>
+            </a:r>
+            <a:r>
+              <a:rPr lang="en-US" dirty="0" err="1" smtClean="0"/>
+              <a:t>NullPointerException</a:t>
+            </a:r>
+            <a:r>
+              <a:rPr lang="en-US" dirty="0" smtClean="0"/>
+              <a:t> is</a:t>
             </a:r>
             <a:r>
               <a:rPr lang="en-US" baseline="0" dirty="0" smtClean="0"/>
-              <a:t> exception is thrown, the JVM goes through the catch clauses in order, so if one exception extends from another, that has to come first, otherwise the more general exception clause is always caught. Let’s try it.</a:t>
-            </a:r>
+              <a:t> not an </a:t>
+            </a:r>
+            <a:r>
+              <a:rPr lang="en-US" baseline="0" dirty="0" err="1" smtClean="0"/>
+              <a:t>IOException</a:t>
+            </a:r>
+            <a:r>
+              <a:rPr lang="en-US" baseline="0" dirty="0" smtClean="0"/>
+              <a:t>.</a:t>
+            </a:r>
+          </a:p>
+          <a:p>
             <a:endParaRPr lang="en-US" dirty="0"/>
           </a:p>
         </p:txBody>
@@ -1738,7 +1999,7 @@
     </p:spTree>
     <p:extLst>
       <p:ext uri="{BB962C8B-B14F-4D97-AF65-F5344CB8AC3E}">
-        <p14:creationId xmlns:p14="http://schemas.microsoft.com/office/powerpoint/2010/main" val="911455276"/>
+        <p14:creationId xmlns:p14="http://schemas.microsoft.com/office/powerpoint/2010/main" val="613990795"/>
       </p:ext>
     </p:extLst>
   </p:cSld>
@@ -1794,7 +2055,33 @@
           <a:p>
             <a:r>
               <a:rPr lang="en-US" dirty="0" smtClean="0"/>
-              <a:t>The compiler complains that we tried to catch the more general Exception first.</a:t>
+              <a:t>We can see that if</a:t>
+            </a:r>
+            <a:r>
+              <a:rPr lang="en-US" baseline="0" dirty="0" smtClean="0"/>
+              <a:t> we add the following line to our code, we don’t see that in the output. So we didn’t actually catch the exception.</a:t>
+            </a:r>
+          </a:p>
+          <a:p>
+            <a:r>
+              <a:rPr lang="en-US" baseline="0" dirty="0" smtClean="0"/>
+              <a:t>That is because </a:t>
+            </a:r>
+            <a:r>
+              <a:rPr lang="en-US" baseline="0" dirty="0" err="1" smtClean="0"/>
+              <a:t>NullPointerException</a:t>
+            </a:r>
+            <a:r>
+              <a:rPr lang="en-US" baseline="0" dirty="0" smtClean="0"/>
+              <a:t> is not an </a:t>
+            </a:r>
+            <a:r>
+              <a:rPr lang="en-US" baseline="0" dirty="0" err="1" smtClean="0"/>
+              <a:t>IOException</a:t>
+            </a:r>
+            <a:r>
+              <a:rPr lang="en-US" baseline="0" dirty="0" smtClean="0"/>
+              <a:t>.</a:t>
             </a:r>
             <a:endParaRPr lang="en-US" dirty="0"/>
           </a:p>
@@ -1817,7 +2104,7 @@
           <a:p>
             <a:fld id="{5EEA4EF7-1170-4BDC-97FA-BEEDBF3971E5}" type="slidenum">
               <a:rPr lang="en-US" smtClean="0"/>
-              <a:t>19</a:t>
+              <a:t>17</a:t>
             </a:fld>
             <a:endParaRPr lang="en-US"/>
           </a:p>
@@ -1826,7 +2113,7 @@
     </p:spTree>
     <p:extLst>
       <p:ext uri="{BB962C8B-B14F-4D97-AF65-F5344CB8AC3E}">
-        <p14:creationId xmlns:p14="http://schemas.microsoft.com/office/powerpoint/2010/main" val="2988615943"/>
+        <p14:creationId xmlns:p14="http://schemas.microsoft.com/office/powerpoint/2010/main" val="1350153984"/>
       </p:ext>
     </p:extLst>
   </p:cSld>
@@ -2012,7 +2299,7 @@
           <a:p>
             <a:fld id="{6F69DFD9-279D-4F8A-9CB8-FA17EBD510E8}" type="datetimeFigureOut">
               <a:rPr lang="en-US" smtClean="0"/>
-              <a:t>5/15/2014</a:t>
+              <a:t>5/23/2014</a:t>
             </a:fld>
             <a:endParaRPr lang="en-US"/>
           </a:p>
@@ -2189,7 +2476,7 @@
           <a:p>
             <a:fld id="{6F69DFD9-279D-4F8A-9CB8-FA17EBD510E8}" type="datetimeFigureOut">
               <a:rPr lang="en-US" smtClean="0"/>
-              <a:t>5/15/2014</a:t>
+              <a:t>5/23/2014</a:t>
             </a:fld>
             <a:endParaRPr lang="en-US"/>
           </a:p>
@@ -2369,7 +2656,7 @@
           <a:p>
             <a:fld id="{6F69DFD9-279D-4F8A-9CB8-FA17EBD510E8}" type="datetimeFigureOut">
               <a:rPr lang="en-US" smtClean="0"/>
-              <a:t>5/15/2014</a:t>
+              <a:t>5/23/2014</a:t>
             </a:fld>
             <a:endParaRPr lang="en-US"/>
           </a:p>
@@ -2539,7 +2826,7 @@
           <a:p>
             <a:fld id="{6F69DFD9-279D-4F8A-9CB8-FA17EBD510E8}" type="datetimeFigureOut">
               <a:rPr lang="en-US" smtClean="0"/>
-              <a:t>5/15/2014</a:t>
+              <a:t>5/23/2014</a:t>
             </a:fld>
             <a:endParaRPr lang="en-US"/>
           </a:p>
@@ -2792,7 +3079,7 @@
           <a:p>
             <a:fld id="{6F69DFD9-279D-4F8A-9CB8-FA17EBD510E8}" type="datetimeFigureOut">
               <a:rPr lang="en-US" smtClean="0"/>
-              <a:t>5/15/2014</a:t>
+              <a:t>5/23/2014</a:t>
             </a:fld>
             <a:endParaRPr lang="en-US"/>
           </a:p>
@@ -3087,7 +3374,7 @@
           <a:p>
             <a:fld id="{6F69DFD9-279D-4F8A-9CB8-FA17EBD510E8}" type="datetimeFigureOut">
               <a:rPr lang="en-US" smtClean="0"/>
-              <a:t>5/15/2014</a:t>
+              <a:t>5/23/2014</a:t>
             </a:fld>
             <a:endParaRPr lang="en-US"/>
           </a:p>
@@ -3509,7 +3796,7 @@
           <a:p>
             <a:fld id="{6F69DFD9-279D-4F8A-9CB8-FA17EBD510E8}" type="datetimeFigureOut">
               <a:rPr lang="en-US" smtClean="0"/>
-              <a:t>5/15/2014</a:t>
+              <a:t>5/23/2014</a:t>
             </a:fld>
             <a:endParaRPr lang="en-US"/>
           </a:p>
@@ -3627,7 +3914,7 @@
           <a:p>
             <a:fld id="{6F69DFD9-279D-4F8A-9CB8-FA17EBD510E8}" type="datetimeFigureOut">
               <a:rPr lang="en-US" smtClean="0"/>
-              <a:t>5/15/2014</a:t>
+              <a:t>5/23/2014</a:t>
             </a:fld>
             <a:endParaRPr lang="en-US"/>
           </a:p>
@@ -3722,7 +4009,7 @@
           <a:p>
             <a:fld id="{6F69DFD9-279D-4F8A-9CB8-FA17EBD510E8}" type="datetimeFigureOut">
               <a:rPr lang="en-US" smtClean="0"/>
-              <a:t>5/15/2014</a:t>
+              <a:t>5/23/2014</a:t>
             </a:fld>
             <a:endParaRPr lang="en-US"/>
           </a:p>
@@ -3999,7 +4286,7 @@
           <a:p>
             <a:fld id="{6F69DFD9-279D-4F8A-9CB8-FA17EBD510E8}" type="datetimeFigureOut">
               <a:rPr lang="en-US" smtClean="0"/>
-              <a:t>5/15/2014</a:t>
+              <a:t>5/23/2014</a:t>
             </a:fld>
             <a:endParaRPr lang="en-US"/>
           </a:p>
@@ -4256,7 +4543,7 @@
           <a:p>
             <a:fld id="{6F69DFD9-279D-4F8A-9CB8-FA17EBD510E8}" type="datetimeFigureOut">
               <a:rPr lang="en-US" smtClean="0"/>
-              <a:t>5/15/2014</a:t>
+              <a:t>5/23/2014</a:t>
             </a:fld>
             <a:endParaRPr lang="en-US"/>
           </a:p>
@@ -4479,7 +4766,7 @@
           <a:p>
             <a:fld id="{6F69DFD9-279D-4F8A-9CB8-FA17EBD510E8}" type="datetimeFigureOut">
               <a:rPr lang="en-US" smtClean="0"/>
-              <a:t>5/15/2014</a:t>
+              <a:t>5/23/2014</a:t>
             </a:fld>
             <a:endParaRPr lang="en-US"/>
           </a:p>
@@ -5100,6 +5387,463 @@
           <a:p>
             <a:r>
               <a:rPr lang="en-US" dirty="0" smtClean="0"/>
+              <a:t>Java Security</a:t>
+            </a:r>
+            <a:endParaRPr lang="en-US" dirty="0"/>
+          </a:p>
+        </p:txBody>
+      </p:sp>
+      <p:pic>
+        <p:nvPicPr>
+          <p:cNvPr id="3074" name="Picture 2"/>
+          <p:cNvPicPr>
+            <a:picLocks noChangeAspect="1" noChangeArrowheads="1"/>
+          </p:cNvPicPr>
+          <p:nvPr/>
+        </p:nvPicPr>
+        <p:blipFill>
+          <a:blip r:embed="rId3">
+            <a:extLst>
+              <a:ext uri="{28A0092B-C50C-407E-A947-70E740481C1C}">
+                <a14:useLocalDpi xmlns:a14="http://schemas.microsoft.com/office/drawing/2010/main" val="0"/>
+              </a:ext>
+            </a:extLst>
+          </a:blip>
+          <a:srcRect/>
+          <a:stretch>
+            <a:fillRect/>
+          </a:stretch>
+        </p:blipFill>
+        <p:spPr bwMode="auto">
+          <a:xfrm>
+            <a:off x="2362200" y="1295400"/>
+            <a:ext cx="5057775" cy="5391150"/>
+          </a:xfrm>
+          <a:prstGeom prst="rect">
+            <a:avLst/>
+          </a:prstGeom>
+          <a:noFill/>
+          <a:ln>
+            <a:noFill/>
+          </a:ln>
+          <a:extLst>
+            <a:ext uri="{909E8E84-426E-40DD-AFC4-6F175D3DCCD1}">
+              <a14:hiddenFill xmlns:a14="http://schemas.microsoft.com/office/drawing/2010/main">
+                <a:solidFill>
+                  <a:schemeClr val="accent1"/>
+                </a:solidFill>
+              </a14:hiddenFill>
+            </a:ext>
+            <a:ext uri="{91240B29-F687-4F45-9708-019B960494DF}">
+              <a14:hiddenLine xmlns:a14="http://schemas.microsoft.com/office/drawing/2010/main" w="9525">
+                <a:solidFill>
+                  <a:schemeClr val="tx1"/>
+                </a:solidFill>
+                <a:miter lim="800000"/>
+                <a:headEnd/>
+                <a:tailEnd/>
+              </a14:hiddenLine>
+            </a:ext>
+          </a:extLst>
+        </p:spPr>
+      </p:pic>
+      <p:sp>
+        <p:nvSpPr>
+          <p:cNvPr id="3" name="Right Arrow 2"/>
+          <p:cNvSpPr/>
+          <p:nvPr/>
+        </p:nvSpPr>
+        <p:spPr>
+          <a:xfrm>
+            <a:off x="3810000" y="3810000"/>
+            <a:ext cx="381000" cy="304800"/>
+          </a:xfrm>
+          <a:prstGeom prst="rightArrow">
+            <a:avLst/>
+          </a:prstGeom>
+          <a:noFill/>
+          <a:ln>
+            <a:solidFill>
+              <a:srgbClr val="FF0000"/>
+            </a:solidFill>
+          </a:ln>
+        </p:spPr>
+        <p:style>
+          <a:lnRef idx="2">
+            <a:schemeClr val="accent1">
+              <a:shade val="50000"/>
+            </a:schemeClr>
+          </a:lnRef>
+          <a:fillRef idx="1">
+            <a:schemeClr val="accent1"/>
+          </a:fillRef>
+          <a:effectRef idx="0">
+            <a:schemeClr val="accent1"/>
+          </a:effectRef>
+          <a:fontRef idx="minor">
+            <a:schemeClr val="lt1"/>
+          </a:fontRef>
+        </p:style>
+        <p:txBody>
+          <a:bodyPr rtlCol="0" anchor="ctr"/>
+          <a:lstStyle/>
+          <a:p>
+            <a:pPr algn="ctr"/>
+            <a:endParaRPr lang="en-US"/>
+          </a:p>
+        </p:txBody>
+      </p:sp>
+      <p:sp>
+        <p:nvSpPr>
+          <p:cNvPr id="9" name="Right Arrow 8"/>
+          <p:cNvSpPr/>
+          <p:nvPr/>
+        </p:nvSpPr>
+        <p:spPr>
+          <a:xfrm>
+            <a:off x="6233886" y="6277429"/>
+            <a:ext cx="381000" cy="304800"/>
+          </a:xfrm>
+          <a:prstGeom prst="rightArrow">
+            <a:avLst/>
+          </a:prstGeom>
+          <a:noFill/>
+          <a:ln>
+            <a:solidFill>
+              <a:srgbClr val="FF0000"/>
+            </a:solidFill>
+          </a:ln>
+        </p:spPr>
+        <p:style>
+          <a:lnRef idx="2">
+            <a:schemeClr val="accent1">
+              <a:shade val="50000"/>
+            </a:schemeClr>
+          </a:lnRef>
+          <a:fillRef idx="1">
+            <a:schemeClr val="accent1"/>
+          </a:fillRef>
+          <a:effectRef idx="0">
+            <a:schemeClr val="accent1"/>
+          </a:effectRef>
+          <a:fontRef idx="minor">
+            <a:schemeClr val="lt1"/>
+          </a:fontRef>
+        </p:style>
+        <p:txBody>
+          <a:bodyPr rtlCol="0" anchor="ctr"/>
+          <a:lstStyle/>
+          <a:p>
+            <a:pPr algn="ctr"/>
+            <a:endParaRPr lang="en-US"/>
+          </a:p>
+        </p:txBody>
+      </p:sp>
+    </p:spTree>
+    <p:extLst>
+      <p:ext uri="{BB962C8B-B14F-4D97-AF65-F5344CB8AC3E}">
+        <p14:creationId xmlns:p14="http://schemas.microsoft.com/office/powerpoint/2010/main" val="283158279"/>
+      </p:ext>
+    </p:extLst>
+  </p:cSld>
+  <p:clrMapOvr>
+    <a:masterClrMapping/>
+  </p:clrMapOvr>
+  <p:timing>
+    <p:tnLst>
+      <p:par>
+        <p:cTn id="1" dur="indefinite" restart="never" nodeType="tmRoot"/>
+      </p:par>
+    </p:tnLst>
+  </p:timing>
+</p:sld>
+</file>
+
+<file path=ppt/slides/slide11.xml><?xml version="1.0" encoding="utf-8"?>
+<p:sld xmlns:a="http://schemas.openxmlformats.org/drawingml/2006/main" xmlns:r="http://schemas.openxmlformats.org/officeDocument/2006/relationships" xmlns:p="http://schemas.openxmlformats.org/presentationml/2006/main">
+  <p:cSld>
+    <p:spTree>
+      <p:nvGrpSpPr>
+        <p:cNvPr id="1" name=""/>
+        <p:cNvGrpSpPr/>
+        <p:nvPr/>
+      </p:nvGrpSpPr>
+      <p:grpSpPr>
+        <a:xfrm>
+          <a:off x="0" y="0"/>
+          <a:ext cx="0" cy="0"/>
+          <a:chOff x="0" y="0"/>
+          <a:chExt cx="0" cy="0"/>
+        </a:xfrm>
+      </p:grpSpPr>
+      <p:sp>
+        <p:nvSpPr>
+          <p:cNvPr id="2" name="Title 1"/>
+          <p:cNvSpPr>
+            <a:spLocks noGrp="1"/>
+          </p:cNvSpPr>
+          <p:nvPr>
+            <p:ph type="title"/>
+          </p:nvPr>
+        </p:nvSpPr>
+        <p:spPr/>
+        <p:txBody>
+          <a:bodyPr/>
+          <a:lstStyle/>
+          <a:p>
+            <a:r>
+              <a:rPr lang="en-US" dirty="0" smtClean="0"/>
+              <a:t>Tic-Tac-Toe Applet</a:t>
+            </a:r>
+            <a:endParaRPr lang="en-US" dirty="0"/>
+          </a:p>
+        </p:txBody>
+      </p:sp>
+      <p:pic>
+        <p:nvPicPr>
+          <p:cNvPr id="1026" name="Picture 2"/>
+          <p:cNvPicPr>
+            <a:picLocks noChangeAspect="1" noChangeArrowheads="1"/>
+          </p:cNvPicPr>
+          <p:nvPr/>
+        </p:nvPicPr>
+        <p:blipFill>
+          <a:blip r:embed="rId3">
+            <a:extLst>
+              <a:ext uri="{28A0092B-C50C-407E-A947-70E740481C1C}">
+                <a14:useLocalDpi xmlns:a14="http://schemas.microsoft.com/office/drawing/2010/main" val="0"/>
+              </a:ext>
+            </a:extLst>
+          </a:blip>
+          <a:srcRect/>
+          <a:stretch>
+            <a:fillRect/>
+          </a:stretch>
+        </p:blipFill>
+        <p:spPr bwMode="auto">
+          <a:xfrm>
+            <a:off x="557212" y="1828800"/>
+            <a:ext cx="3914775" cy="3924300"/>
+          </a:xfrm>
+          <a:prstGeom prst="rect">
+            <a:avLst/>
+          </a:prstGeom>
+          <a:noFill/>
+          <a:ln>
+            <a:noFill/>
+          </a:ln>
+          <a:extLst>
+            <a:ext uri="{909E8E84-426E-40DD-AFC4-6F175D3DCCD1}">
+              <a14:hiddenFill xmlns:a14="http://schemas.microsoft.com/office/drawing/2010/main">
+                <a:solidFill>
+                  <a:schemeClr val="accent1"/>
+                </a:solidFill>
+              </a14:hiddenFill>
+            </a:ext>
+            <a:ext uri="{91240B29-F687-4F45-9708-019B960494DF}">
+              <a14:hiddenLine xmlns:a14="http://schemas.microsoft.com/office/drawing/2010/main" w="9525">
+                <a:solidFill>
+                  <a:schemeClr val="tx1"/>
+                </a:solidFill>
+                <a:miter lim="800000"/>
+                <a:headEnd/>
+                <a:tailEnd/>
+              </a14:hiddenLine>
+            </a:ext>
+          </a:extLst>
+        </p:spPr>
+      </p:pic>
+      <p:pic>
+        <p:nvPicPr>
+          <p:cNvPr id="1027" name="Picture 3"/>
+          <p:cNvPicPr>
+            <a:picLocks noChangeAspect="1" noChangeArrowheads="1"/>
+          </p:cNvPicPr>
+          <p:nvPr/>
+        </p:nvPicPr>
+        <p:blipFill>
+          <a:blip r:embed="rId4">
+            <a:extLst>
+              <a:ext uri="{28A0092B-C50C-407E-A947-70E740481C1C}">
+                <a14:useLocalDpi xmlns:a14="http://schemas.microsoft.com/office/drawing/2010/main" val="0"/>
+              </a:ext>
+            </a:extLst>
+          </a:blip>
+          <a:srcRect/>
+          <a:stretch>
+            <a:fillRect/>
+          </a:stretch>
+        </p:blipFill>
+        <p:spPr bwMode="auto">
+          <a:xfrm>
+            <a:off x="4572000" y="1833562"/>
+            <a:ext cx="3886200" cy="3914775"/>
+          </a:xfrm>
+          <a:prstGeom prst="rect">
+            <a:avLst/>
+          </a:prstGeom>
+          <a:noFill/>
+          <a:ln>
+            <a:noFill/>
+          </a:ln>
+          <a:extLst>
+            <a:ext uri="{909E8E84-426E-40DD-AFC4-6F175D3DCCD1}">
+              <a14:hiddenFill xmlns:a14="http://schemas.microsoft.com/office/drawing/2010/main">
+                <a:solidFill>
+                  <a:schemeClr val="accent1"/>
+                </a:solidFill>
+              </a14:hiddenFill>
+            </a:ext>
+            <a:ext uri="{91240B29-F687-4F45-9708-019B960494DF}">
+              <a14:hiddenLine xmlns:a14="http://schemas.microsoft.com/office/drawing/2010/main" w="9525">
+                <a:solidFill>
+                  <a:schemeClr val="tx1"/>
+                </a:solidFill>
+                <a:miter lim="800000"/>
+                <a:headEnd/>
+                <a:tailEnd/>
+              </a14:hiddenLine>
+            </a:ext>
+          </a:extLst>
+        </p:spPr>
+      </p:pic>
+    </p:spTree>
+    <p:extLst>
+      <p:ext uri="{BB962C8B-B14F-4D97-AF65-F5344CB8AC3E}">
+        <p14:creationId xmlns:p14="http://schemas.microsoft.com/office/powerpoint/2010/main" val="577461083"/>
+      </p:ext>
+    </p:extLst>
+  </p:cSld>
+  <p:clrMapOvr>
+    <a:masterClrMapping/>
+  </p:clrMapOvr>
+  <p:timing>
+    <p:tnLst>
+      <p:par>
+        <p:cTn id="1" dur="indefinite" restart="never" nodeType="tmRoot"/>
+      </p:par>
+    </p:tnLst>
+  </p:timing>
+</p:sld>
+</file>
+
+<file path=ppt/slides/slide12.xml><?xml version="1.0" encoding="utf-8"?>
+<p:sld xmlns:a="http://schemas.openxmlformats.org/drawingml/2006/main" xmlns:r="http://schemas.openxmlformats.org/officeDocument/2006/relationships" xmlns:p="http://schemas.openxmlformats.org/presentationml/2006/main">
+  <p:cSld>
+    <p:spTree>
+      <p:nvGrpSpPr>
+        <p:cNvPr id="1" name=""/>
+        <p:cNvGrpSpPr/>
+        <p:nvPr/>
+      </p:nvGrpSpPr>
+      <p:grpSpPr>
+        <a:xfrm>
+          <a:off x="0" y="0"/>
+          <a:ext cx="0" cy="0"/>
+          <a:chOff x="0" y="0"/>
+          <a:chExt cx="0" cy="0"/>
+        </a:xfrm>
+      </p:grpSpPr>
+      <p:sp>
+        <p:nvSpPr>
+          <p:cNvPr id="2" name="Subtitle 1"/>
+          <p:cNvSpPr>
+            <a:spLocks noGrp="1"/>
+          </p:cNvSpPr>
+          <p:nvPr>
+            <p:ph type="subTitle" idx="1"/>
+          </p:nvPr>
+        </p:nvSpPr>
+        <p:spPr/>
+        <p:txBody>
+          <a:bodyPr/>
+          <a:lstStyle/>
+          <a:p>
+            <a:r>
+              <a:rPr lang="en-US" dirty="0" smtClean="0"/>
+              <a:t>Throwing and catching Exceptions</a:t>
+            </a:r>
+            <a:endParaRPr lang="en-US" dirty="0"/>
+          </a:p>
+        </p:txBody>
+      </p:sp>
+      <p:sp>
+        <p:nvSpPr>
+          <p:cNvPr id="3" name="Title 2"/>
+          <p:cNvSpPr>
+            <a:spLocks noGrp="1"/>
+          </p:cNvSpPr>
+          <p:nvPr>
+            <p:ph type="title"/>
+          </p:nvPr>
+        </p:nvSpPr>
+        <p:spPr/>
+        <p:txBody>
+          <a:bodyPr/>
+          <a:lstStyle/>
+          <a:p>
+            <a:r>
+              <a:rPr lang="en-US" dirty="0" smtClean="0"/>
+              <a:t>Handling Errors</a:t>
+            </a:r>
+            <a:endParaRPr lang="en-US" dirty="0"/>
+          </a:p>
+        </p:txBody>
+      </p:sp>
+    </p:spTree>
+    <p:extLst>
+      <p:ext uri="{BB962C8B-B14F-4D97-AF65-F5344CB8AC3E}">
+        <p14:creationId xmlns:p14="http://schemas.microsoft.com/office/powerpoint/2010/main" val="4008257455"/>
+      </p:ext>
+    </p:extLst>
+  </p:cSld>
+  <p:clrMapOvr>
+    <a:masterClrMapping/>
+  </p:clrMapOvr>
+  <p:timing>
+    <p:tnLst>
+      <p:par>
+        <p:cTn id="1" dur="indefinite" restart="never" nodeType="tmRoot"/>
+      </p:par>
+    </p:tnLst>
+  </p:timing>
+</p:sld>
+</file>
+
+<file path=ppt/slides/slide13.xml><?xml version="1.0" encoding="utf-8"?>
+<p:sld xmlns:a="http://schemas.openxmlformats.org/drawingml/2006/main" xmlns:r="http://schemas.openxmlformats.org/officeDocument/2006/relationships" xmlns:p="http://schemas.openxmlformats.org/presentationml/2006/main">
+  <p:cSld>
+    <p:spTree>
+      <p:nvGrpSpPr>
+        <p:cNvPr id="1" name=""/>
+        <p:cNvGrpSpPr/>
+        <p:nvPr/>
+      </p:nvGrpSpPr>
+      <p:grpSpPr>
+        <a:xfrm>
+          <a:off x="0" y="0"/>
+          <a:ext cx="0" cy="0"/>
+          <a:chOff x="0" y="0"/>
+          <a:chExt cx="0" cy="0"/>
+        </a:xfrm>
+      </p:grpSpPr>
+      <p:sp>
+        <p:nvSpPr>
+          <p:cNvPr id="2" name="Title 1"/>
+          <p:cNvSpPr>
+            <a:spLocks noGrp="1"/>
+          </p:cNvSpPr>
+          <p:nvPr>
+            <p:ph type="title"/>
+          </p:nvPr>
+        </p:nvSpPr>
+        <p:spPr/>
+        <p:txBody>
+          <a:bodyPr/>
+          <a:lstStyle/>
+          <a:p>
+            <a:r>
+              <a:rPr lang="en-US" dirty="0" smtClean="0"/>
               <a:t>Try - Catch</a:t>
             </a:r>
             <a:endParaRPr lang="en-US" dirty="0"/>
@@ -5180,7 +5924,7 @@
 </p:sld>
 </file>
 
-<file path=ppt/slides/slide11.xml><?xml version="1.0" encoding="utf-8"?>
+<file path=ppt/slides/slide14.xml><?xml version="1.0" encoding="utf-8"?>
 <p:sld xmlns:a="http://schemas.openxmlformats.org/drawingml/2006/main" xmlns:r="http://schemas.openxmlformats.org/officeDocument/2006/relationships" xmlns:p="http://schemas.openxmlformats.org/presentationml/2006/main">
   <p:cSld>
     <p:spTree>
@@ -5294,7 +6038,7 @@
 </p:sld>
 </file>
 
-<file path=ppt/slides/slide12.xml><?xml version="1.0" encoding="utf-8"?>
+<file path=ppt/slides/slide15.xml><?xml version="1.0" encoding="utf-8"?>
 <p:sld xmlns:a="http://schemas.openxmlformats.org/drawingml/2006/main" xmlns:r="http://schemas.openxmlformats.org/officeDocument/2006/relationships" xmlns:p="http://schemas.openxmlformats.org/presentationml/2006/main">
   <p:cSld>
     <p:spTree>
@@ -5408,7 +6152,7 @@
 </p:sld>
 </file>
 
-<file path=ppt/slides/slide13.xml><?xml version="1.0" encoding="utf-8"?>
+<file path=ppt/slides/slide16.xml><?xml version="1.0" encoding="utf-8"?>
 <p:sld xmlns:a="http://schemas.openxmlformats.org/drawingml/2006/main" xmlns:r="http://schemas.openxmlformats.org/officeDocument/2006/relationships" xmlns:p="http://schemas.openxmlformats.org/presentationml/2006/main">
   <p:cSld>
     <p:spTree>
@@ -5522,7 +6266,7 @@
 </p:sld>
 </file>
 
-<file path=ppt/slides/slide14.xml><?xml version="1.0" encoding="utf-8"?>
+<file path=ppt/slides/slide17.xml><?xml version="1.0" encoding="utf-8"?>
 <p:sld xmlns:a="http://schemas.openxmlformats.org/drawingml/2006/main" xmlns:r="http://schemas.openxmlformats.org/officeDocument/2006/relationships" xmlns:p="http://schemas.openxmlformats.org/presentationml/2006/main">
   <p:cSld>
     <p:spTree>
@@ -5636,7 +6380,7 @@
 </p:sld>
 </file>
 
-<file path=ppt/slides/slide15.xml><?xml version="1.0" encoding="utf-8"?>
+<file path=ppt/slides/slide18.xml><?xml version="1.0" encoding="utf-8"?>
 <p:sld xmlns:a="http://schemas.openxmlformats.org/drawingml/2006/main" xmlns:r="http://schemas.openxmlformats.org/officeDocument/2006/relationships" xmlns:p="http://schemas.openxmlformats.org/presentationml/2006/main">
   <p:cSld>
     <p:spTree>
@@ -5750,7 +6494,7 @@
 </p:sld>
 </file>
 
-<file path=ppt/slides/slide16.xml><?xml version="1.0" encoding="utf-8"?>
+<file path=ppt/slides/slide19.xml><?xml version="1.0" encoding="utf-8"?>
 <p:sld xmlns:a="http://schemas.openxmlformats.org/drawingml/2006/main" xmlns:r="http://schemas.openxmlformats.org/officeDocument/2006/relationships" xmlns:p="http://schemas.openxmlformats.org/presentationml/2006/main">
   <p:cSld>
     <p:spTree>
@@ -5918,7 +6662,137 @@
 </p:sld>
 </file>
 
-<file path=ppt/slides/slide17.xml><?xml version="1.0" encoding="utf-8"?>
+<file path=ppt/slides/slide2.xml><?xml version="1.0" encoding="utf-8"?>
+<p:sld xmlns:a="http://schemas.openxmlformats.org/drawingml/2006/main" xmlns:r="http://schemas.openxmlformats.org/officeDocument/2006/relationships" xmlns:p="http://schemas.openxmlformats.org/presentationml/2006/main">
+  <p:cSld>
+    <p:spTree>
+      <p:nvGrpSpPr>
+        <p:cNvPr id="1" name=""/>
+        <p:cNvGrpSpPr/>
+        <p:nvPr/>
+      </p:nvGrpSpPr>
+      <p:grpSpPr>
+        <a:xfrm>
+          <a:off x="0" y="0"/>
+          <a:ext cx="0" cy="0"/>
+          <a:chOff x="0" y="0"/>
+          <a:chExt cx="0" cy="0"/>
+        </a:xfrm>
+      </p:grpSpPr>
+      <p:sp>
+        <p:nvSpPr>
+          <p:cNvPr id="2" name="Title 1"/>
+          <p:cNvSpPr>
+            <a:spLocks noGrp="1"/>
+          </p:cNvSpPr>
+          <p:nvPr>
+            <p:ph type="title"/>
+          </p:nvPr>
+        </p:nvSpPr>
+        <p:spPr/>
+        <p:txBody>
+          <a:bodyPr/>
+          <a:lstStyle/>
+          <a:p>
+            <a:r>
+              <a:rPr lang="en-US" dirty="0" smtClean="0"/>
+              <a:t>HTML-elements</a:t>
+            </a:r>
+            <a:endParaRPr lang="en-US" dirty="0"/>
+          </a:p>
+        </p:txBody>
+      </p:sp>
+      <p:sp>
+        <p:nvSpPr>
+          <p:cNvPr id="3" name="Content Placeholder 2"/>
+          <p:cNvSpPr>
+            <a:spLocks noGrp="1"/>
+          </p:cNvSpPr>
+          <p:nvPr>
+            <p:ph idx="1"/>
+          </p:nvPr>
+        </p:nvSpPr>
+        <p:spPr/>
+        <p:txBody>
+          <a:bodyPr/>
+          <a:lstStyle/>
+          <a:p>
+            <a:pPr marL="0" indent="0">
+              <a:buNone/>
+            </a:pPr>
+            <a:r>
+              <a:rPr lang="en-US" dirty="0" smtClean="0"/>
+              <a:t>An element starts with ‘&lt;‘ and ends with ‘&gt;’.</a:t>
+            </a:r>
+          </a:p>
+          <a:p>
+            <a:pPr marL="0" indent="0">
+              <a:buNone/>
+            </a:pPr>
+            <a:r>
+              <a:rPr lang="en-US" dirty="0" smtClean="0"/>
+              <a:t>A start element ‘&lt;tag&gt;’ must always be followed somewhere with an end element ‘&lt;/tag&gt;’.</a:t>
+            </a:r>
+          </a:p>
+          <a:p>
+            <a:pPr marL="0" indent="0">
+              <a:buNone/>
+            </a:pPr>
+            <a:r>
+              <a:rPr lang="en-US" dirty="0" smtClean="0"/>
+              <a:t>In between there can be other tags nested.</a:t>
+            </a:r>
+          </a:p>
+          <a:p>
+            <a:pPr marL="0" indent="0">
+              <a:buNone/>
+            </a:pPr>
+            <a:r>
+              <a:rPr lang="en-US" dirty="0" smtClean="0"/>
+              <a:t>An element with nothing inside is called an empty element ‘&lt;tag /&gt;’.</a:t>
+            </a:r>
+          </a:p>
+          <a:p>
+            <a:pPr marL="0" indent="0">
+              <a:buNone/>
+            </a:pPr>
+            <a:endParaRPr lang="en-US" dirty="0" smtClean="0"/>
+          </a:p>
+          <a:p>
+            <a:pPr marL="0" indent="0">
+              <a:buNone/>
+            </a:pPr>
+            <a:endParaRPr lang="en-US" dirty="0" smtClean="0"/>
+          </a:p>
+          <a:p>
+            <a:pPr marL="0" indent="0">
+              <a:buNone/>
+            </a:pPr>
+            <a:endParaRPr lang="en-US" dirty="0"/>
+          </a:p>
+        </p:txBody>
+      </p:sp>
+    </p:spTree>
+    <p:extLst>
+      <p:ext uri="{BB962C8B-B14F-4D97-AF65-F5344CB8AC3E}">
+        <p14:creationId xmlns:p14="http://schemas.microsoft.com/office/powerpoint/2010/main" val="853688516"/>
+      </p:ext>
+    </p:extLst>
+  </p:cSld>
+  <p:clrMapOvr>
+    <a:masterClrMapping/>
+  </p:clrMapOvr>
+  <p:timing>
+    <p:tnLst>
+      <p:par>
+        <p:cTn id="1" dur="indefinite" restart="never" nodeType="tmRoot"/>
+      </p:par>
+    </p:tnLst>
+  </p:timing>
+</p:sld>
+</file>
+
+<file path=ppt/slides/slide20.xml><?xml version="1.0" encoding="utf-8"?>
 <p:sld xmlns:a="http://schemas.openxmlformats.org/drawingml/2006/main" xmlns:r="http://schemas.openxmlformats.org/officeDocument/2006/relationships" xmlns:p="http://schemas.openxmlformats.org/presentationml/2006/main">
   <p:cSld>
     <p:spTree>
@@ -6239,7 +7113,7 @@
 </p:sld>
 </file>
 
-<file path=ppt/slides/slide18.xml><?xml version="1.0" encoding="utf-8"?>
+<file path=ppt/slides/slide21.xml><?xml version="1.0" encoding="utf-8"?>
 <p:sld xmlns:a="http://schemas.openxmlformats.org/drawingml/2006/main" xmlns:r="http://schemas.openxmlformats.org/officeDocument/2006/relationships" xmlns:p="http://schemas.openxmlformats.org/presentationml/2006/main">
   <p:cSld>
     <p:spTree>
@@ -6384,7 +7258,7 @@
 </p:sld>
 </file>
 
-<file path=ppt/slides/slide19.xml><?xml version="1.0" encoding="utf-8"?>
+<file path=ppt/slides/slide22.xml><?xml version="1.0" encoding="utf-8"?>
 <p:sld xmlns:a="http://schemas.openxmlformats.org/drawingml/2006/main" xmlns:r="http://schemas.openxmlformats.org/officeDocument/2006/relationships" xmlns:p="http://schemas.openxmlformats.org/presentationml/2006/main">
   <p:cSld>
     <p:spTree>
@@ -6498,137 +7372,7 @@
 </p:sld>
 </file>
 
-<file path=ppt/slides/slide2.xml><?xml version="1.0" encoding="utf-8"?>
-<p:sld xmlns:a="http://schemas.openxmlformats.org/drawingml/2006/main" xmlns:r="http://schemas.openxmlformats.org/officeDocument/2006/relationships" xmlns:p="http://schemas.openxmlformats.org/presentationml/2006/main">
-  <p:cSld>
-    <p:spTree>
-      <p:nvGrpSpPr>
-        <p:cNvPr id="1" name=""/>
-        <p:cNvGrpSpPr/>
-        <p:nvPr/>
-      </p:nvGrpSpPr>
-      <p:grpSpPr>
-        <a:xfrm>
-          <a:off x="0" y="0"/>
-          <a:ext cx="0" cy="0"/>
-          <a:chOff x="0" y="0"/>
-          <a:chExt cx="0" cy="0"/>
-        </a:xfrm>
-      </p:grpSpPr>
-      <p:sp>
-        <p:nvSpPr>
-          <p:cNvPr id="2" name="Title 1"/>
-          <p:cNvSpPr>
-            <a:spLocks noGrp="1"/>
-          </p:cNvSpPr>
-          <p:nvPr>
-            <p:ph type="title"/>
-          </p:nvPr>
-        </p:nvSpPr>
-        <p:spPr/>
-        <p:txBody>
-          <a:bodyPr/>
-          <a:lstStyle/>
-          <a:p>
-            <a:r>
-              <a:rPr lang="en-US" dirty="0" smtClean="0"/>
-              <a:t>HTML-elements</a:t>
-            </a:r>
-            <a:endParaRPr lang="en-US" dirty="0"/>
-          </a:p>
-        </p:txBody>
-      </p:sp>
-      <p:sp>
-        <p:nvSpPr>
-          <p:cNvPr id="3" name="Content Placeholder 2"/>
-          <p:cNvSpPr>
-            <a:spLocks noGrp="1"/>
-          </p:cNvSpPr>
-          <p:nvPr>
-            <p:ph idx="1"/>
-          </p:nvPr>
-        </p:nvSpPr>
-        <p:spPr/>
-        <p:txBody>
-          <a:bodyPr/>
-          <a:lstStyle/>
-          <a:p>
-            <a:pPr marL="0" indent="0">
-              <a:buNone/>
-            </a:pPr>
-            <a:r>
-              <a:rPr lang="en-US" dirty="0" smtClean="0"/>
-              <a:t>An element starts with ‘&lt;‘ and ends with ‘&gt;’.</a:t>
-            </a:r>
-          </a:p>
-          <a:p>
-            <a:pPr marL="0" indent="0">
-              <a:buNone/>
-            </a:pPr>
-            <a:r>
-              <a:rPr lang="en-US" dirty="0" smtClean="0"/>
-              <a:t>A start element ‘&lt;tag&gt;’ must always be followed somewhere with an end element ‘&lt;/tag&gt;’.</a:t>
-            </a:r>
-          </a:p>
-          <a:p>
-            <a:pPr marL="0" indent="0">
-              <a:buNone/>
-            </a:pPr>
-            <a:r>
-              <a:rPr lang="en-US" dirty="0" smtClean="0"/>
-              <a:t>In between there can be other tags nested.</a:t>
-            </a:r>
-          </a:p>
-          <a:p>
-            <a:pPr marL="0" indent="0">
-              <a:buNone/>
-            </a:pPr>
-            <a:r>
-              <a:rPr lang="en-US" dirty="0" smtClean="0"/>
-              <a:t>An element with nothing inside is called an empty element ‘&lt;tag /&gt;’.</a:t>
-            </a:r>
-          </a:p>
-          <a:p>
-            <a:pPr marL="0" indent="0">
-              <a:buNone/>
-            </a:pPr>
-            <a:endParaRPr lang="en-US" dirty="0" smtClean="0"/>
-          </a:p>
-          <a:p>
-            <a:pPr marL="0" indent="0">
-              <a:buNone/>
-            </a:pPr>
-            <a:endParaRPr lang="en-US" dirty="0" smtClean="0"/>
-          </a:p>
-          <a:p>
-            <a:pPr marL="0" indent="0">
-              <a:buNone/>
-            </a:pPr>
-            <a:endParaRPr lang="en-US" dirty="0"/>
-          </a:p>
-        </p:txBody>
-      </p:sp>
-    </p:spTree>
-    <p:extLst>
-      <p:ext uri="{BB962C8B-B14F-4D97-AF65-F5344CB8AC3E}">
-        <p14:creationId xmlns:p14="http://schemas.microsoft.com/office/powerpoint/2010/main" val="853688516"/>
-      </p:ext>
-    </p:extLst>
-  </p:cSld>
-  <p:clrMapOvr>
-    <a:masterClrMapping/>
-  </p:clrMapOvr>
-  <p:timing>
-    <p:tnLst>
-      <p:par>
-        <p:cTn id="1" dur="indefinite" restart="never" nodeType="tmRoot"/>
-      </p:par>
-    </p:tnLst>
-  </p:timing>
-</p:sld>
-</file>
-
-<file path=ppt/slides/slide20.xml><?xml version="1.0" encoding="utf-8"?>
+<file path=ppt/slides/slide23.xml><?xml version="1.0" encoding="utf-8"?>
 <p:sld xmlns:a="http://schemas.openxmlformats.org/drawingml/2006/main" xmlns:r="http://schemas.openxmlformats.org/officeDocument/2006/relationships" xmlns:p="http://schemas.openxmlformats.org/presentationml/2006/main">
   <p:cSld>
     <p:spTree>
@@ -6742,7 +7486,7 @@
 </p:sld>
 </file>
 
-<file path=ppt/slides/slide21.xml><?xml version="1.0" encoding="utf-8"?>
+<file path=ppt/slides/slide24.xml><?xml version="1.0" encoding="utf-8"?>
 <p:sld xmlns:a="http://schemas.openxmlformats.org/drawingml/2006/main" xmlns:r="http://schemas.openxmlformats.org/officeDocument/2006/relationships" xmlns:p="http://schemas.openxmlformats.org/presentationml/2006/main">
   <p:cSld>
     <p:spTree>
@@ -6910,7 +7654,7 @@
 </p:sld>
 </file>
 
-<file path=ppt/slides/slide22.xml><?xml version="1.0" encoding="utf-8"?>
+<file path=ppt/slides/slide25.xml><?xml version="1.0" encoding="utf-8"?>
 <p:sld xmlns:a="http://schemas.openxmlformats.org/drawingml/2006/main" xmlns:r="http://schemas.openxmlformats.org/officeDocument/2006/relationships" xmlns:p="http://schemas.openxmlformats.org/presentationml/2006/main">
   <p:cSld>
     <p:spTree>
@@ -7078,7 +7822,7 @@
 </p:sld>
 </file>
 
-<file path=ppt/slides/slide23.xml><?xml version="1.0" encoding="utf-8"?>
+<file path=ppt/slides/slide26.xml><?xml version="1.0" encoding="utf-8"?>
 <p:sld xmlns:a="http://schemas.openxmlformats.org/drawingml/2006/main" xmlns:r="http://schemas.openxmlformats.org/officeDocument/2006/relationships" xmlns:p="http://schemas.openxmlformats.org/presentationml/2006/main">
   <p:cSld>
     <p:spTree>
@@ -7300,7 +8044,7 @@
 </p:sld>
 </file>
 
-<file path=ppt/slides/slide24.xml><?xml version="1.0" encoding="utf-8"?>
+<file path=ppt/slides/slide27.xml><?xml version="1.0" encoding="utf-8"?>
 <p:sld xmlns:a="http://schemas.openxmlformats.org/drawingml/2006/main" xmlns:r="http://schemas.openxmlformats.org/officeDocument/2006/relationships" xmlns:p="http://schemas.openxmlformats.org/presentationml/2006/main">
   <p:cSld>
     <p:spTree>
@@ -7383,7 +8127,7 @@
 </p:sld>
 </file>
 
-<file path=ppt/slides/slide25.xml><?xml version="1.0" encoding="utf-8"?>
+<file path=ppt/slides/slide28.xml><?xml version="1.0" encoding="utf-8"?>
 <p:sld xmlns:a="http://schemas.openxmlformats.org/drawingml/2006/main" xmlns:r="http://schemas.openxmlformats.org/officeDocument/2006/relationships" xmlns:p="http://schemas.openxmlformats.org/presentationml/2006/main">
   <p:cSld>
     <p:spTree>
@@ -7497,7 +8241,7 @@
 </p:sld>
 </file>
 
-<file path=ppt/slides/slide26.xml><?xml version="1.0" encoding="utf-8"?>
+<file path=ppt/slides/slide29.xml><?xml version="1.0" encoding="utf-8"?>
 <p:sld xmlns:a="http://schemas.openxmlformats.org/drawingml/2006/main" xmlns:r="http://schemas.openxmlformats.org/officeDocument/2006/relationships" xmlns:p="http://schemas.openxmlformats.org/presentationml/2006/main">
   <p:cSld>
     <p:spTree>
@@ -7970,7 +8714,137 @@
 </p:sld>
 </file>
 
-<file path=ppt/slides/slide27.xml><?xml version="1.0" encoding="utf-8"?>
+<file path=ppt/slides/slide3.xml><?xml version="1.0" encoding="utf-8"?>
+<p:sld xmlns:a="http://schemas.openxmlformats.org/drawingml/2006/main" xmlns:r="http://schemas.openxmlformats.org/officeDocument/2006/relationships" xmlns:p="http://schemas.openxmlformats.org/presentationml/2006/main">
+  <p:cSld>
+    <p:spTree>
+      <p:nvGrpSpPr>
+        <p:cNvPr id="1" name=""/>
+        <p:cNvGrpSpPr/>
+        <p:nvPr/>
+      </p:nvGrpSpPr>
+      <p:grpSpPr>
+        <a:xfrm>
+          <a:off x="0" y="0"/>
+          <a:ext cx="0" cy="0"/>
+          <a:chOff x="0" y="0"/>
+          <a:chExt cx="0" cy="0"/>
+        </a:xfrm>
+      </p:grpSpPr>
+      <p:sp>
+        <p:nvSpPr>
+          <p:cNvPr id="2" name="Title 1"/>
+          <p:cNvSpPr>
+            <a:spLocks noGrp="1"/>
+          </p:cNvSpPr>
+          <p:nvPr>
+            <p:ph type="title"/>
+          </p:nvPr>
+        </p:nvSpPr>
+        <p:spPr/>
+        <p:txBody>
+          <a:bodyPr/>
+          <a:lstStyle/>
+          <a:p>
+            <a:r>
+              <a:rPr lang="en-US" dirty="0" smtClean="0"/>
+              <a:t>HTML-attributes</a:t>
+            </a:r>
+            <a:endParaRPr lang="en-US" dirty="0"/>
+          </a:p>
+        </p:txBody>
+      </p:sp>
+      <p:sp>
+        <p:nvSpPr>
+          <p:cNvPr id="3" name="Content Placeholder 2"/>
+          <p:cNvSpPr>
+            <a:spLocks noGrp="1"/>
+          </p:cNvSpPr>
+          <p:nvPr>
+            <p:ph idx="1"/>
+          </p:nvPr>
+        </p:nvSpPr>
+        <p:spPr/>
+        <p:txBody>
+          <a:bodyPr/>
+          <a:lstStyle/>
+          <a:p>
+            <a:pPr marL="0" indent="0">
+              <a:buNone/>
+            </a:pPr>
+            <a:r>
+              <a:rPr lang="en-US" dirty="0" smtClean="0"/>
+              <a:t>Each element can have attributes.</a:t>
+            </a:r>
+          </a:p>
+          <a:p>
+            <a:pPr marL="0" indent="0">
+              <a:buNone/>
+            </a:pPr>
+            <a:r>
+              <a:rPr lang="en-US" dirty="0" smtClean="0"/>
+              <a:t>An attribute has a name, and a value separates by an equals sign.</a:t>
+            </a:r>
+          </a:p>
+          <a:p>
+            <a:pPr marL="0" indent="0">
+              <a:buNone/>
+            </a:pPr>
+            <a:r>
+              <a:rPr lang="en-US" dirty="0" smtClean="0"/>
+              <a:t>The value must be in double-quotes.</a:t>
+            </a:r>
+          </a:p>
+          <a:p>
+            <a:pPr marL="0" indent="0">
+              <a:buNone/>
+            </a:pPr>
+            <a:r>
+              <a:rPr lang="en-US" dirty="0" smtClean="0"/>
+              <a:t>Example:</a:t>
+            </a:r>
+          </a:p>
+          <a:p>
+            <a:pPr marL="0" indent="0">
+              <a:buNone/>
+            </a:pPr>
+            <a:r>
+              <a:rPr lang="en-US" dirty="0" smtClean="0"/>
+              <a:t>&lt;td </a:t>
+            </a:r>
+            <a:r>
+              <a:rPr lang="en-US" dirty="0" err="1" smtClean="0"/>
+              <a:t>colspan</a:t>
+            </a:r>
+            <a:r>
+              <a:rPr lang="en-US" dirty="0" smtClean="0"/>
+              <a:t>="5"&gt;</a:t>
+            </a:r>
+            <a:endParaRPr lang="en-US" dirty="0"/>
+          </a:p>
+        </p:txBody>
+      </p:sp>
+    </p:spTree>
+    <p:extLst>
+      <p:ext uri="{BB962C8B-B14F-4D97-AF65-F5344CB8AC3E}">
+        <p14:creationId xmlns:p14="http://schemas.microsoft.com/office/powerpoint/2010/main" val="1835246695"/>
+      </p:ext>
+    </p:extLst>
+  </p:cSld>
+  <p:clrMapOvr>
+    <a:masterClrMapping/>
+  </p:clrMapOvr>
+  <p:timing>
+    <p:tnLst>
+      <p:par>
+        <p:cTn id="1" dur="indefinite" restart="never" nodeType="tmRoot"/>
+      </p:par>
+    </p:tnLst>
+  </p:timing>
+</p:sld>
+</file>
+
+<file path=ppt/slides/slide30.xml><?xml version="1.0" encoding="utf-8"?>
 <p:sld xmlns:a="http://schemas.openxmlformats.org/drawingml/2006/main" xmlns:r="http://schemas.openxmlformats.org/officeDocument/2006/relationships" xmlns:p="http://schemas.openxmlformats.org/presentationml/2006/main">
   <p:cSld>
     <p:spTree>
@@ -8659,15 +9533,7 @@
             <a:p>
               <a:r>
                 <a:rPr lang="en-US" dirty="0" smtClean="0"/>
-                <a:t>+ </a:t>
-              </a:r>
-              <a:r>
-                <a:rPr lang="en-US" dirty="0" smtClean="0"/>
-                <a:t>run</a:t>
-              </a:r>
-              <a:r>
-                <a:rPr lang="en-US" dirty="0" smtClean="0"/>
-                <a:t>(distance: Distance)</a:t>
+                <a:t>+ run(distance: Distance)</a:t>
               </a:r>
               <a:endParaRPr lang="en-US" dirty="0"/>
             </a:p>
@@ -8836,7 +9702,7 @@
 </p:sld>
 </file>
 
-<file path=ppt/slides/slide28.xml><?xml version="1.0" encoding="utf-8"?>
+<file path=ppt/slides/slide31.xml><?xml version="1.0" encoding="utf-8"?>
 <p:sld xmlns:a="http://schemas.openxmlformats.org/drawingml/2006/main" xmlns:r="http://schemas.openxmlformats.org/officeDocument/2006/relationships" xmlns:p="http://schemas.openxmlformats.org/presentationml/2006/main">
   <p:cSld>
     <p:spTree>
@@ -9218,7 +10084,7 @@
 </p:sld>
 </file>
 
-<file path=ppt/slides/slide29.xml><?xml version="1.0" encoding="utf-8"?>
+<file path=ppt/slides/slide32.xml><?xml version="1.0" encoding="utf-8"?>
 <p:sld xmlns:a="http://schemas.openxmlformats.org/drawingml/2006/main" xmlns:r="http://schemas.openxmlformats.org/officeDocument/2006/relationships" xmlns:p="http://schemas.openxmlformats.org/presentationml/2006/main">
   <p:cSld>
     <p:spTree>
@@ -9982,137 +10848,7 @@
 </p:sld>
 </file>
 
-<file path=ppt/slides/slide3.xml><?xml version="1.0" encoding="utf-8"?>
-<p:sld xmlns:a="http://schemas.openxmlformats.org/drawingml/2006/main" xmlns:r="http://schemas.openxmlformats.org/officeDocument/2006/relationships" xmlns:p="http://schemas.openxmlformats.org/presentationml/2006/main">
-  <p:cSld>
-    <p:spTree>
-      <p:nvGrpSpPr>
-        <p:cNvPr id="1" name=""/>
-        <p:cNvGrpSpPr/>
-        <p:nvPr/>
-      </p:nvGrpSpPr>
-      <p:grpSpPr>
-        <a:xfrm>
-          <a:off x="0" y="0"/>
-          <a:ext cx="0" cy="0"/>
-          <a:chOff x="0" y="0"/>
-          <a:chExt cx="0" cy="0"/>
-        </a:xfrm>
-      </p:grpSpPr>
-      <p:sp>
-        <p:nvSpPr>
-          <p:cNvPr id="2" name="Title 1"/>
-          <p:cNvSpPr>
-            <a:spLocks noGrp="1"/>
-          </p:cNvSpPr>
-          <p:nvPr>
-            <p:ph type="title"/>
-          </p:nvPr>
-        </p:nvSpPr>
-        <p:spPr/>
-        <p:txBody>
-          <a:bodyPr/>
-          <a:lstStyle/>
-          <a:p>
-            <a:r>
-              <a:rPr lang="en-US" dirty="0" smtClean="0"/>
-              <a:t>HTML-attributes</a:t>
-            </a:r>
-            <a:endParaRPr lang="en-US" dirty="0"/>
-          </a:p>
-        </p:txBody>
-      </p:sp>
-      <p:sp>
-        <p:nvSpPr>
-          <p:cNvPr id="3" name="Content Placeholder 2"/>
-          <p:cNvSpPr>
-            <a:spLocks noGrp="1"/>
-          </p:cNvSpPr>
-          <p:nvPr>
-            <p:ph idx="1"/>
-          </p:nvPr>
-        </p:nvSpPr>
-        <p:spPr/>
-        <p:txBody>
-          <a:bodyPr/>
-          <a:lstStyle/>
-          <a:p>
-            <a:pPr marL="0" indent="0">
-              <a:buNone/>
-            </a:pPr>
-            <a:r>
-              <a:rPr lang="en-US" dirty="0" smtClean="0"/>
-              <a:t>Each element can have attributes.</a:t>
-            </a:r>
-          </a:p>
-          <a:p>
-            <a:pPr marL="0" indent="0">
-              <a:buNone/>
-            </a:pPr>
-            <a:r>
-              <a:rPr lang="en-US" dirty="0" smtClean="0"/>
-              <a:t>An attribute has a name, and a value separates by an equals sign.</a:t>
-            </a:r>
-          </a:p>
-          <a:p>
-            <a:pPr marL="0" indent="0">
-              <a:buNone/>
-            </a:pPr>
-            <a:r>
-              <a:rPr lang="en-US" dirty="0" smtClean="0"/>
-              <a:t>The value must be in double-quotes.</a:t>
-            </a:r>
-          </a:p>
-          <a:p>
-            <a:pPr marL="0" indent="0">
-              <a:buNone/>
-            </a:pPr>
-            <a:r>
-              <a:rPr lang="en-US" dirty="0" smtClean="0"/>
-              <a:t>Example:</a:t>
-            </a:r>
-          </a:p>
-          <a:p>
-            <a:pPr marL="0" indent="0">
-              <a:buNone/>
-            </a:pPr>
-            <a:r>
-              <a:rPr lang="en-US" dirty="0" smtClean="0"/>
-              <a:t>&lt;td </a:t>
-            </a:r>
-            <a:r>
-              <a:rPr lang="en-US" dirty="0" err="1" smtClean="0"/>
-              <a:t>colspan</a:t>
-            </a:r>
-            <a:r>
-              <a:rPr lang="en-US" dirty="0" smtClean="0"/>
-              <a:t>="5"&gt;</a:t>
-            </a:r>
-            <a:endParaRPr lang="en-US" dirty="0"/>
-          </a:p>
-        </p:txBody>
-      </p:sp>
-    </p:spTree>
-    <p:extLst>
-      <p:ext uri="{BB962C8B-B14F-4D97-AF65-F5344CB8AC3E}">
-        <p14:creationId xmlns:p14="http://schemas.microsoft.com/office/powerpoint/2010/main" val="1835246695"/>
-      </p:ext>
-    </p:extLst>
-  </p:cSld>
-  <p:clrMapOvr>
-    <a:masterClrMapping/>
-  </p:clrMapOvr>
-  <p:timing>
-    <p:tnLst>
-      <p:par>
-        <p:cTn id="1" dur="indefinite" restart="never" nodeType="tmRoot"/>
-      </p:par>
-    </p:tnLst>
-  </p:timing>
-</p:sld>
-</file>
-
-<file path=ppt/slides/slide30.xml><?xml version="1.0" encoding="utf-8"?>
+<file path=ppt/slides/slide33.xml><?xml version="1.0" encoding="utf-8"?>
 <p:sld xmlns:a="http://schemas.openxmlformats.org/drawingml/2006/main" xmlns:r="http://schemas.openxmlformats.org/officeDocument/2006/relationships" xmlns:p="http://schemas.openxmlformats.org/presentationml/2006/main">
   <p:cSld>
     <p:spTree>
@@ -10530,7 +11266,7 @@
 </p:sld>
 </file>
 
-<file path=ppt/slides/slide31.xml><?xml version="1.0" encoding="utf-8"?>
+<file path=ppt/slides/slide34.xml><?xml version="1.0" encoding="utf-8"?>
 <p:sld xmlns:a="http://schemas.openxmlformats.org/drawingml/2006/main" xmlns:r="http://schemas.openxmlformats.org/officeDocument/2006/relationships" xmlns:p="http://schemas.openxmlformats.org/presentationml/2006/main">
   <p:cSld>
     <p:spTree>
@@ -11579,12 +12315,12 @@
       </p:grpSpPr>
       <p:sp>
         <p:nvSpPr>
-          <p:cNvPr id="2" name="Subtitle 1"/>
-          <p:cNvSpPr>
-            <a:spLocks noGrp="1"/>
-          </p:cNvSpPr>
-          <p:nvPr>
-            <p:ph type="subTitle" idx="1"/>
+          <p:cNvPr id="2" name="Title 1"/>
+          <p:cNvSpPr>
+            <a:spLocks noGrp="1"/>
+          </p:cNvSpPr>
+          <p:nvPr>
+            <p:ph type="title"/>
           </p:nvPr>
         </p:nvSpPr>
         <p:spPr/>
@@ -11594,39 +12330,124 @@
           <a:p>
             <a:r>
               <a:rPr lang="en-US" dirty="0" smtClean="0"/>
-              <a:t>Throwing and catching Exceptions</a:t>
+              <a:t>Java Security</a:t>
             </a:r>
             <a:endParaRPr lang="en-US" dirty="0"/>
           </a:p>
         </p:txBody>
       </p:sp>
-      <p:sp>
-        <p:nvSpPr>
-          <p:cNvPr id="3" name="Title 2"/>
-          <p:cNvSpPr>
-            <a:spLocks noGrp="1"/>
-          </p:cNvSpPr>
-          <p:nvPr>
-            <p:ph type="title"/>
-          </p:nvPr>
-        </p:nvSpPr>
-        <p:spPr/>
-        <p:txBody>
-          <a:bodyPr/>
-          <a:lstStyle/>
-          <a:p>
-            <a:r>
-              <a:rPr lang="en-US" dirty="0" smtClean="0"/>
-              <a:t>Handling Errors</a:t>
-            </a:r>
-            <a:endParaRPr lang="en-US" dirty="0"/>
-          </a:p>
-        </p:txBody>
-      </p:sp>
+      <p:pic>
+        <p:nvPicPr>
+          <p:cNvPr id="2050" name="Picture 2"/>
+          <p:cNvPicPr>
+            <a:picLocks noChangeAspect="1" noChangeArrowheads="1"/>
+          </p:cNvPicPr>
+          <p:nvPr/>
+        </p:nvPicPr>
+        <p:blipFill>
+          <a:blip r:embed="rId3">
+            <a:extLst>
+              <a:ext uri="{28A0092B-C50C-407E-A947-70E740481C1C}">
+                <a14:useLocalDpi xmlns:a14="http://schemas.microsoft.com/office/drawing/2010/main" val="0"/>
+              </a:ext>
+            </a:extLst>
+          </a:blip>
+          <a:srcRect/>
+          <a:stretch>
+            <a:fillRect/>
+          </a:stretch>
+        </p:blipFill>
+        <p:spPr bwMode="auto">
+          <a:xfrm>
+            <a:off x="5334000" y="1219200"/>
+            <a:ext cx="3648075" cy="2562225"/>
+          </a:xfrm>
+          <a:prstGeom prst="rect">
+            <a:avLst/>
+          </a:prstGeom>
+          <a:noFill/>
+          <a:ln>
+            <a:noFill/>
+          </a:ln>
+          <a:extLst>
+            <a:ext uri="{909E8E84-426E-40DD-AFC4-6F175D3DCCD1}">
+              <a14:hiddenFill xmlns:a14="http://schemas.microsoft.com/office/drawing/2010/main">
+                <a:solidFill>
+                  <a:schemeClr val="accent1"/>
+                </a:solidFill>
+              </a14:hiddenFill>
+            </a:ext>
+            <a:ext uri="{91240B29-F687-4F45-9708-019B960494DF}">
+              <a14:hiddenLine xmlns:a14="http://schemas.microsoft.com/office/drawing/2010/main" w="9525">
+                <a:solidFill>
+                  <a:schemeClr val="tx1"/>
+                </a:solidFill>
+                <a:miter lim="800000"/>
+                <a:headEnd/>
+                <a:tailEnd/>
+              </a14:hiddenLine>
+            </a:ext>
+          </a:extLst>
+        </p:spPr>
+      </p:pic>
+      <p:pic>
+        <p:nvPicPr>
+          <p:cNvPr id="2051" name="Picture 3"/>
+          <p:cNvPicPr>
+            <a:picLocks noChangeAspect="1" noChangeArrowheads="1"/>
+          </p:cNvPicPr>
+          <p:nvPr/>
+        </p:nvPicPr>
+        <p:blipFill>
+          <a:blip r:embed="rId4">
+            <a:extLst>
+              <a:ext uri="{28A0092B-C50C-407E-A947-70E740481C1C}">
+                <a14:useLocalDpi xmlns:a14="http://schemas.microsoft.com/office/drawing/2010/main" val="0"/>
+              </a:ext>
+            </a:extLst>
+          </a:blip>
+          <a:srcRect/>
+          <a:stretch>
+            <a:fillRect/>
+          </a:stretch>
+        </p:blipFill>
+        <p:spPr bwMode="auto">
+          <a:xfrm>
+            <a:off x="18143" y="1533525"/>
+            <a:ext cx="4867275" cy="1228725"/>
+          </a:xfrm>
+          <a:prstGeom prst="rect">
+            <a:avLst/>
+          </a:prstGeom>
+          <a:noFill/>
+          <a:ln>
+            <a:noFill/>
+          </a:ln>
+          <a:extLst>
+            <a:ext uri="{909E8E84-426E-40DD-AFC4-6F175D3DCCD1}">
+              <a14:hiddenFill xmlns:a14="http://schemas.microsoft.com/office/drawing/2010/main">
+                <a:solidFill>
+                  <a:schemeClr val="accent1"/>
+                </a:solidFill>
+              </a14:hiddenFill>
+            </a:ext>
+            <a:ext uri="{91240B29-F687-4F45-9708-019B960494DF}">
+              <a14:hiddenLine xmlns:a14="http://schemas.microsoft.com/office/drawing/2010/main" w="9525">
+                <a:solidFill>
+                  <a:schemeClr val="tx1"/>
+                </a:solidFill>
+                <a:miter lim="800000"/>
+                <a:headEnd/>
+                <a:tailEnd/>
+              </a14:hiddenLine>
+            </a:ext>
+          </a:extLst>
+        </p:spPr>
+      </p:pic>
     </p:spTree>
     <p:extLst>
       <p:ext uri="{BB962C8B-B14F-4D97-AF65-F5344CB8AC3E}">
-        <p14:creationId xmlns:p14="http://schemas.microsoft.com/office/powerpoint/2010/main" val="4008257455"/>
+        <p14:creationId xmlns:p14="http://schemas.microsoft.com/office/powerpoint/2010/main" val="4050601336"/>
       </p:ext>
     </p:extLst>
   </p:cSld>

</xml_diff>